<commit_message>
update readmes and add src to frontend
</commit_message>
<xml_diff>
--- a/Play-Architektur.pptx
+++ b/Play-Architektur.pptx
@@ -9,8 +9,7 @@
     <p:sldId id="261" r:id="rId3"/>
     <p:sldId id="259" r:id="rId4"/>
     <p:sldId id="262" r:id="rId5"/>
-    <p:sldId id="263" r:id="rId6"/>
-    <p:sldId id="257" r:id="rId7"/>
+    <p:sldId id="257" r:id="rId6"/>
   </p:sldIdLst>
   <p:sldSz cx="12192000" cy="6858000"/>
   <p:notesSz cx="6858000" cy="9144000"/>
@@ -248,7 +247,7 @@
           <a:p>
             <a:fld id="{93CA9FAC-B7E5-4637-851C-7F067A4F52F4}" type="datetimeFigureOut">
               <a:rPr lang="de-DE" smtClean="0"/>
-              <a:t>23.04.2020</a:t>
+              <a:t>04.05.2020</a:t>
             </a:fld>
             <a:endParaRPr lang="de-DE"/>
           </a:p>
@@ -418,7 +417,7 @@
           <a:p>
             <a:fld id="{93CA9FAC-B7E5-4637-851C-7F067A4F52F4}" type="datetimeFigureOut">
               <a:rPr lang="de-DE" smtClean="0"/>
-              <a:t>23.04.2020</a:t>
+              <a:t>04.05.2020</a:t>
             </a:fld>
             <a:endParaRPr lang="de-DE"/>
           </a:p>
@@ -598,7 +597,7 @@
           <a:p>
             <a:fld id="{93CA9FAC-B7E5-4637-851C-7F067A4F52F4}" type="datetimeFigureOut">
               <a:rPr lang="de-DE" smtClean="0"/>
-              <a:t>23.04.2020</a:t>
+              <a:t>04.05.2020</a:t>
             </a:fld>
             <a:endParaRPr lang="de-DE"/>
           </a:p>
@@ -768,7 +767,7 @@
           <a:p>
             <a:fld id="{93CA9FAC-B7E5-4637-851C-7F067A4F52F4}" type="datetimeFigureOut">
               <a:rPr lang="de-DE" smtClean="0"/>
-              <a:t>23.04.2020</a:t>
+              <a:t>04.05.2020</a:t>
             </a:fld>
             <a:endParaRPr lang="de-DE"/>
           </a:p>
@@ -1014,7 +1013,7 @@
           <a:p>
             <a:fld id="{93CA9FAC-B7E5-4637-851C-7F067A4F52F4}" type="datetimeFigureOut">
               <a:rPr lang="de-DE" smtClean="0"/>
-              <a:t>23.04.2020</a:t>
+              <a:t>04.05.2020</a:t>
             </a:fld>
             <a:endParaRPr lang="de-DE"/>
           </a:p>
@@ -1246,7 +1245,7 @@
           <a:p>
             <a:fld id="{93CA9FAC-B7E5-4637-851C-7F067A4F52F4}" type="datetimeFigureOut">
               <a:rPr lang="de-DE" smtClean="0"/>
-              <a:t>23.04.2020</a:t>
+              <a:t>04.05.2020</a:t>
             </a:fld>
             <a:endParaRPr lang="de-DE"/>
           </a:p>
@@ -1613,7 +1612,7 @@
           <a:p>
             <a:fld id="{93CA9FAC-B7E5-4637-851C-7F067A4F52F4}" type="datetimeFigureOut">
               <a:rPr lang="de-DE" smtClean="0"/>
-              <a:t>23.04.2020</a:t>
+              <a:t>04.05.2020</a:t>
             </a:fld>
             <a:endParaRPr lang="de-DE"/>
           </a:p>
@@ -1731,7 +1730,7 @@
           <a:p>
             <a:fld id="{93CA9FAC-B7E5-4637-851C-7F067A4F52F4}" type="datetimeFigureOut">
               <a:rPr lang="de-DE" smtClean="0"/>
-              <a:t>23.04.2020</a:t>
+              <a:t>04.05.2020</a:t>
             </a:fld>
             <a:endParaRPr lang="de-DE"/>
           </a:p>
@@ -1826,7 +1825,7 @@
           <a:p>
             <a:fld id="{93CA9FAC-B7E5-4637-851C-7F067A4F52F4}" type="datetimeFigureOut">
               <a:rPr lang="de-DE" smtClean="0"/>
-              <a:t>23.04.2020</a:t>
+              <a:t>04.05.2020</a:t>
             </a:fld>
             <a:endParaRPr lang="de-DE"/>
           </a:p>
@@ -2103,7 +2102,7 @@
           <a:p>
             <a:fld id="{93CA9FAC-B7E5-4637-851C-7F067A4F52F4}" type="datetimeFigureOut">
               <a:rPr lang="de-DE" smtClean="0"/>
-              <a:t>23.04.2020</a:t>
+              <a:t>04.05.2020</a:t>
             </a:fld>
             <a:endParaRPr lang="de-DE"/>
           </a:p>
@@ -2356,7 +2355,7 @@
           <a:p>
             <a:fld id="{93CA9FAC-B7E5-4637-851C-7F067A4F52F4}" type="datetimeFigureOut">
               <a:rPr lang="de-DE" smtClean="0"/>
-              <a:t>23.04.2020</a:t>
+              <a:t>04.05.2020</a:t>
             </a:fld>
             <a:endParaRPr lang="de-DE"/>
           </a:p>
@@ -2569,7 +2568,7 @@
           <a:p>
             <a:fld id="{93CA9FAC-B7E5-4637-851C-7F067A4F52F4}" type="datetimeFigureOut">
               <a:rPr lang="de-DE" smtClean="0"/>
-              <a:t>23.04.2020</a:t>
+              <a:t>04.05.2020</a:t>
             </a:fld>
             <a:endParaRPr lang="de-DE"/>
           </a:p>
@@ -3739,11 +3738,7 @@
             </a:r>
             <a:r>
               <a:rPr lang="de-DE" sz="800" dirty="0" smtClean="0"/>
-              <a:t> </a:t>
-            </a:r>
-            <a:r>
-              <a:rPr lang="de-DE" sz="800" dirty="0" smtClean="0"/>
-              <a:t>Messages</a:t>
+              <a:t> Messages</a:t>
             </a:r>
             <a:endParaRPr lang="de-DE" sz="800" dirty="0"/>
           </a:p>
@@ -3976,7 +3971,6 @@
               <a:rPr lang="de-DE" sz="800" dirty="0"/>
               <a:t> Messages</a:t>
             </a:r>
-            <a:endParaRPr lang="de-DE" sz="800" dirty="0"/>
           </a:p>
         </p:txBody>
       </p:sp>
@@ -4009,11 +4003,7 @@
             </a:r>
             <a:r>
               <a:rPr lang="de-DE" sz="800" dirty="0" smtClean="0"/>
-              <a:t> </a:t>
-            </a:r>
-            <a:r>
-              <a:rPr lang="de-DE" sz="800" dirty="0" smtClean="0"/>
-              <a:t>Messages</a:t>
+              <a:t> Messages</a:t>
             </a:r>
             <a:endParaRPr lang="de-DE" sz="800" dirty="0"/>
           </a:p>
@@ -6691,22 +6681,13 @@
               <a:rPr lang="de-DE" sz="800" dirty="0" smtClean="0"/>
               <a:t>8200:8200</a:t>
             </a:r>
-            <a:r>
-              <a:rPr lang="de-DE" sz="800" dirty="0" smtClean="0"/>
-              <a:t/>
-            </a:r>
             <a:br>
               <a:rPr lang="de-DE" sz="800" dirty="0" smtClean="0"/>
             </a:br>
             <a:r>
               <a:rPr lang="de-DE" sz="800" dirty="0" smtClean="0"/>
-              <a:t>apm</a:t>
-            </a:r>
-            <a:r>
-              <a:rPr lang="de-DE" sz="800" dirty="0" smtClean="0"/>
-              <a:t>-server:8200</a:t>
-            </a:r>
-            <a:endParaRPr lang="de-DE" sz="800" dirty="0" smtClean="0"/>
+              <a:t>apm-server:8200</a:t>
+            </a:r>
           </a:p>
         </p:txBody>
       </p:sp>
@@ -6860,11 +6841,7 @@
             <a:pPr algn="ctr"/>
             <a:r>
               <a:rPr lang="de-DE" sz="800" dirty="0" smtClean="0"/>
-              <a:t>prometheus</a:t>
-            </a:r>
-            <a:r>
-              <a:rPr lang="de-DE" sz="800" dirty="0" smtClean="0"/>
-              <a:t>:9090</a:t>
+              <a:t>prometheus:9090</a:t>
             </a:r>
             <a:endParaRPr lang="de-DE" sz="800" dirty="0"/>
           </a:p>
@@ -7042,7 +7019,6 @@
               <a:rPr lang="de-DE" sz="800" dirty="0" smtClean="0"/>
               <a:t>elasticsearch:9200</a:t>
             </a:r>
-            <a:endParaRPr lang="de-DE" sz="800" dirty="0" smtClean="0"/>
           </a:p>
           <a:p>
             <a:pPr algn="ctr"/>
@@ -7057,7 +7033,6 @@
               <a:rPr lang="de-DE" sz="800" dirty="0" smtClean="0"/>
               <a:t>elasticsearch:9300</a:t>
             </a:r>
-            <a:endParaRPr lang="de-DE" sz="800" dirty="0" smtClean="0"/>
           </a:p>
         </p:txBody>
       </p:sp>
@@ -7534,6 +7509,82 @@
               <a:rPr lang="de-DE" sz="800" dirty="0" smtClean="0"/>
               <a:t>kafka-exporter:9308</a:t>
             </a:r>
+          </a:p>
+        </p:txBody>
+      </p:sp>
+      <p:sp>
+        <p:nvSpPr>
+          <p:cNvPr id="48" name="Textfeld 47"/>
+          <p:cNvSpPr txBox="1"/>
+          <p:nvPr/>
+        </p:nvSpPr>
+        <p:spPr>
+          <a:xfrm>
+            <a:off x="1283111" y="3461482"/>
+            <a:ext cx="1608503" cy="338554"/>
+          </a:xfrm>
+          <a:prstGeom prst="rect">
+            <a:avLst/>
+          </a:prstGeom>
+          <a:noFill/>
+        </p:spPr>
+        <p:txBody>
+          <a:bodyPr wrap="square" rtlCol="0">
+            <a:spAutoFit/>
+          </a:bodyPr>
+          <a:lstStyle/>
+          <a:p>
+            <a:pPr algn="ctr"/>
+            <a:r>
+              <a:rPr lang="de-DE" sz="800" dirty="0" smtClean="0"/>
+              <a:t>8380:8080</a:t>
+            </a:r>
+          </a:p>
+          <a:p>
+            <a:pPr algn="ctr"/>
+            <a:r>
+              <a:rPr lang="de-DE" sz="800" dirty="0" smtClean="0"/>
+              <a:t>kafka-consumer:8080</a:t>
+            </a:r>
+            <a:endParaRPr lang="de-DE" sz="800" dirty="0"/>
+          </a:p>
+        </p:txBody>
+      </p:sp>
+      <p:sp>
+        <p:nvSpPr>
+          <p:cNvPr id="50" name="Textfeld 49"/>
+          <p:cNvSpPr txBox="1"/>
+          <p:nvPr/>
+        </p:nvSpPr>
+        <p:spPr>
+          <a:xfrm>
+            <a:off x="5841413" y="2872469"/>
+            <a:ext cx="1608503" cy="338554"/>
+          </a:xfrm>
+          <a:prstGeom prst="rect">
+            <a:avLst/>
+          </a:prstGeom>
+          <a:noFill/>
+        </p:spPr>
+        <p:txBody>
+          <a:bodyPr wrap="square" rtlCol="0">
+            <a:spAutoFit/>
+          </a:bodyPr>
+          <a:lstStyle/>
+          <a:p>
+            <a:pPr algn="ctr"/>
+            <a:r>
+              <a:rPr lang="de-DE" sz="800" dirty="0" smtClean="0"/>
+              <a:t>8280:8080</a:t>
+            </a:r>
+          </a:p>
+          <a:p>
+            <a:pPr algn="ctr"/>
+            <a:r>
+              <a:rPr lang="de-DE" sz="800" dirty="0" smtClean="0"/>
+              <a:t>kafka-producer:8080</a:t>
+            </a:r>
+            <a:endParaRPr lang="de-DE" sz="800" dirty="0"/>
           </a:p>
         </p:txBody>
       </p:sp>
@@ -7797,11 +7848,7 @@
             </a:r>
             <a:r>
               <a:rPr lang="de-DE" sz="1600" dirty="0" smtClean="0"/>
-              <a:t> Angular, Backend</a:t>
-            </a:r>
-            <a:r>
-              <a:rPr lang="de-DE" sz="1600" dirty="0" smtClean="0"/>
-              <a:t>)</a:t>
+              <a:t> Angular, Backend)</a:t>
             </a:r>
           </a:p>
           <a:p>
@@ -7886,7 +7933,7 @@
             </a:r>
             <a:r>
               <a:rPr lang="de-DE" sz="1600" dirty="0" err="1" smtClean="0"/>
-              <a:t>stacl</a:t>
+              <a:t>stack</a:t>
             </a:r>
             <a:endParaRPr lang="de-DE" sz="1600" dirty="0" smtClean="0"/>
           </a:p>
@@ -7950,7 +7997,7 @@
             </a:r>
             <a:r>
               <a:rPr lang="de-DE" dirty="0" smtClean="0"/>
-              <a:t> (1)</a:t>
+              <a:t> </a:t>
             </a:r>
             <a:endParaRPr lang="de-DE" dirty="0"/>
           </a:p>
@@ -8200,14 +8247,14 @@
           </a:p>
           <a:p>
             <a:r>
-              <a:rPr lang="de-DE" sz="2000" dirty="0" smtClean="0"/>
+              <a:rPr lang="de-DE" sz="1600" dirty="0" smtClean="0"/>
               <a:t>ELK Stack </a:t>
             </a:r>
             <a:r>
-              <a:rPr lang="de-DE" sz="2000" dirty="0" err="1" smtClean="0"/>
+              <a:rPr lang="de-DE" sz="1600" dirty="0" err="1" smtClean="0"/>
               <a:t>Exporter</a:t>
             </a:r>
-            <a:endParaRPr lang="de-DE" sz="2000" dirty="0" smtClean="0"/>
+            <a:endParaRPr lang="de-DE" sz="1600" dirty="0" smtClean="0"/>
           </a:p>
           <a:p>
             <a:pPr lvl="1"/>
@@ -8239,6 +8286,56 @@
           <a:p>
             <a:pPr lvl="1"/>
             <a:endParaRPr lang="de-DE" sz="1600" dirty="0"/>
+          </a:p>
+          <a:p>
+            <a:r>
+              <a:rPr lang="de-DE" sz="1600" dirty="0"/>
+              <a:t>NGINX </a:t>
+            </a:r>
+            <a:r>
+              <a:rPr lang="de-DE" sz="1600" dirty="0" err="1"/>
+              <a:t>Exporter</a:t>
+            </a:r>
+            <a:r>
+              <a:rPr lang="de-DE" sz="1600" dirty="0"/>
+              <a:t> via </a:t>
+            </a:r>
+            <a:r>
+              <a:rPr lang="de-DE" sz="1600" dirty="0" err="1"/>
+              <a:t>Lua</a:t>
+            </a:r>
+            <a:r>
+              <a:rPr lang="de-DE" sz="1600" dirty="0"/>
+              <a:t> Scripts </a:t>
+            </a:r>
+            <a:r>
+              <a:rPr lang="de-DE" sz="1600" dirty="0" err="1"/>
+              <a:t>for</a:t>
+            </a:r>
+            <a:r>
+              <a:rPr lang="de-DE" sz="1600" dirty="0"/>
+              <a:t> Frontend </a:t>
+            </a:r>
+          </a:p>
+          <a:p>
+            <a:endParaRPr lang="de-DE" sz="1600" dirty="0"/>
+          </a:p>
+          <a:p>
+            <a:r>
+              <a:rPr lang="de-DE" sz="1600" dirty="0"/>
+              <a:t>Kafka </a:t>
+            </a:r>
+            <a:r>
+              <a:rPr lang="de-DE" sz="1600" dirty="0" err="1"/>
+              <a:t>Exporter</a:t>
+            </a:r>
+            <a:r>
+              <a:rPr lang="de-DE" sz="1600" dirty="0"/>
+              <a:t> </a:t>
+            </a:r>
+          </a:p>
+          <a:p>
+            <a:endParaRPr lang="de-DE" sz="2000" dirty="0"/>
           </a:p>
           <a:p>
             <a:endParaRPr lang="de-DE" dirty="0"/>
@@ -8291,20 +8388,8 @@
           <a:lstStyle/>
           <a:p>
             <a:r>
-              <a:rPr lang="de-DE" dirty="0"/>
-              <a:t>Prometheus </a:t>
-            </a:r>
-            <a:r>
-              <a:rPr lang="de-DE" dirty="0" err="1"/>
-              <a:t>Exporter</a:t>
-            </a:r>
-            <a:r>
-              <a:rPr lang="de-DE" dirty="0"/>
-              <a:t> </a:t>
-            </a:r>
-            <a:r>
               <a:rPr lang="de-DE" dirty="0" smtClean="0"/>
-              <a:t>(2)</a:t>
+              <a:t>Monitoring Tools</a:t>
             </a:r>
             <a:endParaRPr lang="de-DE" dirty="0"/>
           </a:p>
@@ -8329,11 +8414,271 @@
           <a:p>
             <a:r>
               <a:rPr lang="de-DE" sz="1600" dirty="0" smtClean="0"/>
-              <a:t>Frontend in NGINX </a:t>
-            </a:r>
+              <a:t>Prometheus</a:t>
+            </a:r>
+          </a:p>
+          <a:p>
+            <a:pPr lvl="1"/>
             <a:r>
               <a:rPr lang="de-DE" sz="1600" dirty="0" err="1" smtClean="0"/>
-              <a:t>Exporter</a:t>
+              <a:t>scrapes</a:t>
+            </a:r>
+            <a:r>
+              <a:rPr lang="de-DE" sz="1600" dirty="0" smtClean="0"/>
+              <a:t> </a:t>
+            </a:r>
+            <a:r>
+              <a:rPr lang="de-DE" sz="1600" dirty="0" err="1" smtClean="0"/>
+              <a:t>targets</a:t>
+            </a:r>
+            <a:r>
+              <a:rPr lang="de-DE" sz="1600" dirty="0" smtClean="0"/>
+              <a:t> </a:t>
+            </a:r>
+            <a:r>
+              <a:rPr lang="de-DE" sz="1600" dirty="0" err="1" smtClean="0"/>
+              <a:t>configured</a:t>
+            </a:r>
+            <a:r>
+              <a:rPr lang="de-DE" sz="1600" dirty="0" smtClean="0"/>
+              <a:t> in </a:t>
+            </a:r>
+            <a:r>
+              <a:rPr lang="de-DE" sz="1600" dirty="0" err="1" smtClean="0"/>
+              <a:t>prometheus.yml</a:t>
+            </a:r>
+            <a:endParaRPr lang="de-DE" sz="1600" dirty="0" smtClean="0"/>
+          </a:p>
+          <a:p>
+            <a:pPr lvl="1"/>
+            <a:r>
+              <a:rPr lang="de-DE" sz="1600" dirty="0" err="1" smtClean="0"/>
+              <a:t>provides</a:t>
+            </a:r>
+            <a:r>
+              <a:rPr lang="de-DE" sz="1600" dirty="0" smtClean="0"/>
+              <a:t> </a:t>
+            </a:r>
+            <a:r>
+              <a:rPr lang="de-DE" sz="1600" dirty="0" err="1" smtClean="0"/>
+              <a:t>collected</a:t>
+            </a:r>
+            <a:r>
+              <a:rPr lang="de-DE" sz="1600" dirty="0" smtClean="0"/>
+              <a:t> </a:t>
+            </a:r>
+            <a:r>
+              <a:rPr lang="de-DE" sz="1600" dirty="0" err="1" smtClean="0"/>
+              <a:t>metrics</a:t>
+            </a:r>
+            <a:r>
+              <a:rPr lang="de-DE" sz="1600" dirty="0" smtClean="0"/>
+              <a:t> </a:t>
+            </a:r>
+            <a:r>
+              <a:rPr lang="de-DE" sz="1600" dirty="0" err="1" smtClean="0"/>
+              <a:t>to</a:t>
+            </a:r>
+            <a:r>
+              <a:rPr lang="de-DE" sz="1600" dirty="0" smtClean="0"/>
+              <a:t> </a:t>
+            </a:r>
+            <a:r>
+              <a:rPr lang="de-DE" sz="1600" dirty="0" err="1" smtClean="0"/>
+              <a:t>Grafana</a:t>
+            </a:r>
+            <a:endParaRPr lang="de-DE" sz="1600" dirty="0" smtClean="0"/>
+          </a:p>
+          <a:p>
+            <a:pPr lvl="1"/>
+            <a:endParaRPr lang="de-DE" sz="1600" dirty="0"/>
+          </a:p>
+          <a:p>
+            <a:r>
+              <a:rPr lang="de-DE" sz="1600" dirty="0" smtClean="0"/>
+              <a:t>Prometheus Alert Manager</a:t>
+            </a:r>
+          </a:p>
+          <a:p>
+            <a:pPr lvl="1"/>
+            <a:r>
+              <a:rPr lang="de-DE" sz="1600" dirty="0" err="1" smtClean="0"/>
+              <a:t>Better</a:t>
+            </a:r>
+            <a:r>
+              <a:rPr lang="de-DE" sz="1600" dirty="0" smtClean="0"/>
+              <a:t> </a:t>
+            </a:r>
+            <a:r>
+              <a:rPr lang="de-DE" sz="1600" dirty="0" err="1" smtClean="0"/>
+              <a:t>way</a:t>
+            </a:r>
+            <a:r>
+              <a:rPr lang="de-DE" sz="1600" dirty="0" smtClean="0"/>
+              <a:t> </a:t>
+            </a:r>
+            <a:r>
+              <a:rPr lang="de-DE" sz="1600" dirty="0" err="1" smtClean="0"/>
+              <a:t>to</a:t>
+            </a:r>
+            <a:r>
+              <a:rPr lang="de-DE" sz="1600" dirty="0" smtClean="0"/>
+              <a:t> do </a:t>
+            </a:r>
+            <a:r>
+              <a:rPr lang="de-DE" sz="1600" dirty="0" err="1" smtClean="0"/>
+              <a:t>alerting</a:t>
+            </a:r>
+            <a:r>
+              <a:rPr lang="de-DE" sz="1600" dirty="0"/>
+              <a:t> </a:t>
+            </a:r>
+            <a:r>
+              <a:rPr lang="de-DE" sz="1600" dirty="0" err="1" smtClean="0"/>
+              <a:t>as</a:t>
+            </a:r>
+            <a:r>
+              <a:rPr lang="de-DE" sz="1600" dirty="0" smtClean="0"/>
+              <a:t> in </a:t>
+            </a:r>
+            <a:r>
+              <a:rPr lang="de-DE" sz="1600" dirty="0" err="1" smtClean="0"/>
+              <a:t>Grafana</a:t>
+            </a:r>
+            <a:r>
+              <a:rPr lang="de-DE" sz="1600" dirty="0" smtClean="0"/>
+              <a:t> –&gt; </a:t>
+            </a:r>
+            <a:r>
+              <a:rPr lang="de-DE" sz="1600" dirty="0" err="1" smtClean="0"/>
+              <a:t>more</a:t>
+            </a:r>
+            <a:r>
+              <a:rPr lang="de-DE" sz="1600" dirty="0" smtClean="0"/>
+              <a:t> </a:t>
+            </a:r>
+            <a:r>
+              <a:rPr lang="de-DE" sz="1600" dirty="0" err="1" smtClean="0"/>
+              <a:t>functionalities</a:t>
+            </a:r>
+            <a:endParaRPr lang="de-DE" sz="1600" dirty="0"/>
+          </a:p>
+          <a:p>
+            <a:pPr lvl="1"/>
+            <a:r>
+              <a:rPr lang="de-DE" sz="1600" dirty="0" err="1"/>
+              <a:t>Currently</a:t>
+            </a:r>
+            <a:r>
+              <a:rPr lang="de-DE" sz="1600" dirty="0"/>
+              <a:t> not </a:t>
+            </a:r>
+            <a:r>
+              <a:rPr lang="de-DE" sz="1600" dirty="0" err="1"/>
+              <a:t>used</a:t>
+            </a:r>
+            <a:endParaRPr lang="de-DE" sz="1600" dirty="0"/>
+          </a:p>
+          <a:p>
+            <a:pPr lvl="1"/>
+            <a:endParaRPr lang="de-DE" sz="1600" dirty="0"/>
+          </a:p>
+          <a:p>
+            <a:r>
+              <a:rPr lang="de-DE" sz="1600" dirty="0" err="1" smtClean="0"/>
+              <a:t>Grafana</a:t>
+            </a:r>
+            <a:endParaRPr lang="de-DE" sz="1600" dirty="0" smtClean="0"/>
+          </a:p>
+          <a:p>
+            <a:pPr lvl="1"/>
+            <a:r>
+              <a:rPr lang="de-DE" sz="1600" dirty="0" err="1" smtClean="0"/>
+              <a:t>Overview</a:t>
+            </a:r>
+            <a:r>
+              <a:rPr lang="de-DE" sz="1600" dirty="0" smtClean="0"/>
+              <a:t> </a:t>
+            </a:r>
+            <a:r>
+              <a:rPr lang="de-DE" sz="1600" dirty="0" err="1" smtClean="0"/>
+              <a:t>of</a:t>
+            </a:r>
+            <a:r>
+              <a:rPr lang="de-DE" sz="1600" dirty="0" smtClean="0"/>
+              <a:t> all </a:t>
+            </a:r>
+            <a:r>
+              <a:rPr lang="de-DE" sz="1600" dirty="0" err="1" smtClean="0"/>
+              <a:t>running</a:t>
+            </a:r>
+            <a:r>
+              <a:rPr lang="de-DE" sz="1600" dirty="0" smtClean="0"/>
+              <a:t> </a:t>
+            </a:r>
+            <a:r>
+              <a:rPr lang="de-DE" sz="1600" dirty="0" err="1" smtClean="0"/>
+              <a:t>services</a:t>
+            </a:r>
+            <a:r>
+              <a:rPr lang="de-DE" sz="1600" dirty="0" smtClean="0"/>
+              <a:t> (Tools </a:t>
+            </a:r>
+            <a:r>
+              <a:rPr lang="de-DE" sz="1600" dirty="0" err="1" smtClean="0"/>
+              <a:t>and</a:t>
+            </a:r>
+            <a:r>
+              <a:rPr lang="de-DE" sz="1600" dirty="0" smtClean="0"/>
+              <a:t> </a:t>
+            </a:r>
+            <a:r>
+              <a:rPr lang="de-DE" sz="1600" dirty="0" err="1" smtClean="0"/>
+              <a:t>Application</a:t>
+            </a:r>
+            <a:r>
+              <a:rPr lang="de-DE" sz="1600" dirty="0" smtClean="0"/>
+              <a:t>) such </a:t>
+            </a:r>
+            <a:r>
+              <a:rPr lang="de-DE" sz="1600" dirty="0" err="1" smtClean="0"/>
+              <a:t>as</a:t>
+            </a:r>
+            <a:r>
+              <a:rPr lang="de-DE" sz="1600" dirty="0" smtClean="0"/>
+              <a:t> </a:t>
+            </a:r>
+            <a:r>
+              <a:rPr lang="de-DE" sz="1600" dirty="0" err="1" smtClean="0"/>
+              <a:t>custom</a:t>
+            </a:r>
+            <a:r>
+              <a:rPr lang="de-DE" sz="1600" dirty="0" smtClean="0"/>
+              <a:t> </a:t>
+            </a:r>
+            <a:r>
+              <a:rPr lang="de-DE" sz="1600" dirty="0" err="1" smtClean="0"/>
+              <a:t>metrics</a:t>
+            </a:r>
+            <a:endParaRPr lang="de-DE" sz="1600" dirty="0" smtClean="0"/>
+          </a:p>
+          <a:p>
+            <a:pPr lvl="1"/>
+            <a:r>
+              <a:rPr lang="de-DE" sz="1600" dirty="0" smtClean="0"/>
+              <a:t>Basic </a:t>
+            </a:r>
+            <a:r>
+              <a:rPr lang="de-DE" sz="1600" dirty="0" err="1" smtClean="0"/>
+              <a:t>Alerting</a:t>
+            </a:r>
+            <a:r>
+              <a:rPr lang="de-DE" sz="1600" dirty="0" smtClean="0"/>
+              <a:t>, </a:t>
+            </a:r>
+            <a:r>
+              <a:rPr lang="de-DE" sz="1600" dirty="0" err="1" smtClean="0"/>
+              <a:t>done</a:t>
             </a:r>
             <a:r>
               <a:rPr lang="de-DE" sz="1600" dirty="0" smtClean="0"/>
@@ -8341,405 +8686,12 @@
             </a:r>
             <a:r>
               <a:rPr lang="de-DE" sz="1600" dirty="0" err="1" smtClean="0"/>
-              <a:t>Lua</a:t>
-            </a:r>
-            <a:r>
-              <a:rPr lang="de-DE" sz="1600" dirty="0" smtClean="0"/>
-              <a:t> Scripts</a:t>
-            </a:r>
-            <a:endParaRPr lang="de-DE" sz="1600" dirty="0"/>
-          </a:p>
-        </p:txBody>
-      </p:sp>
-    </p:spTree>
-    <p:extLst>
-      <p:ext uri="{BB962C8B-B14F-4D97-AF65-F5344CB8AC3E}">
-        <p14:creationId xmlns:p14="http://schemas.microsoft.com/office/powerpoint/2010/main" val="588240610"/>
-      </p:ext>
-    </p:extLst>
-  </p:cSld>
-  <p:clrMapOvr>
-    <a:masterClrMapping/>
-  </p:clrMapOvr>
-</p:sld>
-</file>
-
-<file path=ppt/slides/slide6.xml><?xml version="1.0" encoding="utf-8"?>
-<p:sld xmlns:a="http://schemas.openxmlformats.org/drawingml/2006/main" xmlns:r="http://schemas.openxmlformats.org/officeDocument/2006/relationships" xmlns:p="http://schemas.openxmlformats.org/presentationml/2006/main">
-  <p:cSld>
-    <p:spTree>
-      <p:nvGrpSpPr>
-        <p:cNvPr id="1" name=""/>
-        <p:cNvGrpSpPr/>
-        <p:nvPr/>
-      </p:nvGrpSpPr>
-      <p:grpSpPr>
-        <a:xfrm>
-          <a:off x="0" y="0"/>
-          <a:ext cx="0" cy="0"/>
-          <a:chOff x="0" y="0"/>
-          <a:chExt cx="0" cy="0"/>
-        </a:xfrm>
-      </p:grpSpPr>
-      <p:sp>
-        <p:nvSpPr>
-          <p:cNvPr id="2" name="Titel 1"/>
-          <p:cNvSpPr>
-            <a:spLocks noGrp="1"/>
-          </p:cNvSpPr>
-          <p:nvPr>
-            <p:ph type="title"/>
-          </p:nvPr>
-        </p:nvSpPr>
-        <p:spPr/>
-        <p:txBody>
-          <a:bodyPr/>
-          <a:lstStyle/>
-          <a:p>
-            <a:r>
-              <a:rPr lang="de-DE" dirty="0" smtClean="0"/>
-              <a:t>Monitoring Tools</a:t>
-            </a:r>
-            <a:endParaRPr lang="de-DE" dirty="0"/>
-          </a:p>
-        </p:txBody>
-      </p:sp>
-      <p:sp>
-        <p:nvSpPr>
-          <p:cNvPr id="3" name="Inhaltsplatzhalter 2"/>
-          <p:cNvSpPr>
-            <a:spLocks noGrp="1"/>
-          </p:cNvSpPr>
-          <p:nvPr>
-            <p:ph idx="1"/>
-          </p:nvPr>
-        </p:nvSpPr>
-        <p:spPr/>
-        <p:txBody>
-          <a:bodyPr>
-            <a:normAutofit/>
-          </a:bodyPr>
-          <a:lstStyle/>
-          <a:p>
-            <a:r>
-              <a:rPr lang="de-DE" sz="1600" dirty="0" smtClean="0"/>
-              <a:t>Prometheus</a:t>
-            </a:r>
-            <a:endParaRPr lang="de-DE" sz="1600" dirty="0" smtClean="0"/>
-          </a:p>
-          <a:p>
-            <a:pPr lvl="1"/>
-            <a:r>
-              <a:rPr lang="de-DE" sz="1600" dirty="0" err="1" smtClean="0"/>
-              <a:t>scrapes</a:t>
-            </a:r>
-            <a:r>
-              <a:rPr lang="de-DE" sz="1600" dirty="0" smtClean="0"/>
+              <a:t>WebHooks</a:t>
+            </a:r>
+            <a:r>
+              <a:rPr lang="de-DE" sz="1600" smtClean="0"/>
               <a:t> </a:t>
             </a:r>
-            <a:r>
-              <a:rPr lang="de-DE" sz="1600" dirty="0" err="1" smtClean="0"/>
-              <a:t>targets</a:t>
-            </a:r>
-            <a:r>
-              <a:rPr lang="de-DE" sz="1600" dirty="0" smtClean="0"/>
-              <a:t> </a:t>
-            </a:r>
-            <a:r>
-              <a:rPr lang="de-DE" sz="1600" dirty="0" err="1" smtClean="0"/>
-              <a:t>configured</a:t>
-            </a:r>
-            <a:r>
-              <a:rPr lang="de-DE" sz="1600" dirty="0" smtClean="0"/>
-              <a:t> in </a:t>
-            </a:r>
-            <a:r>
-              <a:rPr lang="de-DE" sz="1600" dirty="0" err="1" smtClean="0"/>
-              <a:t>prometheus.yml</a:t>
-            </a:r>
-            <a:endParaRPr lang="de-DE" sz="1600" dirty="0" smtClean="0"/>
-          </a:p>
-          <a:p>
-            <a:pPr lvl="1"/>
-            <a:r>
-              <a:rPr lang="de-DE" sz="1600" dirty="0" err="1" smtClean="0"/>
-              <a:t>provides</a:t>
-            </a:r>
-            <a:r>
-              <a:rPr lang="de-DE" sz="1600" dirty="0" smtClean="0"/>
-              <a:t> </a:t>
-            </a:r>
-            <a:r>
-              <a:rPr lang="de-DE" sz="1600" dirty="0" err="1" smtClean="0"/>
-              <a:t>collected</a:t>
-            </a:r>
-            <a:r>
-              <a:rPr lang="de-DE" sz="1600" dirty="0" smtClean="0"/>
-              <a:t> </a:t>
-            </a:r>
-            <a:r>
-              <a:rPr lang="de-DE" sz="1600" dirty="0" err="1" smtClean="0"/>
-              <a:t>metrics</a:t>
-            </a:r>
-            <a:r>
-              <a:rPr lang="de-DE" sz="1600" dirty="0" smtClean="0"/>
-              <a:t> </a:t>
-            </a:r>
-            <a:r>
-              <a:rPr lang="de-DE" sz="1600" dirty="0" err="1" smtClean="0"/>
-              <a:t>to</a:t>
-            </a:r>
-            <a:r>
-              <a:rPr lang="de-DE" sz="1600" dirty="0" smtClean="0"/>
-              <a:t> </a:t>
-            </a:r>
-            <a:r>
-              <a:rPr lang="de-DE" sz="1600" dirty="0" err="1" smtClean="0"/>
-              <a:t>Grafana</a:t>
-            </a:r>
-            <a:endParaRPr lang="de-DE" sz="1600" dirty="0" smtClean="0"/>
-          </a:p>
-          <a:p>
-            <a:pPr lvl="1"/>
-            <a:endParaRPr lang="de-DE" sz="1600" dirty="0"/>
-          </a:p>
-          <a:p>
-            <a:r>
-              <a:rPr lang="de-DE" sz="1600" dirty="0" smtClean="0"/>
-              <a:t>Prometheus Alert Manager</a:t>
-            </a:r>
-          </a:p>
-          <a:p>
-            <a:pPr lvl="1"/>
-            <a:r>
-              <a:rPr lang="de-DE" sz="1600" dirty="0" err="1" smtClean="0"/>
-              <a:t>Better</a:t>
-            </a:r>
-            <a:r>
-              <a:rPr lang="de-DE" sz="1600" dirty="0" smtClean="0"/>
-              <a:t> </a:t>
-            </a:r>
-            <a:r>
-              <a:rPr lang="de-DE" sz="1600" dirty="0" err="1" smtClean="0"/>
-              <a:t>way</a:t>
-            </a:r>
-            <a:r>
-              <a:rPr lang="de-DE" sz="1600" dirty="0" smtClean="0"/>
-              <a:t> </a:t>
-            </a:r>
-            <a:r>
-              <a:rPr lang="de-DE" sz="1600" dirty="0" err="1" smtClean="0"/>
-              <a:t>to</a:t>
-            </a:r>
-            <a:r>
-              <a:rPr lang="de-DE" sz="1600" dirty="0" smtClean="0"/>
-              <a:t> do </a:t>
-            </a:r>
-            <a:r>
-              <a:rPr lang="de-DE" sz="1600" dirty="0" err="1" smtClean="0"/>
-              <a:t>alerting</a:t>
-            </a:r>
-            <a:r>
-              <a:rPr lang="de-DE" sz="1600" dirty="0"/>
-              <a:t> </a:t>
-            </a:r>
-            <a:r>
-              <a:rPr lang="de-DE" sz="1600" dirty="0" err="1" smtClean="0"/>
-              <a:t>as</a:t>
-            </a:r>
-            <a:r>
-              <a:rPr lang="de-DE" sz="1600" dirty="0" smtClean="0"/>
-              <a:t> in </a:t>
-            </a:r>
-            <a:r>
-              <a:rPr lang="de-DE" sz="1600" dirty="0" err="1" smtClean="0"/>
-              <a:t>Grafana</a:t>
-            </a:r>
-            <a:r>
-              <a:rPr lang="de-DE" sz="1600" dirty="0" smtClean="0"/>
-              <a:t> –&gt; </a:t>
-            </a:r>
-            <a:r>
-              <a:rPr lang="de-DE" sz="1600" dirty="0" err="1" smtClean="0"/>
-              <a:t>more</a:t>
-            </a:r>
-            <a:r>
-              <a:rPr lang="de-DE" sz="1600" dirty="0" smtClean="0"/>
-              <a:t> </a:t>
-            </a:r>
-            <a:r>
-              <a:rPr lang="de-DE" sz="1600" dirty="0" err="1" smtClean="0"/>
-              <a:t>functionalities</a:t>
-            </a:r>
-            <a:endParaRPr lang="de-DE" sz="1600" dirty="0"/>
-          </a:p>
-          <a:p>
-            <a:pPr lvl="1"/>
-            <a:r>
-              <a:rPr lang="de-DE" sz="1600" dirty="0" err="1" smtClean="0"/>
-              <a:t>Alerting</a:t>
-            </a:r>
-            <a:r>
-              <a:rPr lang="de-DE" sz="1600" dirty="0" smtClean="0"/>
-              <a:t> </a:t>
-            </a:r>
-            <a:r>
-              <a:rPr lang="de-DE" sz="1600" dirty="0" err="1" smtClean="0"/>
-              <a:t>done</a:t>
-            </a:r>
-            <a:r>
-              <a:rPr lang="de-DE" sz="1600" dirty="0" smtClean="0"/>
-              <a:t> via </a:t>
-            </a:r>
-            <a:r>
-              <a:rPr lang="de-DE" sz="1600" dirty="0" err="1" smtClean="0"/>
-              <a:t>WebHooks</a:t>
-            </a:r>
-            <a:r>
-              <a:rPr lang="de-DE" sz="1600" dirty="0" smtClean="0"/>
-              <a:t> in </a:t>
-            </a:r>
-            <a:r>
-              <a:rPr lang="de-DE" sz="1600" dirty="0" err="1" smtClean="0"/>
-              <a:t>this</a:t>
-            </a:r>
-            <a:r>
-              <a:rPr lang="de-DE" sz="1600" dirty="0" smtClean="0"/>
-              <a:t> </a:t>
-            </a:r>
-            <a:r>
-              <a:rPr lang="de-DE" sz="1600" dirty="0" err="1" smtClean="0"/>
-              <a:t>example</a:t>
-            </a:r>
-            <a:endParaRPr lang="de-DE" sz="1600" dirty="0"/>
-          </a:p>
-          <a:p>
-            <a:r>
-              <a:rPr lang="de-DE" sz="1600" dirty="0" err="1" smtClean="0"/>
-              <a:t>Grafana</a:t>
-            </a:r>
-            <a:endParaRPr lang="de-DE" sz="1600" dirty="0" smtClean="0"/>
-          </a:p>
-          <a:p>
-            <a:pPr lvl="1"/>
-            <a:r>
-              <a:rPr lang="de-DE" sz="1600" dirty="0" err="1" smtClean="0"/>
-              <a:t>Overview</a:t>
-            </a:r>
-            <a:r>
-              <a:rPr lang="de-DE" sz="1600" dirty="0" smtClean="0"/>
-              <a:t> </a:t>
-            </a:r>
-            <a:r>
-              <a:rPr lang="de-DE" sz="1600" dirty="0" err="1" smtClean="0"/>
-              <a:t>of</a:t>
-            </a:r>
-            <a:r>
-              <a:rPr lang="de-DE" sz="1600" dirty="0" smtClean="0"/>
-              <a:t> all </a:t>
-            </a:r>
-            <a:r>
-              <a:rPr lang="de-DE" sz="1600" dirty="0" err="1" smtClean="0"/>
-              <a:t>running</a:t>
-            </a:r>
-            <a:r>
-              <a:rPr lang="de-DE" sz="1600" dirty="0" smtClean="0"/>
-              <a:t> </a:t>
-            </a:r>
-            <a:r>
-              <a:rPr lang="de-DE" sz="1600" dirty="0" err="1" smtClean="0"/>
-              <a:t>services</a:t>
-            </a:r>
-            <a:r>
-              <a:rPr lang="de-DE" sz="1600" dirty="0" smtClean="0"/>
-              <a:t> (Tools </a:t>
-            </a:r>
-            <a:r>
-              <a:rPr lang="de-DE" sz="1600" dirty="0" err="1" smtClean="0"/>
-              <a:t>and</a:t>
-            </a:r>
-            <a:r>
-              <a:rPr lang="de-DE" sz="1600" dirty="0" smtClean="0"/>
-              <a:t> </a:t>
-            </a:r>
-            <a:r>
-              <a:rPr lang="de-DE" sz="1600" dirty="0" err="1" smtClean="0"/>
-              <a:t>Application</a:t>
-            </a:r>
-            <a:r>
-              <a:rPr lang="de-DE" sz="1600" dirty="0" smtClean="0"/>
-              <a:t>) such </a:t>
-            </a:r>
-            <a:r>
-              <a:rPr lang="de-DE" sz="1600" dirty="0" err="1" smtClean="0"/>
-              <a:t>as</a:t>
-            </a:r>
-            <a:r>
-              <a:rPr lang="de-DE" sz="1600" dirty="0" smtClean="0"/>
-              <a:t> </a:t>
-            </a:r>
-            <a:r>
-              <a:rPr lang="de-DE" sz="1600" dirty="0" err="1" smtClean="0"/>
-              <a:t>custom</a:t>
-            </a:r>
-            <a:r>
-              <a:rPr lang="de-DE" sz="1600" dirty="0" smtClean="0"/>
-              <a:t> </a:t>
-            </a:r>
-            <a:r>
-              <a:rPr lang="de-DE" sz="1600" dirty="0" err="1" smtClean="0"/>
-              <a:t>metrics</a:t>
-            </a:r>
-            <a:endParaRPr lang="de-DE" sz="1600" dirty="0" smtClean="0"/>
-          </a:p>
-          <a:p>
-            <a:pPr lvl="1"/>
-            <a:r>
-              <a:rPr lang="de-DE" sz="1600" dirty="0" smtClean="0"/>
-              <a:t>Basic </a:t>
-            </a:r>
-            <a:r>
-              <a:rPr lang="de-DE" sz="1600" dirty="0" err="1" smtClean="0"/>
-              <a:t>Alerting</a:t>
-            </a:r>
-            <a:r>
-              <a:rPr lang="de-DE" sz="1600" dirty="0" smtClean="0"/>
-              <a:t>, </a:t>
-            </a:r>
-            <a:r>
-              <a:rPr lang="de-DE" sz="1600" dirty="0" err="1" smtClean="0"/>
-              <a:t>done</a:t>
-            </a:r>
-            <a:r>
-              <a:rPr lang="de-DE" sz="1600" dirty="0" smtClean="0"/>
-              <a:t> via </a:t>
-            </a:r>
-            <a:r>
-              <a:rPr lang="de-DE" sz="1600" dirty="0" err="1" smtClean="0"/>
-              <a:t>WebHooks</a:t>
-            </a:r>
-            <a:r>
-              <a:rPr lang="de-DE" sz="1600" dirty="0" smtClean="0"/>
-              <a:t> in </a:t>
-            </a:r>
-            <a:r>
-              <a:rPr lang="de-DE" sz="1600" dirty="0" err="1" smtClean="0"/>
-              <a:t>this</a:t>
-            </a:r>
-            <a:r>
-              <a:rPr lang="de-DE" sz="1600" dirty="0" smtClean="0"/>
-              <a:t> </a:t>
-            </a:r>
-            <a:r>
-              <a:rPr lang="de-DE" sz="1600" dirty="0" err="1" smtClean="0"/>
-              <a:t>example</a:t>
-            </a:r>
-            <a:endParaRPr lang="de-DE" sz="1600" dirty="0"/>
-          </a:p>
-          <a:p>
-            <a:pPr marL="0" indent="0">
-              <a:buNone/>
-            </a:pPr>
             <a:endParaRPr lang="de-DE" sz="1600" dirty="0"/>
           </a:p>
         </p:txBody>

</xml_diff>

<commit_message>
refactor docker services, update readme, add prometheus alertmanager
</commit_message>
<xml_diff>
--- a/Play-Architektur.pptx
+++ b/Play-Architektur.pptx
@@ -10,6 +10,7 @@
     <p:sldId id="259" r:id="rId4"/>
     <p:sldId id="262" r:id="rId5"/>
     <p:sldId id="257" r:id="rId6"/>
+    <p:sldId id="263" r:id="rId7"/>
   </p:sldIdLst>
   <p:sldSz cx="12192000" cy="6858000"/>
   <p:notesSz cx="6858000" cy="9144000"/>
@@ -158,10 +159,9 @@
           </a:lstStyle>
           <a:p>
             <a:r>
-              <a:rPr lang="de-DE" smtClean="0"/>
+              <a:rPr lang="de-DE"/>
               <a:t>Titelmasterformat durch Klicken bearbeiten</a:t>
             </a:r>
-            <a:endParaRPr lang="de-DE"/>
           </a:p>
         </p:txBody>
       </p:sp>
@@ -223,10 +223,9 @@
           </a:lstStyle>
           <a:p>
             <a:r>
-              <a:rPr lang="de-DE" smtClean="0"/>
+              <a:rPr lang="de-DE"/>
               <a:t>Formatvorlage des Untertitelmasters durch Klicken bearbeiten</a:t>
             </a:r>
-            <a:endParaRPr lang="de-DE"/>
           </a:p>
         </p:txBody>
       </p:sp>
@@ -247,7 +246,7 @@
           <a:p>
             <a:fld id="{93CA9FAC-B7E5-4637-851C-7F067A4F52F4}" type="datetimeFigureOut">
               <a:rPr lang="de-DE" smtClean="0"/>
-              <a:t>04.05.2020</a:t>
+              <a:t>10.06.2020</a:t>
             </a:fld>
             <a:endParaRPr lang="de-DE"/>
           </a:p>
@@ -341,10 +340,9 @@
           <a:lstStyle/>
           <a:p>
             <a:r>
-              <a:rPr lang="de-DE" smtClean="0"/>
+              <a:rPr lang="de-DE"/>
               <a:t>Titelmasterformat durch Klicken bearbeiten</a:t>
             </a:r>
-            <a:endParaRPr lang="de-DE"/>
           </a:p>
         </p:txBody>
       </p:sp>
@@ -365,38 +363,37 @@
           <a:p>
             <a:pPr lvl="0"/>
             <a:r>
-              <a:rPr lang="de-DE" smtClean="0"/>
+              <a:rPr lang="de-DE"/>
               <a:t>Formatvorlagen des Textmasters bearbeiten</a:t>
             </a:r>
           </a:p>
           <a:p>
             <a:pPr lvl="1"/>
             <a:r>
-              <a:rPr lang="de-DE" smtClean="0"/>
+              <a:rPr lang="de-DE"/>
               <a:t>Zweite Ebene</a:t>
             </a:r>
           </a:p>
           <a:p>
             <a:pPr lvl="2"/>
             <a:r>
-              <a:rPr lang="de-DE" smtClean="0"/>
+              <a:rPr lang="de-DE"/>
               <a:t>Dritte Ebene</a:t>
             </a:r>
           </a:p>
           <a:p>
             <a:pPr lvl="3"/>
             <a:r>
-              <a:rPr lang="de-DE" smtClean="0"/>
+              <a:rPr lang="de-DE"/>
               <a:t>Vierte Ebene</a:t>
             </a:r>
           </a:p>
           <a:p>
             <a:pPr lvl="4"/>
             <a:r>
-              <a:rPr lang="de-DE" smtClean="0"/>
+              <a:rPr lang="de-DE"/>
               <a:t>Fünfte Ebene</a:t>
             </a:r>
-            <a:endParaRPr lang="de-DE"/>
           </a:p>
         </p:txBody>
       </p:sp>
@@ -417,7 +414,7 @@
           <a:p>
             <a:fld id="{93CA9FAC-B7E5-4637-851C-7F067A4F52F4}" type="datetimeFigureOut">
               <a:rPr lang="de-DE" smtClean="0"/>
-              <a:t>04.05.2020</a:t>
+              <a:t>10.06.2020</a:t>
             </a:fld>
             <a:endParaRPr lang="de-DE"/>
           </a:p>
@@ -516,10 +513,9 @@
           <a:lstStyle/>
           <a:p>
             <a:r>
-              <a:rPr lang="de-DE" smtClean="0"/>
+              <a:rPr lang="de-DE"/>
               <a:t>Titelmasterformat durch Klicken bearbeiten</a:t>
             </a:r>
-            <a:endParaRPr lang="de-DE"/>
           </a:p>
         </p:txBody>
       </p:sp>
@@ -545,38 +541,37 @@
           <a:p>
             <a:pPr lvl="0"/>
             <a:r>
-              <a:rPr lang="de-DE" smtClean="0"/>
+              <a:rPr lang="de-DE"/>
               <a:t>Formatvorlagen des Textmasters bearbeiten</a:t>
             </a:r>
           </a:p>
           <a:p>
             <a:pPr lvl="1"/>
             <a:r>
-              <a:rPr lang="de-DE" smtClean="0"/>
+              <a:rPr lang="de-DE"/>
               <a:t>Zweite Ebene</a:t>
             </a:r>
           </a:p>
           <a:p>
             <a:pPr lvl="2"/>
             <a:r>
-              <a:rPr lang="de-DE" smtClean="0"/>
+              <a:rPr lang="de-DE"/>
               <a:t>Dritte Ebene</a:t>
             </a:r>
           </a:p>
           <a:p>
             <a:pPr lvl="3"/>
             <a:r>
-              <a:rPr lang="de-DE" smtClean="0"/>
+              <a:rPr lang="de-DE"/>
               <a:t>Vierte Ebene</a:t>
             </a:r>
           </a:p>
           <a:p>
             <a:pPr lvl="4"/>
             <a:r>
-              <a:rPr lang="de-DE" smtClean="0"/>
+              <a:rPr lang="de-DE"/>
               <a:t>Fünfte Ebene</a:t>
             </a:r>
-            <a:endParaRPr lang="de-DE"/>
           </a:p>
         </p:txBody>
       </p:sp>
@@ -597,7 +592,7 @@
           <a:p>
             <a:fld id="{93CA9FAC-B7E5-4637-851C-7F067A4F52F4}" type="datetimeFigureOut">
               <a:rPr lang="de-DE" smtClean="0"/>
-              <a:t>04.05.2020</a:t>
+              <a:t>10.06.2020</a:t>
             </a:fld>
             <a:endParaRPr lang="de-DE"/>
           </a:p>
@@ -691,10 +686,9 @@
           <a:lstStyle/>
           <a:p>
             <a:r>
-              <a:rPr lang="de-DE" smtClean="0"/>
+              <a:rPr lang="de-DE"/>
               <a:t>Titelmasterformat durch Klicken bearbeiten</a:t>
             </a:r>
-            <a:endParaRPr lang="de-DE"/>
           </a:p>
         </p:txBody>
       </p:sp>
@@ -715,38 +709,37 @@
           <a:p>
             <a:pPr lvl="0"/>
             <a:r>
-              <a:rPr lang="de-DE" smtClean="0"/>
+              <a:rPr lang="de-DE"/>
               <a:t>Formatvorlagen des Textmasters bearbeiten</a:t>
             </a:r>
           </a:p>
           <a:p>
             <a:pPr lvl="1"/>
             <a:r>
-              <a:rPr lang="de-DE" smtClean="0"/>
+              <a:rPr lang="de-DE"/>
               <a:t>Zweite Ebene</a:t>
             </a:r>
           </a:p>
           <a:p>
             <a:pPr lvl="2"/>
             <a:r>
-              <a:rPr lang="de-DE" smtClean="0"/>
+              <a:rPr lang="de-DE"/>
               <a:t>Dritte Ebene</a:t>
             </a:r>
           </a:p>
           <a:p>
             <a:pPr lvl="3"/>
             <a:r>
-              <a:rPr lang="de-DE" smtClean="0"/>
+              <a:rPr lang="de-DE"/>
               <a:t>Vierte Ebene</a:t>
             </a:r>
           </a:p>
           <a:p>
             <a:pPr lvl="4"/>
             <a:r>
-              <a:rPr lang="de-DE" smtClean="0"/>
+              <a:rPr lang="de-DE"/>
               <a:t>Fünfte Ebene</a:t>
             </a:r>
-            <a:endParaRPr lang="de-DE"/>
           </a:p>
         </p:txBody>
       </p:sp>
@@ -767,7 +760,7 @@
           <a:p>
             <a:fld id="{93CA9FAC-B7E5-4637-851C-7F067A4F52F4}" type="datetimeFigureOut">
               <a:rPr lang="de-DE" smtClean="0"/>
-              <a:t>04.05.2020</a:t>
+              <a:t>10.06.2020</a:t>
             </a:fld>
             <a:endParaRPr lang="de-DE"/>
           </a:p>
@@ -870,10 +863,9 @@
           </a:lstStyle>
           <a:p>
             <a:r>
-              <a:rPr lang="de-DE" smtClean="0"/>
+              <a:rPr lang="de-DE"/>
               <a:t>Titelmasterformat durch Klicken bearbeiten</a:t>
             </a:r>
-            <a:endParaRPr lang="de-DE"/>
           </a:p>
         </p:txBody>
       </p:sp>
@@ -990,7 +982,7 @@
           <a:p>
             <a:pPr lvl="0"/>
             <a:r>
-              <a:rPr lang="de-DE" smtClean="0"/>
+              <a:rPr lang="de-DE"/>
               <a:t>Formatvorlagen des Textmasters bearbeiten</a:t>
             </a:r>
           </a:p>
@@ -1013,7 +1005,7 @@
           <a:p>
             <a:fld id="{93CA9FAC-B7E5-4637-851C-7F067A4F52F4}" type="datetimeFigureOut">
               <a:rPr lang="de-DE" smtClean="0"/>
-              <a:t>04.05.2020</a:t>
+              <a:t>10.06.2020</a:t>
             </a:fld>
             <a:endParaRPr lang="de-DE"/>
           </a:p>
@@ -1107,10 +1099,9 @@
           <a:lstStyle/>
           <a:p>
             <a:r>
-              <a:rPr lang="de-DE" smtClean="0"/>
+              <a:rPr lang="de-DE"/>
               <a:t>Titelmasterformat durch Klicken bearbeiten</a:t>
             </a:r>
-            <a:endParaRPr lang="de-DE"/>
           </a:p>
         </p:txBody>
       </p:sp>
@@ -1136,38 +1127,37 @@
           <a:p>
             <a:pPr lvl="0"/>
             <a:r>
-              <a:rPr lang="de-DE" smtClean="0"/>
+              <a:rPr lang="de-DE"/>
               <a:t>Formatvorlagen des Textmasters bearbeiten</a:t>
             </a:r>
           </a:p>
           <a:p>
             <a:pPr lvl="1"/>
             <a:r>
-              <a:rPr lang="de-DE" smtClean="0"/>
+              <a:rPr lang="de-DE"/>
               <a:t>Zweite Ebene</a:t>
             </a:r>
           </a:p>
           <a:p>
             <a:pPr lvl="2"/>
             <a:r>
-              <a:rPr lang="de-DE" smtClean="0"/>
+              <a:rPr lang="de-DE"/>
               <a:t>Dritte Ebene</a:t>
             </a:r>
           </a:p>
           <a:p>
             <a:pPr lvl="3"/>
             <a:r>
-              <a:rPr lang="de-DE" smtClean="0"/>
+              <a:rPr lang="de-DE"/>
               <a:t>Vierte Ebene</a:t>
             </a:r>
           </a:p>
           <a:p>
             <a:pPr lvl="4"/>
             <a:r>
-              <a:rPr lang="de-DE" smtClean="0"/>
+              <a:rPr lang="de-DE"/>
               <a:t>Fünfte Ebene</a:t>
             </a:r>
-            <a:endParaRPr lang="de-DE"/>
           </a:p>
         </p:txBody>
       </p:sp>
@@ -1193,38 +1183,37 @@
           <a:p>
             <a:pPr lvl="0"/>
             <a:r>
-              <a:rPr lang="de-DE" smtClean="0"/>
+              <a:rPr lang="de-DE"/>
               <a:t>Formatvorlagen des Textmasters bearbeiten</a:t>
             </a:r>
           </a:p>
           <a:p>
             <a:pPr lvl="1"/>
             <a:r>
-              <a:rPr lang="de-DE" smtClean="0"/>
+              <a:rPr lang="de-DE"/>
               <a:t>Zweite Ebene</a:t>
             </a:r>
           </a:p>
           <a:p>
             <a:pPr lvl="2"/>
             <a:r>
-              <a:rPr lang="de-DE" smtClean="0"/>
+              <a:rPr lang="de-DE"/>
               <a:t>Dritte Ebene</a:t>
             </a:r>
           </a:p>
           <a:p>
             <a:pPr lvl="3"/>
             <a:r>
-              <a:rPr lang="de-DE" smtClean="0"/>
+              <a:rPr lang="de-DE"/>
               <a:t>Vierte Ebene</a:t>
             </a:r>
           </a:p>
           <a:p>
             <a:pPr lvl="4"/>
             <a:r>
-              <a:rPr lang="de-DE" smtClean="0"/>
+              <a:rPr lang="de-DE"/>
               <a:t>Fünfte Ebene</a:t>
             </a:r>
-            <a:endParaRPr lang="de-DE"/>
           </a:p>
         </p:txBody>
       </p:sp>
@@ -1245,7 +1234,7 @@
           <a:p>
             <a:fld id="{93CA9FAC-B7E5-4637-851C-7F067A4F52F4}" type="datetimeFigureOut">
               <a:rPr lang="de-DE" smtClean="0"/>
-              <a:t>04.05.2020</a:t>
+              <a:t>10.06.2020</a:t>
             </a:fld>
             <a:endParaRPr lang="de-DE"/>
           </a:p>
@@ -1344,10 +1333,9 @@
           <a:lstStyle/>
           <a:p>
             <a:r>
-              <a:rPr lang="de-DE" smtClean="0"/>
+              <a:rPr lang="de-DE"/>
               <a:t>Titelmasterformat durch Klicken bearbeiten</a:t>
             </a:r>
-            <a:endParaRPr lang="de-DE"/>
           </a:p>
         </p:txBody>
       </p:sp>
@@ -1410,7 +1398,7 @@
           <a:p>
             <a:pPr lvl="0"/>
             <a:r>
-              <a:rPr lang="de-DE" smtClean="0"/>
+              <a:rPr lang="de-DE"/>
               <a:t>Formatvorlagen des Textmasters bearbeiten</a:t>
             </a:r>
           </a:p>
@@ -1438,38 +1426,37 @@
           <a:p>
             <a:pPr lvl="0"/>
             <a:r>
-              <a:rPr lang="de-DE" smtClean="0"/>
+              <a:rPr lang="de-DE"/>
               <a:t>Formatvorlagen des Textmasters bearbeiten</a:t>
             </a:r>
           </a:p>
           <a:p>
             <a:pPr lvl="1"/>
             <a:r>
-              <a:rPr lang="de-DE" smtClean="0"/>
+              <a:rPr lang="de-DE"/>
               <a:t>Zweite Ebene</a:t>
             </a:r>
           </a:p>
           <a:p>
             <a:pPr lvl="2"/>
             <a:r>
-              <a:rPr lang="de-DE" smtClean="0"/>
+              <a:rPr lang="de-DE"/>
               <a:t>Dritte Ebene</a:t>
             </a:r>
           </a:p>
           <a:p>
             <a:pPr lvl="3"/>
             <a:r>
-              <a:rPr lang="de-DE" smtClean="0"/>
+              <a:rPr lang="de-DE"/>
               <a:t>Vierte Ebene</a:t>
             </a:r>
           </a:p>
           <a:p>
             <a:pPr lvl="4"/>
             <a:r>
-              <a:rPr lang="de-DE" smtClean="0"/>
+              <a:rPr lang="de-DE"/>
               <a:t>Fünfte Ebene</a:t>
             </a:r>
-            <a:endParaRPr lang="de-DE"/>
           </a:p>
         </p:txBody>
       </p:sp>
@@ -1532,7 +1519,7 @@
           <a:p>
             <a:pPr lvl="0"/>
             <a:r>
-              <a:rPr lang="de-DE" smtClean="0"/>
+              <a:rPr lang="de-DE"/>
               <a:t>Formatvorlagen des Textmasters bearbeiten</a:t>
             </a:r>
           </a:p>
@@ -1560,38 +1547,37 @@
           <a:p>
             <a:pPr lvl="0"/>
             <a:r>
-              <a:rPr lang="de-DE" smtClean="0"/>
+              <a:rPr lang="de-DE"/>
               <a:t>Formatvorlagen des Textmasters bearbeiten</a:t>
             </a:r>
           </a:p>
           <a:p>
             <a:pPr lvl="1"/>
             <a:r>
-              <a:rPr lang="de-DE" smtClean="0"/>
+              <a:rPr lang="de-DE"/>
               <a:t>Zweite Ebene</a:t>
             </a:r>
           </a:p>
           <a:p>
             <a:pPr lvl="2"/>
             <a:r>
-              <a:rPr lang="de-DE" smtClean="0"/>
+              <a:rPr lang="de-DE"/>
               <a:t>Dritte Ebene</a:t>
             </a:r>
           </a:p>
           <a:p>
             <a:pPr lvl="3"/>
             <a:r>
-              <a:rPr lang="de-DE" smtClean="0"/>
+              <a:rPr lang="de-DE"/>
               <a:t>Vierte Ebene</a:t>
             </a:r>
           </a:p>
           <a:p>
             <a:pPr lvl="4"/>
             <a:r>
-              <a:rPr lang="de-DE" smtClean="0"/>
+              <a:rPr lang="de-DE"/>
               <a:t>Fünfte Ebene</a:t>
             </a:r>
-            <a:endParaRPr lang="de-DE"/>
           </a:p>
         </p:txBody>
       </p:sp>
@@ -1612,7 +1598,7 @@
           <a:p>
             <a:fld id="{93CA9FAC-B7E5-4637-851C-7F067A4F52F4}" type="datetimeFigureOut">
               <a:rPr lang="de-DE" smtClean="0"/>
-              <a:t>04.05.2020</a:t>
+              <a:t>10.06.2020</a:t>
             </a:fld>
             <a:endParaRPr lang="de-DE"/>
           </a:p>
@@ -1706,10 +1692,9 @@
           <a:lstStyle/>
           <a:p>
             <a:r>
-              <a:rPr lang="de-DE" smtClean="0"/>
+              <a:rPr lang="de-DE"/>
               <a:t>Titelmasterformat durch Klicken bearbeiten</a:t>
             </a:r>
-            <a:endParaRPr lang="de-DE"/>
           </a:p>
         </p:txBody>
       </p:sp>
@@ -1730,7 +1715,7 @@
           <a:p>
             <a:fld id="{93CA9FAC-B7E5-4637-851C-7F067A4F52F4}" type="datetimeFigureOut">
               <a:rPr lang="de-DE" smtClean="0"/>
-              <a:t>04.05.2020</a:t>
+              <a:t>10.06.2020</a:t>
             </a:fld>
             <a:endParaRPr lang="de-DE"/>
           </a:p>
@@ -1825,7 +1810,7 @@
           <a:p>
             <a:fld id="{93CA9FAC-B7E5-4637-851C-7F067A4F52F4}" type="datetimeFigureOut">
               <a:rPr lang="de-DE" smtClean="0"/>
-              <a:t>04.05.2020</a:t>
+              <a:t>10.06.2020</a:t>
             </a:fld>
             <a:endParaRPr lang="de-DE"/>
           </a:p>
@@ -1928,10 +1913,9 @@
           </a:lstStyle>
           <a:p>
             <a:r>
-              <a:rPr lang="de-DE" smtClean="0"/>
+              <a:rPr lang="de-DE"/>
               <a:t>Titelmasterformat durch Klicken bearbeiten</a:t>
             </a:r>
-            <a:endParaRPr lang="de-DE"/>
           </a:p>
         </p:txBody>
       </p:sp>
@@ -1985,38 +1969,37 @@
           <a:p>
             <a:pPr lvl="0"/>
             <a:r>
-              <a:rPr lang="de-DE" smtClean="0"/>
+              <a:rPr lang="de-DE"/>
               <a:t>Formatvorlagen des Textmasters bearbeiten</a:t>
             </a:r>
           </a:p>
           <a:p>
             <a:pPr lvl="1"/>
             <a:r>
-              <a:rPr lang="de-DE" smtClean="0"/>
+              <a:rPr lang="de-DE"/>
               <a:t>Zweite Ebene</a:t>
             </a:r>
           </a:p>
           <a:p>
             <a:pPr lvl="2"/>
             <a:r>
-              <a:rPr lang="de-DE" smtClean="0"/>
+              <a:rPr lang="de-DE"/>
               <a:t>Dritte Ebene</a:t>
             </a:r>
           </a:p>
           <a:p>
             <a:pPr lvl="3"/>
             <a:r>
-              <a:rPr lang="de-DE" smtClean="0"/>
+              <a:rPr lang="de-DE"/>
               <a:t>Vierte Ebene</a:t>
             </a:r>
           </a:p>
           <a:p>
             <a:pPr lvl="4"/>
             <a:r>
-              <a:rPr lang="de-DE" smtClean="0"/>
+              <a:rPr lang="de-DE"/>
               <a:t>Fünfte Ebene</a:t>
             </a:r>
-            <a:endParaRPr lang="de-DE"/>
           </a:p>
         </p:txBody>
       </p:sp>
@@ -2079,7 +2062,7 @@
           <a:p>
             <a:pPr lvl="0"/>
             <a:r>
-              <a:rPr lang="de-DE" smtClean="0"/>
+              <a:rPr lang="de-DE"/>
               <a:t>Formatvorlagen des Textmasters bearbeiten</a:t>
             </a:r>
           </a:p>
@@ -2102,7 +2085,7 @@
           <a:p>
             <a:fld id="{93CA9FAC-B7E5-4637-851C-7F067A4F52F4}" type="datetimeFigureOut">
               <a:rPr lang="de-DE" smtClean="0"/>
-              <a:t>04.05.2020</a:t>
+              <a:t>10.06.2020</a:t>
             </a:fld>
             <a:endParaRPr lang="de-DE"/>
           </a:p>
@@ -2205,10 +2188,9 @@
           </a:lstStyle>
           <a:p>
             <a:r>
-              <a:rPr lang="de-DE" smtClean="0"/>
+              <a:rPr lang="de-DE"/>
               <a:t>Titelmasterformat durch Klicken bearbeiten</a:t>
             </a:r>
-            <a:endParaRPr lang="de-DE"/>
           </a:p>
         </p:txBody>
       </p:sp>
@@ -2332,7 +2314,7 @@
           <a:p>
             <a:pPr lvl="0"/>
             <a:r>
-              <a:rPr lang="de-DE" smtClean="0"/>
+              <a:rPr lang="de-DE"/>
               <a:t>Formatvorlagen des Textmasters bearbeiten</a:t>
             </a:r>
           </a:p>
@@ -2355,7 +2337,7 @@
           <a:p>
             <a:fld id="{93CA9FAC-B7E5-4637-851C-7F067A4F52F4}" type="datetimeFigureOut">
               <a:rPr lang="de-DE" smtClean="0"/>
-              <a:t>04.05.2020</a:t>
+              <a:t>10.06.2020</a:t>
             </a:fld>
             <a:endParaRPr lang="de-DE"/>
           </a:p>
@@ -2464,10 +2446,9 @@
           <a:lstStyle/>
           <a:p>
             <a:r>
-              <a:rPr lang="de-DE" smtClean="0"/>
+              <a:rPr lang="de-DE"/>
               <a:t>Titelmasterformat durch Klicken bearbeiten</a:t>
             </a:r>
-            <a:endParaRPr lang="de-DE"/>
           </a:p>
         </p:txBody>
       </p:sp>
@@ -2498,38 +2479,37 @@
           <a:p>
             <a:pPr lvl="0"/>
             <a:r>
-              <a:rPr lang="de-DE" smtClean="0"/>
+              <a:rPr lang="de-DE"/>
               <a:t>Formatvorlagen des Textmasters bearbeiten</a:t>
             </a:r>
           </a:p>
           <a:p>
             <a:pPr lvl="1"/>
             <a:r>
-              <a:rPr lang="de-DE" smtClean="0"/>
+              <a:rPr lang="de-DE"/>
               <a:t>Zweite Ebene</a:t>
             </a:r>
           </a:p>
           <a:p>
             <a:pPr lvl="2"/>
             <a:r>
-              <a:rPr lang="de-DE" smtClean="0"/>
+              <a:rPr lang="de-DE"/>
               <a:t>Dritte Ebene</a:t>
             </a:r>
           </a:p>
           <a:p>
             <a:pPr lvl="3"/>
             <a:r>
-              <a:rPr lang="de-DE" smtClean="0"/>
+              <a:rPr lang="de-DE"/>
               <a:t>Vierte Ebene</a:t>
             </a:r>
           </a:p>
           <a:p>
             <a:pPr lvl="4"/>
             <a:r>
-              <a:rPr lang="de-DE" smtClean="0"/>
+              <a:rPr lang="de-DE"/>
               <a:t>Fünfte Ebene</a:t>
             </a:r>
-            <a:endParaRPr lang="de-DE"/>
           </a:p>
         </p:txBody>
       </p:sp>
@@ -2568,7 +2548,7 @@
           <a:p>
             <a:fld id="{93CA9FAC-B7E5-4637-851C-7F067A4F52F4}" type="datetimeFigureOut">
               <a:rPr lang="de-DE" smtClean="0"/>
-              <a:t>04.05.2020</a:t>
+              <a:t>10.06.2020</a:t>
             </a:fld>
             <a:endParaRPr lang="de-DE"/>
           </a:p>
@@ -3018,18 +2998,13 @@
           <a:p>
             <a:pPr algn="ctr"/>
             <a:r>
-              <a:rPr lang="de-DE" sz="1200" dirty="0" smtClean="0">
+              <a:rPr lang="de-DE" sz="1200" dirty="0">
                 <a:solidFill>
                   <a:schemeClr val="tx1"/>
                 </a:solidFill>
               </a:rPr>
               <a:t>ELK</a:t>
             </a:r>
-            <a:endParaRPr lang="de-DE" sz="1200" dirty="0">
-              <a:solidFill>
-                <a:schemeClr val="tx1"/>
-              </a:solidFill>
-            </a:endParaRPr>
           </a:p>
         </p:txBody>
       </p:sp>
@@ -3078,7 +3053,7 @@
           <a:p>
             <a:pPr algn="ctr"/>
             <a:r>
-              <a:rPr lang="de-DE" sz="1200" dirty="0" smtClean="0">
+              <a:rPr lang="de-DE" sz="1200" dirty="0">
                 <a:solidFill>
                   <a:schemeClr val="tx1"/>
                 </a:solidFill>
@@ -3133,18 +3108,13 @@
           <a:p>
             <a:pPr algn="ctr"/>
             <a:r>
-              <a:rPr lang="de-DE" sz="1200" dirty="0" smtClean="0">
+              <a:rPr lang="de-DE" sz="1200" dirty="0">
                 <a:solidFill>
                   <a:schemeClr val="tx1"/>
                 </a:solidFill>
               </a:rPr>
               <a:t>Matomo</a:t>
             </a:r>
-            <a:endParaRPr lang="de-DE" sz="1200" dirty="0">
-              <a:solidFill>
-                <a:schemeClr val="tx1"/>
-              </a:solidFill>
-            </a:endParaRPr>
           </a:p>
         </p:txBody>
       </p:sp>
@@ -3193,7 +3163,7 @@
           <a:p>
             <a:pPr algn="ctr"/>
             <a:r>
-              <a:rPr lang="de-DE" sz="1200" dirty="0" smtClean="0">
+              <a:rPr lang="de-DE" sz="1200" dirty="0">
                 <a:solidFill>
                   <a:schemeClr val="tx1"/>
                 </a:solidFill>
@@ -3248,7 +3218,7 @@
           <a:p>
             <a:pPr algn="ctr"/>
             <a:r>
-              <a:rPr lang="de-DE" sz="1200" dirty="0" smtClean="0">
+              <a:rPr lang="de-DE" sz="1200" dirty="0">
                 <a:solidFill>
                   <a:schemeClr val="tx1"/>
                 </a:solidFill>
@@ -3303,7 +3273,7 @@
           <a:p>
             <a:pPr algn="ctr"/>
             <a:r>
-              <a:rPr lang="de-DE" sz="1200" dirty="0" smtClean="0">
+              <a:rPr lang="de-DE" sz="1200" dirty="0">
                 <a:solidFill>
                   <a:schemeClr val="tx1"/>
                 </a:solidFill>
@@ -3358,7 +3328,7 @@
           <a:p>
             <a:pPr algn="ctr"/>
             <a:r>
-              <a:rPr lang="de-DE" sz="1200" dirty="0" smtClean="0">
+              <a:rPr lang="de-DE" sz="1200" dirty="0">
                 <a:solidFill>
                   <a:schemeClr val="tx1"/>
                 </a:solidFill>
@@ -3413,14 +3383,14 @@
           <a:p>
             <a:pPr algn="ctr"/>
             <a:r>
-              <a:rPr lang="de-DE" sz="1200" dirty="0" err="1" smtClean="0">
+              <a:rPr lang="de-DE" sz="1200" dirty="0" err="1">
                 <a:solidFill>
                   <a:schemeClr val="tx1"/>
                 </a:solidFill>
               </a:rPr>
               <a:t>Grafana</a:t>
             </a:r>
-            <a:endParaRPr lang="de-DE" sz="1200" dirty="0" smtClean="0">
+            <a:endParaRPr lang="de-DE" sz="1200" dirty="0">
               <a:solidFill>
                 <a:schemeClr val="tx1"/>
               </a:solidFill>
@@ -3473,7 +3443,7 @@
           <a:p>
             <a:pPr algn="ctr"/>
             <a:r>
-              <a:rPr lang="de-DE" sz="1200" dirty="0" smtClean="0">
+              <a:rPr lang="de-DE" sz="1200" dirty="0">
                 <a:solidFill>
                   <a:schemeClr val="tx1"/>
                 </a:solidFill>
@@ -3481,7 +3451,7 @@
               <a:t>Matomo Prometheus </a:t>
             </a:r>
             <a:r>
-              <a:rPr lang="de-DE" sz="1200" dirty="0" err="1" smtClean="0">
+              <a:rPr lang="de-DE" sz="1200" dirty="0" err="1">
                 <a:solidFill>
                   <a:schemeClr val="tx1"/>
                 </a:solidFill>
@@ -3553,31 +3523,31 @@
           <a:p>
             <a:pPr algn="ctr"/>
             <a:r>
-              <a:rPr lang="de-DE" sz="800" dirty="0" err="1" smtClean="0"/>
+              <a:rPr lang="de-DE" sz="800" dirty="0" err="1"/>
               <a:t>user</a:t>
             </a:r>
             <a:r>
-              <a:rPr lang="de-DE" sz="800" dirty="0" smtClean="0"/>
-              <a:t> </a:t>
-            </a:r>
-            <a:r>
-              <a:rPr lang="de-DE" sz="800" dirty="0" err="1" smtClean="0"/>
+              <a:rPr lang="de-DE" sz="800" dirty="0"/>
+              <a:t> </a:t>
+            </a:r>
+            <a:r>
+              <a:rPr lang="de-DE" sz="800" dirty="0" err="1"/>
               <a:t>activity</a:t>
             </a:r>
             <a:r>
-              <a:rPr lang="de-DE" sz="800" dirty="0" smtClean="0"/>
-              <a:t> </a:t>
-            </a:r>
-            <a:r>
-              <a:rPr lang="de-DE" sz="800" dirty="0" err="1" smtClean="0"/>
+              <a:rPr lang="de-DE" sz="800" dirty="0"/>
+              <a:t> </a:t>
+            </a:r>
+            <a:r>
+              <a:rPr lang="de-DE" sz="800" dirty="0" err="1"/>
               <a:t>tracking</a:t>
             </a:r>
             <a:r>
-              <a:rPr lang="de-DE" sz="800" dirty="0" smtClean="0"/>
-              <a:t> </a:t>
-            </a:r>
-            <a:r>
-              <a:rPr lang="de-DE" sz="800" dirty="0" err="1" smtClean="0"/>
+              <a:rPr lang="de-DE" sz="800" dirty="0"/>
+              <a:t> </a:t>
+            </a:r>
+            <a:r>
+              <a:rPr lang="de-DE" sz="800" dirty="0" err="1"/>
               <a:t>metrics</a:t>
             </a:r>
             <a:endParaRPr lang="de-DE" sz="800" dirty="0"/>
@@ -3641,35 +3611,35 @@
           <a:p>
             <a:pPr algn="ctr"/>
             <a:r>
-              <a:rPr lang="de-DE" sz="800" dirty="0" smtClean="0"/>
+              <a:rPr lang="de-DE" sz="800" dirty="0"/>
               <a:t>check </a:t>
             </a:r>
             <a:r>
-              <a:rPr lang="de-DE" sz="800" dirty="0" err="1" smtClean="0"/>
+              <a:rPr lang="de-DE" sz="800" dirty="0" err="1"/>
               <a:t>if</a:t>
             </a:r>
             <a:r>
-              <a:rPr lang="de-DE" sz="800" dirty="0" smtClean="0"/>
-              <a:t> </a:t>
-            </a:r>
-            <a:r>
-              <a:rPr lang="de-DE" sz="800" dirty="0" err="1" smtClean="0"/>
+              <a:rPr lang="de-DE" sz="800" dirty="0"/>
+              <a:t> </a:t>
+            </a:r>
+            <a:r>
+              <a:rPr lang="de-DE" sz="800" dirty="0" err="1"/>
               <a:t>Matomo</a:t>
             </a:r>
             <a:r>
-              <a:rPr lang="de-DE" sz="800" dirty="0" smtClean="0"/>
+              <a:rPr lang="de-DE" sz="800" dirty="0"/>
               <a:t> APIs </a:t>
             </a:r>
             <a:r>
-              <a:rPr lang="de-DE" sz="800" dirty="0" err="1" smtClean="0"/>
+              <a:rPr lang="de-DE" sz="800" dirty="0" err="1"/>
               <a:t>are</a:t>
             </a:r>
             <a:r>
-              <a:rPr lang="de-DE" sz="800" dirty="0" smtClean="0"/>
-              <a:t> </a:t>
-            </a:r>
-            <a:r>
-              <a:rPr lang="de-DE" sz="800" dirty="0" err="1" smtClean="0"/>
+              <a:rPr lang="de-DE" sz="800" dirty="0"/>
+              <a:t> </a:t>
+            </a:r>
+            <a:r>
+              <a:rPr lang="de-DE" sz="800" dirty="0" err="1"/>
               <a:t>available</a:t>
             </a:r>
             <a:endParaRPr lang="de-DE" sz="800" dirty="0"/>
@@ -3733,14 +3703,13 @@
           <a:p>
             <a:pPr algn="ctr"/>
             <a:r>
-              <a:rPr lang="de-DE" sz="800" dirty="0" err="1" smtClean="0"/>
+              <a:rPr lang="de-DE" sz="800" dirty="0" err="1"/>
               <a:t>Logging</a:t>
             </a:r>
             <a:r>
-              <a:rPr lang="de-DE" sz="800" dirty="0" smtClean="0"/>
+              <a:rPr lang="de-DE" sz="800" dirty="0"/>
               <a:t> Messages</a:t>
             </a:r>
-            <a:endParaRPr lang="de-DE" sz="800" dirty="0"/>
           </a:p>
         </p:txBody>
       </p:sp>
@@ -3801,11 +3770,11 @@
           <a:p>
             <a:pPr algn="ctr"/>
             <a:r>
-              <a:rPr lang="de-DE" sz="800" dirty="0" smtClean="0"/>
+              <a:rPr lang="de-DE" sz="800" dirty="0"/>
               <a:t>websocket </a:t>
             </a:r>
             <a:r>
-              <a:rPr lang="de-DE" sz="800" dirty="0" err="1" smtClean="0"/>
+              <a:rPr lang="de-DE" sz="800" dirty="0" err="1"/>
               <a:t>connection</a:t>
             </a:r>
             <a:endParaRPr lang="de-DE" sz="800" dirty="0"/>
@@ -3869,7 +3838,7 @@
           <a:p>
             <a:pPr algn="ctr"/>
             <a:r>
-              <a:rPr lang="de-DE" sz="800" dirty="0" err="1" smtClean="0"/>
+              <a:rPr lang="de-DE" sz="800" dirty="0" err="1"/>
               <a:t>subscribe</a:t>
             </a:r>
             <a:endParaRPr lang="de-DE" sz="800" dirty="0"/>
@@ -3900,7 +3869,7 @@
           <a:p>
             <a:pPr algn="ctr"/>
             <a:r>
-              <a:rPr lang="de-DE" sz="800" dirty="0" err="1" smtClean="0"/>
+              <a:rPr lang="de-DE" sz="800" dirty="0" err="1"/>
               <a:t>subscribe</a:t>
             </a:r>
             <a:endParaRPr lang="de-DE" sz="800" dirty="0"/>
@@ -3998,14 +3967,13 @@
           <a:p>
             <a:pPr algn="ctr"/>
             <a:r>
-              <a:rPr lang="de-DE" sz="800" dirty="0" err="1" smtClean="0"/>
+              <a:rPr lang="de-DE" sz="800" dirty="0" err="1"/>
               <a:t>Logging</a:t>
             </a:r>
             <a:r>
-              <a:rPr lang="de-DE" sz="800" dirty="0" smtClean="0"/>
+              <a:rPr lang="de-DE" sz="800" dirty="0"/>
               <a:t> Messages</a:t>
             </a:r>
-            <a:endParaRPr lang="de-DE" sz="800" dirty="0"/>
           </a:p>
         </p:txBody>
       </p:sp>
@@ -4132,23 +4100,23 @@
           <a:p>
             <a:pPr algn="ctr"/>
             <a:r>
-              <a:rPr lang="de-DE" sz="800" dirty="0" err="1" smtClean="0"/>
+              <a:rPr lang="de-DE" sz="800" dirty="0" err="1"/>
               <a:t>visualize</a:t>
             </a:r>
             <a:r>
-              <a:rPr lang="de-DE" sz="800" dirty="0" smtClean="0"/>
-              <a:t> </a:t>
-            </a:r>
-            <a:r>
-              <a:rPr lang="de-DE" sz="800" dirty="0" err="1" smtClean="0"/>
+              <a:rPr lang="de-DE" sz="800" dirty="0"/>
+              <a:t> </a:t>
+            </a:r>
+            <a:r>
+              <a:rPr lang="de-DE" sz="800" dirty="0" err="1"/>
               <a:t>important</a:t>
             </a:r>
             <a:r>
-              <a:rPr lang="de-DE" sz="800" dirty="0" smtClean="0"/>
-              <a:t> </a:t>
-            </a:r>
-            <a:r>
-              <a:rPr lang="de-DE" sz="800" dirty="0" err="1" smtClean="0"/>
+              <a:rPr lang="de-DE" sz="800" dirty="0"/>
+              <a:t> </a:t>
+            </a:r>
+            <a:r>
+              <a:rPr lang="de-DE" sz="800" dirty="0" err="1"/>
               <a:t>components</a:t>
             </a:r>
             <a:endParaRPr lang="de-DE" sz="800" dirty="0"/>
@@ -4212,15 +4180,15 @@
           <a:p>
             <a:pPr algn="ctr"/>
             <a:r>
-              <a:rPr lang="de-DE" sz="800" dirty="0" err="1" smtClean="0"/>
+              <a:rPr lang="de-DE" sz="800" dirty="0" err="1"/>
               <a:t>custom</a:t>
             </a:r>
             <a:r>
-              <a:rPr lang="de-DE" sz="800" dirty="0" smtClean="0"/>
-              <a:t> </a:t>
-            </a:r>
-            <a:r>
-              <a:rPr lang="de-DE" sz="800" dirty="0" err="1" smtClean="0"/>
+              <a:rPr lang="de-DE" sz="800" dirty="0"/>
+              <a:t> </a:t>
+            </a:r>
+            <a:r>
+              <a:rPr lang="de-DE" sz="800" dirty="0" err="1"/>
               <a:t>metrics</a:t>
             </a:r>
             <a:endParaRPr lang="de-DE" sz="800" dirty="0"/>
@@ -4251,15 +4219,15 @@
           <a:p>
             <a:pPr algn="ctr"/>
             <a:r>
-              <a:rPr lang="de-DE" sz="800" dirty="0" err="1" smtClean="0"/>
+              <a:rPr lang="de-DE" sz="800" dirty="0" err="1"/>
               <a:t>custom</a:t>
             </a:r>
             <a:r>
-              <a:rPr lang="de-DE" sz="800" dirty="0" smtClean="0"/>
-              <a:t> </a:t>
-            </a:r>
-            <a:r>
-              <a:rPr lang="de-DE" sz="800" dirty="0" err="1" smtClean="0"/>
+              <a:rPr lang="de-DE" sz="800" dirty="0"/>
+              <a:t> </a:t>
+            </a:r>
+            <a:r>
+              <a:rPr lang="de-DE" sz="800" dirty="0" err="1"/>
               <a:t>metrics</a:t>
             </a:r>
             <a:r>
@@ -4372,15 +4340,15 @@
           <a:p>
             <a:pPr algn="ctr"/>
             <a:r>
-              <a:rPr lang="de-DE" sz="1200" dirty="0" err="1" smtClean="0"/>
+              <a:rPr lang="de-DE" sz="1200" dirty="0" err="1"/>
               <a:t>custom</a:t>
             </a:r>
             <a:r>
-              <a:rPr lang="de-DE" sz="1200" dirty="0" smtClean="0"/>
-              <a:t> </a:t>
-            </a:r>
-            <a:r>
-              <a:rPr lang="de-DE" sz="1200" dirty="0" err="1" smtClean="0"/>
+              <a:rPr lang="de-DE" sz="1200" dirty="0"/>
+              <a:t> </a:t>
+            </a:r>
+            <a:r>
+              <a:rPr lang="de-DE" sz="1200" dirty="0" err="1"/>
               <a:t>metrics</a:t>
             </a:r>
             <a:endParaRPr lang="de-DE" sz="1200" dirty="0"/>
@@ -4411,31 +4379,31 @@
           <a:p>
             <a:pPr algn="ctr"/>
             <a:r>
-              <a:rPr lang="de-DE" sz="800" dirty="0" err="1" smtClean="0"/>
+              <a:rPr lang="de-DE" sz="800" dirty="0" err="1"/>
               <a:t>custom</a:t>
             </a:r>
             <a:r>
-              <a:rPr lang="de-DE" sz="800" dirty="0" smtClean="0"/>
-              <a:t> </a:t>
-            </a:r>
-            <a:r>
-              <a:rPr lang="de-DE" sz="800" dirty="0" err="1" smtClean="0"/>
+              <a:rPr lang="de-DE" sz="800" dirty="0"/>
+              <a:t> </a:t>
+            </a:r>
+            <a:r>
+              <a:rPr lang="de-DE" sz="800" dirty="0" err="1"/>
               <a:t>metrics</a:t>
             </a:r>
             <a:r>
-              <a:rPr lang="de-DE" sz="800" dirty="0" smtClean="0"/>
-              <a:t> </a:t>
-            </a:r>
-            <a:r>
-              <a:rPr lang="de-DE" sz="800" dirty="0" err="1" smtClean="0"/>
+              <a:rPr lang="de-DE" sz="800" dirty="0"/>
+              <a:t> </a:t>
+            </a:r>
+            <a:r>
+              <a:rPr lang="de-DE" sz="800" dirty="0" err="1"/>
               <a:t>and</a:t>
             </a:r>
             <a:r>
-              <a:rPr lang="de-DE" sz="800" dirty="0" smtClean="0"/>
-              <a:t> </a:t>
-            </a:r>
-            <a:r>
-              <a:rPr lang="de-DE" sz="800" dirty="0" err="1" smtClean="0"/>
+              <a:rPr lang="de-DE" sz="800" dirty="0"/>
+              <a:t> </a:t>
+            </a:r>
+            <a:r>
+              <a:rPr lang="de-DE" sz="800" dirty="0" err="1"/>
               <a:t>availabilty</a:t>
             </a:r>
             <a:endParaRPr lang="de-DE" sz="800" dirty="0"/>
@@ -4520,7 +4488,7 @@
           <a:p>
             <a:pPr algn="ctr"/>
             <a:r>
-              <a:rPr lang="de-DE" sz="1200" dirty="0" err="1" smtClean="0">
+              <a:rPr lang="de-DE" sz="1200" dirty="0" err="1">
                 <a:solidFill>
                   <a:schemeClr val="tx1"/>
                 </a:solidFill>
@@ -4528,7 +4496,7 @@
               <a:t>Logstash</a:t>
             </a:r>
             <a:r>
-              <a:rPr lang="de-DE" sz="1200" dirty="0" smtClean="0">
+              <a:rPr lang="de-DE" sz="1200" dirty="0">
                 <a:solidFill>
                   <a:schemeClr val="tx1"/>
                 </a:solidFill>
@@ -4536,7 +4504,7 @@
               <a:t> Prometheus </a:t>
             </a:r>
             <a:r>
-              <a:rPr lang="de-DE" sz="1200" dirty="0" err="1" smtClean="0">
+              <a:rPr lang="de-DE" sz="1200" dirty="0" err="1">
                 <a:solidFill>
                   <a:schemeClr val="tx1"/>
                 </a:solidFill>
@@ -4596,7 +4564,7 @@
           <a:p>
             <a:pPr algn="ctr"/>
             <a:r>
-              <a:rPr lang="de-DE" sz="1200" dirty="0" err="1" smtClean="0">
+              <a:rPr lang="de-DE" sz="1200" dirty="0" err="1">
                 <a:solidFill>
                   <a:schemeClr val="tx1"/>
                 </a:solidFill>
@@ -4604,7 +4572,7 @@
               <a:t>ElasticSearch</a:t>
             </a:r>
             <a:r>
-              <a:rPr lang="de-DE" sz="1200" dirty="0" smtClean="0">
+              <a:rPr lang="de-DE" sz="1200" dirty="0">
                 <a:solidFill>
                   <a:schemeClr val="tx1"/>
                 </a:solidFill>
@@ -4612,7 +4580,7 @@
               <a:t> Prometheus </a:t>
             </a:r>
             <a:r>
-              <a:rPr lang="de-DE" sz="1200" dirty="0" err="1" smtClean="0">
+              <a:rPr lang="de-DE" sz="1200" dirty="0" err="1">
                 <a:solidFill>
                   <a:schemeClr val="tx1"/>
                 </a:solidFill>
@@ -4672,7 +4640,7 @@
           <a:p>
             <a:pPr algn="ctr"/>
             <a:r>
-              <a:rPr lang="de-DE" sz="1200" dirty="0" err="1" smtClean="0">
+              <a:rPr lang="de-DE" sz="1200" dirty="0" err="1">
                 <a:solidFill>
                   <a:schemeClr val="tx1"/>
                 </a:solidFill>
@@ -4680,7 +4648,7 @@
               <a:t>Kibana</a:t>
             </a:r>
             <a:r>
-              <a:rPr lang="de-DE" sz="1200" dirty="0" smtClean="0">
+              <a:rPr lang="de-DE" sz="1200" dirty="0">
                 <a:solidFill>
                   <a:schemeClr val="tx1"/>
                 </a:solidFill>
@@ -4688,7 +4656,7 @@
               <a:t> Prometheus </a:t>
             </a:r>
             <a:r>
-              <a:rPr lang="de-DE" sz="1200" dirty="0" err="1" smtClean="0">
+              <a:rPr lang="de-DE" sz="1200" dirty="0" err="1">
                 <a:solidFill>
                   <a:schemeClr val="tx1"/>
                 </a:solidFill>
@@ -4826,15 +4794,15 @@
           <a:p>
             <a:pPr algn="ctr"/>
             <a:r>
-              <a:rPr lang="de-DE" sz="800" dirty="0" err="1" smtClean="0"/>
+              <a:rPr lang="de-DE" sz="800" dirty="0" err="1"/>
               <a:t>custom</a:t>
             </a:r>
             <a:r>
-              <a:rPr lang="de-DE" sz="800" dirty="0" smtClean="0"/>
-              <a:t> </a:t>
-            </a:r>
-            <a:r>
-              <a:rPr lang="de-DE" sz="800" dirty="0" err="1" smtClean="0"/>
+              <a:rPr lang="de-DE" sz="800" dirty="0"/>
+              <a:t> </a:t>
+            </a:r>
+            <a:r>
+              <a:rPr lang="de-DE" sz="800" dirty="0" err="1"/>
               <a:t>metrics</a:t>
             </a:r>
             <a:r>
@@ -4881,15 +4849,15 @@
           <a:p>
             <a:pPr algn="ctr"/>
             <a:r>
-              <a:rPr lang="de-DE" sz="800" dirty="0" err="1" smtClean="0"/>
+              <a:rPr lang="de-DE" sz="800" dirty="0" err="1"/>
               <a:t>custom</a:t>
             </a:r>
             <a:r>
-              <a:rPr lang="de-DE" sz="800" dirty="0" smtClean="0"/>
-              <a:t> </a:t>
-            </a:r>
-            <a:r>
-              <a:rPr lang="de-DE" sz="800" dirty="0" err="1" smtClean="0"/>
+              <a:rPr lang="de-DE" sz="800" dirty="0"/>
+              <a:t> </a:t>
+            </a:r>
+            <a:r>
+              <a:rPr lang="de-DE" sz="800" dirty="0" err="1"/>
               <a:t>metrics</a:t>
             </a:r>
             <a:r>
@@ -4936,15 +4904,15 @@
           <a:p>
             <a:pPr algn="ctr"/>
             <a:r>
-              <a:rPr lang="de-DE" sz="800" dirty="0" err="1" smtClean="0"/>
+              <a:rPr lang="de-DE" sz="800" dirty="0" err="1"/>
               <a:t>custom</a:t>
             </a:r>
             <a:r>
-              <a:rPr lang="de-DE" sz="800" dirty="0" smtClean="0"/>
-              <a:t> </a:t>
-            </a:r>
-            <a:r>
-              <a:rPr lang="de-DE" sz="800" dirty="0" err="1" smtClean="0"/>
+              <a:rPr lang="de-DE" sz="800" dirty="0"/>
+              <a:t> </a:t>
+            </a:r>
+            <a:r>
+              <a:rPr lang="de-DE" sz="800" dirty="0" err="1"/>
               <a:t>metrics</a:t>
             </a:r>
             <a:r>
@@ -4991,11 +4959,11 @@
           <a:p>
             <a:pPr algn="ctr"/>
             <a:r>
-              <a:rPr lang="de-DE" sz="800" dirty="0" smtClean="0"/>
+              <a:rPr lang="de-DE" sz="800" dirty="0"/>
               <a:t>check </a:t>
             </a:r>
             <a:r>
-              <a:rPr lang="de-DE" sz="800" dirty="0" err="1" smtClean="0"/>
+              <a:rPr lang="de-DE" sz="800" dirty="0" err="1"/>
               <a:t>availability</a:t>
             </a:r>
             <a:endParaRPr lang="de-DE" sz="800" dirty="0"/>
@@ -5026,15 +4994,15 @@
           <a:p>
             <a:pPr algn="ctr"/>
             <a:r>
-              <a:rPr lang="de-DE" sz="800" dirty="0" err="1" smtClean="0"/>
+              <a:rPr lang="de-DE" sz="800" dirty="0" err="1"/>
               <a:t>custom</a:t>
             </a:r>
             <a:r>
-              <a:rPr lang="de-DE" sz="800" dirty="0" smtClean="0"/>
-              <a:t> </a:t>
-            </a:r>
-            <a:r>
-              <a:rPr lang="de-DE" sz="800" dirty="0" err="1" smtClean="0"/>
+              <a:rPr lang="de-DE" sz="800" dirty="0"/>
+              <a:t> </a:t>
+            </a:r>
+            <a:r>
+              <a:rPr lang="de-DE" sz="800" dirty="0" err="1"/>
               <a:t>metrics</a:t>
             </a:r>
             <a:r>
@@ -5180,11 +5148,11 @@
           <a:p>
             <a:pPr algn="ctr"/>
             <a:r>
-              <a:rPr lang="de-DE" sz="800" dirty="0" smtClean="0"/>
+              <a:rPr lang="de-DE" sz="800" dirty="0"/>
               <a:t>check </a:t>
             </a:r>
             <a:r>
-              <a:rPr lang="de-DE" sz="800" dirty="0" err="1" smtClean="0"/>
+              <a:rPr lang="de-DE" sz="800" dirty="0" err="1"/>
               <a:t>availability</a:t>
             </a:r>
             <a:endParaRPr lang="de-DE" sz="800" dirty="0"/>
@@ -5215,11 +5183,11 @@
           <a:p>
             <a:pPr algn="ctr"/>
             <a:r>
-              <a:rPr lang="de-DE" sz="800" dirty="0" smtClean="0"/>
+              <a:rPr lang="de-DE" sz="800" dirty="0"/>
               <a:t>check </a:t>
             </a:r>
             <a:r>
-              <a:rPr lang="de-DE" sz="800" dirty="0" err="1" smtClean="0"/>
+              <a:rPr lang="de-DE" sz="800" dirty="0" err="1"/>
               <a:t>availability</a:t>
             </a:r>
             <a:endParaRPr lang="de-DE" sz="800" dirty="0"/>
@@ -5271,7 +5239,7 @@
           <a:p>
             <a:pPr algn="ctr"/>
             <a:r>
-              <a:rPr lang="de-DE" sz="1200" dirty="0" smtClean="0">
+              <a:rPr lang="de-DE" sz="1200" dirty="0">
                 <a:solidFill>
                   <a:schemeClr val="tx1"/>
                 </a:solidFill>
@@ -5279,14 +5247,14 @@
               <a:t>Kafka Prometheus </a:t>
             </a:r>
             <a:r>
-              <a:rPr lang="de-DE" sz="1200" dirty="0" err="1" smtClean="0">
+              <a:rPr lang="de-DE" sz="1200" dirty="0" err="1">
                 <a:solidFill>
                   <a:schemeClr val="tx1"/>
                 </a:solidFill>
               </a:rPr>
               <a:t>Exporter</a:t>
             </a:r>
-            <a:endParaRPr lang="de-DE" sz="1200" dirty="0" smtClean="0">
+            <a:endParaRPr lang="de-DE" sz="1200" dirty="0">
               <a:solidFill>
                 <a:schemeClr val="tx1"/>
               </a:solidFill>
@@ -5351,11 +5319,11 @@
           <a:p>
             <a:pPr algn="ctr"/>
             <a:r>
-              <a:rPr lang="de-DE" sz="800" dirty="0" smtClean="0"/>
+              <a:rPr lang="de-DE" sz="800" dirty="0"/>
               <a:t>check </a:t>
             </a:r>
             <a:r>
-              <a:rPr lang="de-DE" sz="800" dirty="0" err="1" smtClean="0"/>
+              <a:rPr lang="de-DE" sz="800" dirty="0" err="1"/>
               <a:t>availability</a:t>
             </a:r>
             <a:endParaRPr lang="de-DE" sz="800" dirty="0"/>
@@ -5419,15 +5387,15 @@
           <a:p>
             <a:pPr algn="ctr"/>
             <a:r>
-              <a:rPr lang="de-DE" sz="800" dirty="0" err="1" smtClean="0"/>
+              <a:rPr lang="de-DE" sz="800" dirty="0" err="1"/>
               <a:t>custom</a:t>
             </a:r>
             <a:r>
-              <a:rPr lang="de-DE" sz="800" dirty="0" smtClean="0"/>
-              <a:t> </a:t>
-            </a:r>
-            <a:r>
-              <a:rPr lang="de-DE" sz="800" dirty="0" err="1" smtClean="0"/>
+              <a:rPr lang="de-DE" sz="800" dirty="0"/>
+              <a:t> </a:t>
+            </a:r>
+            <a:r>
+              <a:rPr lang="de-DE" sz="800" dirty="0" err="1"/>
               <a:t>metrics</a:t>
             </a:r>
             <a:r>
@@ -5525,18 +5493,13 @@
           <a:p>
             <a:pPr algn="ctr"/>
             <a:r>
-              <a:rPr lang="de-DE" sz="1200" dirty="0" smtClean="0">
+              <a:rPr lang="de-DE" sz="1200" dirty="0">
                 <a:solidFill>
                   <a:schemeClr val="tx1"/>
                 </a:solidFill>
               </a:rPr>
               <a:t>ELK</a:t>
             </a:r>
-            <a:endParaRPr lang="de-DE" sz="1200" dirty="0">
-              <a:solidFill>
-                <a:schemeClr val="tx1"/>
-              </a:solidFill>
-            </a:endParaRPr>
           </a:p>
         </p:txBody>
       </p:sp>
@@ -5585,7 +5548,7 @@
           <a:p>
             <a:pPr algn="ctr"/>
             <a:r>
-              <a:rPr lang="de-DE" sz="1200" dirty="0" smtClean="0">
+              <a:rPr lang="de-DE" sz="1200" dirty="0">
                 <a:solidFill>
                   <a:schemeClr val="tx1"/>
                 </a:solidFill>
@@ -5640,18 +5603,13 @@
           <a:p>
             <a:pPr algn="ctr"/>
             <a:r>
-              <a:rPr lang="de-DE" sz="1200" dirty="0" smtClean="0">
+              <a:rPr lang="de-DE" sz="1200" dirty="0">
                 <a:solidFill>
                   <a:schemeClr val="tx1"/>
                 </a:solidFill>
               </a:rPr>
               <a:t>Matomo</a:t>
             </a:r>
-            <a:endParaRPr lang="de-DE" sz="1200" dirty="0">
-              <a:solidFill>
-                <a:schemeClr val="tx1"/>
-              </a:solidFill>
-            </a:endParaRPr>
           </a:p>
         </p:txBody>
       </p:sp>
@@ -5700,7 +5658,7 @@
           <a:p>
             <a:pPr algn="ctr"/>
             <a:r>
-              <a:rPr lang="de-DE" sz="1200" dirty="0" smtClean="0">
+              <a:rPr lang="de-DE" sz="1200" dirty="0">
                 <a:solidFill>
                   <a:schemeClr val="tx1"/>
                 </a:solidFill>
@@ -5755,7 +5713,7 @@
           <a:p>
             <a:pPr algn="ctr"/>
             <a:r>
-              <a:rPr lang="de-DE" sz="1200" dirty="0" smtClean="0">
+              <a:rPr lang="de-DE" sz="1200" dirty="0">
                 <a:solidFill>
                   <a:schemeClr val="tx1"/>
                 </a:solidFill>
@@ -5810,14 +5768,14 @@
           <a:p>
             <a:pPr algn="ctr"/>
             <a:r>
-              <a:rPr lang="de-DE" sz="1200" dirty="0" err="1" smtClean="0">
+              <a:rPr lang="de-DE" sz="1200" dirty="0" err="1">
                 <a:solidFill>
                   <a:schemeClr val="tx1"/>
                 </a:solidFill>
               </a:rPr>
               <a:t>Grafana</a:t>
             </a:r>
-            <a:endParaRPr lang="de-DE" sz="1200" dirty="0" smtClean="0">
+            <a:endParaRPr lang="de-DE" sz="1200" dirty="0">
               <a:solidFill>
                 <a:schemeClr val="tx1"/>
               </a:solidFill>
@@ -5870,7 +5828,7 @@
           <a:p>
             <a:pPr algn="ctr"/>
             <a:r>
-              <a:rPr lang="de-DE" sz="1200" dirty="0" smtClean="0">
+              <a:rPr lang="de-DE" sz="1200" dirty="0">
                 <a:solidFill>
                   <a:schemeClr val="tx1"/>
                 </a:solidFill>
@@ -5878,7 +5836,7 @@
               <a:t>Matomo Prometheus </a:t>
             </a:r>
             <a:r>
-              <a:rPr lang="de-DE" sz="1200" dirty="0" err="1" smtClean="0">
+              <a:rPr lang="de-DE" sz="1200" dirty="0" err="1">
                 <a:solidFill>
                   <a:schemeClr val="tx1"/>
                 </a:solidFill>
@@ -6268,7 +6226,7 @@
           <a:p>
             <a:pPr algn="ctr"/>
             <a:r>
-              <a:rPr lang="de-DE" sz="1200" dirty="0" err="1" smtClean="0">
+              <a:rPr lang="de-DE" sz="1200" dirty="0" err="1">
                 <a:solidFill>
                   <a:schemeClr val="tx1"/>
                 </a:solidFill>
@@ -6276,7 +6234,7 @@
               <a:t>Logstash</a:t>
             </a:r>
             <a:r>
-              <a:rPr lang="de-DE" sz="1200" dirty="0" smtClean="0">
+              <a:rPr lang="de-DE" sz="1200" dirty="0">
                 <a:solidFill>
                   <a:schemeClr val="tx1"/>
                 </a:solidFill>
@@ -6284,7 +6242,7 @@
               <a:t> Prometheus </a:t>
             </a:r>
             <a:r>
-              <a:rPr lang="de-DE" sz="1200" dirty="0" err="1" smtClean="0">
+              <a:rPr lang="de-DE" sz="1200" dirty="0" err="1">
                 <a:solidFill>
                   <a:schemeClr val="tx1"/>
                 </a:solidFill>
@@ -6344,7 +6302,7 @@
           <a:p>
             <a:pPr algn="ctr"/>
             <a:r>
-              <a:rPr lang="de-DE" sz="1200" dirty="0" err="1" smtClean="0">
+              <a:rPr lang="de-DE" sz="1200" dirty="0" err="1">
                 <a:solidFill>
                   <a:schemeClr val="tx1"/>
                 </a:solidFill>
@@ -6352,7 +6310,7 @@
               <a:t>ElasticSearch</a:t>
             </a:r>
             <a:r>
-              <a:rPr lang="de-DE" sz="1200" dirty="0" smtClean="0">
+              <a:rPr lang="de-DE" sz="1200" dirty="0">
                 <a:solidFill>
                   <a:schemeClr val="tx1"/>
                 </a:solidFill>
@@ -6360,7 +6318,7 @@
               <a:t> Prometheus </a:t>
             </a:r>
             <a:r>
-              <a:rPr lang="de-DE" sz="1200" dirty="0" err="1" smtClean="0">
+              <a:rPr lang="de-DE" sz="1200" dirty="0" err="1">
                 <a:solidFill>
                   <a:schemeClr val="tx1"/>
                 </a:solidFill>
@@ -6420,7 +6378,7 @@
           <a:p>
             <a:pPr algn="ctr"/>
             <a:r>
-              <a:rPr lang="de-DE" sz="1200" dirty="0" err="1" smtClean="0">
+              <a:rPr lang="de-DE" sz="1200" dirty="0" err="1">
                 <a:solidFill>
                   <a:schemeClr val="tx1"/>
                 </a:solidFill>
@@ -6428,7 +6386,7 @@
               <a:t>Kibana</a:t>
             </a:r>
             <a:r>
-              <a:rPr lang="de-DE" sz="1200" dirty="0" smtClean="0">
+              <a:rPr lang="de-DE" sz="1200" dirty="0">
                 <a:solidFill>
                   <a:schemeClr val="tx1"/>
                 </a:solidFill>
@@ -6436,7 +6394,7 @@
               <a:t> Prometheus </a:t>
             </a:r>
             <a:r>
-              <a:rPr lang="de-DE" sz="1200" dirty="0" err="1" smtClean="0">
+              <a:rPr lang="de-DE" sz="1200" dirty="0" err="1">
                 <a:solidFill>
                   <a:schemeClr val="tx1"/>
                 </a:solidFill>
@@ -6640,17 +6598,16 @@
           <a:p>
             <a:pPr algn="ctr"/>
             <a:r>
-              <a:rPr lang="de-DE" sz="800" dirty="0" smtClean="0"/>
+              <a:rPr lang="de-DE" sz="800" dirty="0"/>
               <a:t>7000:80</a:t>
             </a:r>
           </a:p>
           <a:p>
             <a:pPr algn="ctr"/>
             <a:r>
-              <a:rPr lang="de-DE" sz="800" dirty="0" smtClean="0"/>
+              <a:rPr lang="de-DE" sz="800" dirty="0"/>
               <a:t>web:80</a:t>
             </a:r>
-            <a:endParaRPr lang="de-DE" sz="800" dirty="0"/>
           </a:p>
         </p:txBody>
       </p:sp>
@@ -6678,14 +6635,14 @@
           <a:p>
             <a:pPr algn="ctr"/>
             <a:r>
-              <a:rPr lang="de-DE" sz="800" dirty="0" smtClean="0"/>
+              <a:rPr lang="de-DE" sz="800" dirty="0"/>
               <a:t>8200:8200</a:t>
             </a:r>
             <a:br>
-              <a:rPr lang="de-DE" sz="800" dirty="0" smtClean="0"/>
+              <a:rPr lang="de-DE" sz="800" dirty="0"/>
             </a:br>
             <a:r>
-              <a:rPr lang="de-DE" sz="800" dirty="0" smtClean="0"/>
+              <a:rPr lang="de-DE" sz="800" dirty="0"/>
               <a:t>apm-server:8200</a:t>
             </a:r>
           </a:p>
@@ -6715,17 +6672,16 @@
           <a:p>
             <a:pPr algn="ctr"/>
             <a:r>
-              <a:rPr lang="de-DE" sz="800" dirty="0" smtClean="0"/>
+              <a:rPr lang="de-DE" sz="800" dirty="0"/>
               <a:t>8180:8080</a:t>
             </a:r>
           </a:p>
           <a:p>
             <a:pPr algn="ctr"/>
             <a:r>
-              <a:rPr lang="de-DE" sz="800" dirty="0" smtClean="0"/>
+              <a:rPr lang="de-DE" sz="800" dirty="0"/>
               <a:t>matomo-exporter:8080</a:t>
             </a:r>
-            <a:endParaRPr lang="de-DE" sz="800" dirty="0"/>
           </a:p>
         </p:txBody>
       </p:sp>
@@ -6753,14 +6709,14 @@
           <a:p>
             <a:pPr algn="ctr"/>
             <a:r>
-              <a:rPr lang="de-DE" sz="800" dirty="0" smtClean="0"/>
+              <a:rPr lang="de-DE" sz="800" dirty="0"/>
               <a:t>3100:80</a:t>
             </a:r>
           </a:p>
           <a:p>
             <a:pPr algn="ctr"/>
             <a:r>
-              <a:rPr lang="de-DE" sz="800" dirty="0" smtClean="0"/>
+              <a:rPr lang="de-DE" sz="800" dirty="0"/>
               <a:t>9145:9145</a:t>
             </a:r>
           </a:p>
@@ -6768,13 +6724,8 @@
             <a:pPr algn="ctr"/>
             <a:r>
               <a:rPr lang="de-DE" sz="800" dirty="0"/>
-              <a:t>p</a:t>
-            </a:r>
-            <a:r>
-              <a:rPr lang="de-DE" sz="800" dirty="0" smtClean="0"/>
-              <a:t>layapp:9145</a:t>
-            </a:r>
-            <a:endParaRPr lang="de-DE" sz="800" dirty="0"/>
+              <a:t>playapp:9145</a:t>
+            </a:r>
           </a:p>
         </p:txBody>
       </p:sp>
@@ -6802,10 +6753,9 @@
           <a:p>
             <a:pPr algn="ctr"/>
             <a:r>
-              <a:rPr lang="de-DE" sz="800" dirty="0" smtClean="0"/>
+              <a:rPr lang="de-DE" sz="800" dirty="0"/>
               <a:t>3000:3000</a:t>
             </a:r>
-            <a:endParaRPr lang="de-DE" sz="800" dirty="0"/>
           </a:p>
         </p:txBody>
       </p:sp>
@@ -6833,17 +6783,16 @@
           <a:p>
             <a:pPr algn="ctr"/>
             <a:r>
-              <a:rPr lang="de-DE" sz="800" dirty="0" smtClean="0"/>
+              <a:rPr lang="de-DE" sz="800" dirty="0"/>
               <a:t>9090:9090</a:t>
             </a:r>
           </a:p>
           <a:p>
             <a:pPr algn="ctr"/>
             <a:r>
-              <a:rPr lang="de-DE" sz="800" dirty="0" smtClean="0"/>
+              <a:rPr lang="de-DE" sz="800" dirty="0"/>
               <a:t>prometheus:9090</a:t>
             </a:r>
-            <a:endParaRPr lang="de-DE" sz="800" dirty="0"/>
           </a:p>
         </p:txBody>
       </p:sp>
@@ -6871,17 +6820,16 @@
           <a:p>
             <a:pPr algn="ctr"/>
             <a:r>
-              <a:rPr lang="de-DE" sz="800" dirty="0" smtClean="0"/>
+              <a:rPr lang="de-DE" sz="800" dirty="0"/>
               <a:t>9114:9114</a:t>
             </a:r>
           </a:p>
           <a:p>
             <a:pPr algn="ctr"/>
             <a:r>
-              <a:rPr lang="de-DE" sz="800" dirty="0" smtClean="0"/>
+              <a:rPr lang="de-DE" sz="800" dirty="0"/>
               <a:t>elasticsearch_exporter:9114</a:t>
             </a:r>
-            <a:endParaRPr lang="de-DE" sz="800" dirty="0"/>
           </a:p>
         </p:txBody>
       </p:sp>
@@ -6909,7 +6857,7 @@
           <a:p>
             <a:pPr algn="ctr"/>
             <a:r>
-              <a:rPr lang="de-DE" sz="800" dirty="0" smtClean="0"/>
+              <a:rPr lang="de-DE" sz="800" dirty="0"/>
               <a:t>5601:5601</a:t>
             </a:r>
           </a:p>
@@ -6917,15 +6865,7 @@
             <a:pPr algn="ctr"/>
             <a:r>
               <a:rPr lang="de-DE" sz="800" dirty="0"/>
-              <a:t>l</a:t>
-            </a:r>
-            <a:r>
-              <a:rPr lang="de-DE" sz="800" dirty="0" smtClean="0"/>
-              <a:t>ocalhost:5601</a:t>
-            </a:r>
-            <a:r>
-              <a:rPr lang="de-DE" sz="800" dirty="0"/>
-              <a:t>/_</a:t>
+              <a:t>localhost:5601/_</a:t>
             </a:r>
             <a:r>
               <a:rPr lang="de-DE" sz="800" dirty="0" err="1"/>
@@ -6971,17 +6911,16 @@
           <a:p>
             <a:pPr algn="ctr"/>
             <a:r>
-              <a:rPr lang="de-DE" sz="800" dirty="0" smtClean="0"/>
+              <a:rPr lang="de-DE" sz="800" dirty="0"/>
               <a:t>9304:9304</a:t>
             </a:r>
           </a:p>
           <a:p>
             <a:pPr algn="ctr"/>
             <a:r>
-              <a:rPr lang="de-DE" sz="800" dirty="0" smtClean="0"/>
+              <a:rPr lang="de-DE" sz="800" dirty="0"/>
               <a:t>logstash_exporter:9304</a:t>
             </a:r>
-            <a:endParaRPr lang="de-DE" sz="800" dirty="0"/>
           </a:p>
         </p:txBody>
       </p:sp>
@@ -7009,28 +6948,28 @@
           <a:p>
             <a:pPr algn="ctr"/>
             <a:r>
-              <a:rPr lang="de-DE" sz="800" dirty="0" smtClean="0"/>
+              <a:rPr lang="de-DE" sz="800" dirty="0"/>
               <a:t>9200:9200</a:t>
             </a:r>
           </a:p>
           <a:p>
             <a:pPr algn="ctr"/>
             <a:r>
-              <a:rPr lang="de-DE" sz="800" dirty="0" smtClean="0"/>
+              <a:rPr lang="de-DE" sz="800" dirty="0"/>
               <a:t>elasticsearch:9200</a:t>
             </a:r>
           </a:p>
           <a:p>
             <a:pPr algn="ctr"/>
             <a:r>
-              <a:rPr lang="de-DE" sz="800" dirty="0" smtClean="0"/>
+              <a:rPr lang="de-DE" sz="800" dirty="0"/>
               <a:t>9300:9300</a:t>
             </a:r>
           </a:p>
           <a:p>
             <a:pPr algn="ctr"/>
             <a:r>
-              <a:rPr lang="de-DE" sz="800" dirty="0" smtClean="0"/>
+              <a:rPr lang="de-DE" sz="800" dirty="0"/>
               <a:t>elasticsearch:9300</a:t>
             </a:r>
           </a:p>
@@ -7060,38 +6999,38 @@
           <a:p>
             <a:pPr algn="ctr"/>
             <a:r>
-              <a:rPr lang="de-DE" sz="800" dirty="0" smtClean="0"/>
+              <a:rPr lang="de-DE" sz="800" dirty="0"/>
               <a:t>5000:5000/</a:t>
             </a:r>
             <a:r>
-              <a:rPr lang="de-DE" sz="800" dirty="0" err="1" smtClean="0"/>
+              <a:rPr lang="de-DE" sz="800" dirty="0" err="1"/>
               <a:t>tcp</a:t>
             </a:r>
-            <a:endParaRPr lang="de-DE" sz="800" dirty="0" smtClean="0"/>
+            <a:endParaRPr lang="de-DE" sz="800" dirty="0"/>
           </a:p>
           <a:p>
             <a:pPr algn="ctr"/>
             <a:r>
-              <a:rPr lang="de-DE" sz="800" dirty="0" smtClean="0"/>
+              <a:rPr lang="de-DE" sz="800" dirty="0"/>
               <a:t>5000:5000/</a:t>
             </a:r>
             <a:r>
-              <a:rPr lang="de-DE" sz="800" dirty="0" err="1" smtClean="0"/>
+              <a:rPr lang="de-DE" sz="800" dirty="0" err="1"/>
               <a:t>udp</a:t>
             </a:r>
-            <a:endParaRPr lang="de-DE" sz="800" dirty="0" smtClean="0"/>
+            <a:endParaRPr lang="de-DE" sz="800" dirty="0"/>
           </a:p>
           <a:p>
             <a:pPr algn="ctr"/>
             <a:r>
-              <a:rPr lang="de-DE" sz="800" dirty="0" smtClean="0"/>
+              <a:rPr lang="de-DE" sz="800" dirty="0"/>
               <a:t>9600:9600</a:t>
             </a:r>
           </a:p>
           <a:p>
             <a:pPr algn="ctr"/>
             <a:r>
-              <a:rPr lang="de-DE" sz="800" dirty="0" smtClean="0"/>
+              <a:rPr lang="de-DE" sz="800" dirty="0"/>
               <a:t>logstash:9600</a:t>
             </a:r>
           </a:p>
@@ -7121,7 +7060,7 @@
           <a:p>
             <a:pPr algn="ctr"/>
             <a:r>
-              <a:rPr lang="de-DE" sz="800" dirty="0" smtClean="0"/>
+              <a:rPr lang="de-DE" sz="800" dirty="0"/>
               <a:t>5601:5601</a:t>
             </a:r>
           </a:p>
@@ -7172,7 +7111,7 @@
           <a:p>
             <a:pPr algn="ctr"/>
             <a:r>
-              <a:rPr lang="de-DE" sz="1200" dirty="0" smtClean="0">
+              <a:rPr lang="de-DE" sz="1200" dirty="0">
                 <a:solidFill>
                   <a:schemeClr val="tx1"/>
                 </a:solidFill>
@@ -7180,14 +7119,14 @@
               <a:t>Kafka Prometheus </a:t>
             </a:r>
             <a:r>
-              <a:rPr lang="de-DE" sz="1200" dirty="0" err="1" smtClean="0">
+              <a:rPr lang="de-DE" sz="1200" dirty="0" err="1">
                 <a:solidFill>
                   <a:schemeClr val="tx1"/>
                 </a:solidFill>
               </a:rPr>
               <a:t>Exporter</a:t>
             </a:r>
-            <a:endParaRPr lang="de-DE" sz="1200" dirty="0" smtClean="0">
+            <a:endParaRPr lang="de-DE" sz="1200" dirty="0">
               <a:solidFill>
                 <a:schemeClr val="tx1"/>
               </a:solidFill>
@@ -7240,7 +7179,7 @@
           <a:p>
             <a:pPr algn="ctr"/>
             <a:r>
-              <a:rPr lang="de-DE" sz="1200" dirty="0" smtClean="0">
+              <a:rPr lang="de-DE" sz="1200" dirty="0">
                 <a:solidFill>
                   <a:schemeClr val="tx1"/>
                 </a:solidFill>
@@ -7394,7 +7333,7 @@
           <a:p>
             <a:pPr algn="ctr"/>
             <a:r>
-              <a:rPr lang="de-DE" sz="1200" dirty="0" smtClean="0">
+              <a:rPr lang="de-DE" sz="1200" dirty="0">
                 <a:solidFill>
                   <a:schemeClr val="tx1"/>
                 </a:solidFill>
@@ -7461,17 +7400,16 @@
           <a:p>
             <a:pPr algn="ctr"/>
             <a:r>
-              <a:rPr lang="de-DE" sz="800" dirty="0" smtClean="0"/>
+              <a:rPr lang="de-DE" sz="800" dirty="0"/>
               <a:t>9092:9092</a:t>
             </a:r>
           </a:p>
           <a:p>
             <a:pPr algn="ctr"/>
             <a:r>
-              <a:rPr lang="de-DE" sz="800" dirty="0" smtClean="0"/>
+              <a:rPr lang="de-DE" sz="800" dirty="0"/>
               <a:t>kafka:9092</a:t>
             </a:r>
-            <a:endParaRPr lang="de-DE" sz="800" dirty="0"/>
           </a:p>
         </p:txBody>
       </p:sp>
@@ -7499,14 +7437,14 @@
           <a:p>
             <a:pPr algn="ctr"/>
             <a:r>
-              <a:rPr lang="de-DE" sz="800" dirty="0" smtClean="0"/>
+              <a:rPr lang="de-DE" sz="800" dirty="0"/>
               <a:t>9308:9308</a:t>
             </a:r>
           </a:p>
           <a:p>
             <a:pPr algn="ctr"/>
             <a:r>
-              <a:rPr lang="de-DE" sz="800" dirty="0" smtClean="0"/>
+              <a:rPr lang="de-DE" sz="800" dirty="0"/>
               <a:t>kafka-exporter:9308</a:t>
             </a:r>
           </a:p>
@@ -7536,17 +7474,16 @@
           <a:p>
             <a:pPr algn="ctr"/>
             <a:r>
-              <a:rPr lang="de-DE" sz="800" dirty="0" smtClean="0"/>
+              <a:rPr lang="de-DE" sz="800" dirty="0"/>
               <a:t>8380:8080</a:t>
             </a:r>
           </a:p>
           <a:p>
             <a:pPr algn="ctr"/>
             <a:r>
-              <a:rPr lang="de-DE" sz="800" dirty="0" smtClean="0"/>
+              <a:rPr lang="de-DE" sz="800" dirty="0"/>
               <a:t>kafka-consumer:8080</a:t>
             </a:r>
-            <a:endParaRPr lang="de-DE" sz="800" dirty="0"/>
           </a:p>
         </p:txBody>
       </p:sp>
@@ -7574,20 +7511,58 @@
           <a:p>
             <a:pPr algn="ctr"/>
             <a:r>
-              <a:rPr lang="de-DE" sz="800" dirty="0" smtClean="0"/>
+              <a:rPr lang="de-DE" sz="800" dirty="0"/>
               <a:t>8280:8080</a:t>
             </a:r>
           </a:p>
           <a:p>
             <a:pPr algn="ctr"/>
             <a:r>
-              <a:rPr lang="de-DE" sz="800" dirty="0" smtClean="0"/>
+              <a:rPr lang="de-DE" sz="800" dirty="0"/>
               <a:t>kafka-producer:8080</a:t>
             </a:r>
-            <a:endParaRPr lang="de-DE" sz="800" dirty="0"/>
-          </a:p>
-        </p:txBody>
-      </p:sp>
+          </a:p>
+        </p:txBody>
+      </p:sp>
+      <p:cxnSp>
+        <p:nvCxnSpPr>
+          <p:cNvPr id="62" name="Gerade Verbindung mit Pfeil 61">
+            <a:extLst>
+              <a:ext uri="{FF2B5EF4-FFF2-40B4-BE49-F238E27FC236}">
+                <a16:creationId xmlns:a16="http://schemas.microsoft.com/office/drawing/2014/main" id="{0922DEA7-7752-4ED6-8D4B-E4E58857DBE0}"/>
+              </a:ext>
+            </a:extLst>
+          </p:cNvPr>
+          <p:cNvCxnSpPr/>
+          <p:nvPr/>
+        </p:nvCxnSpPr>
+        <p:spPr>
+          <a:xfrm flipV="1">
+            <a:off x="10964512" y="1452794"/>
+            <a:ext cx="0" cy="672870"/>
+          </a:xfrm>
+          <a:prstGeom prst="straightConnector1">
+            <a:avLst/>
+          </a:prstGeom>
+          <a:ln>
+            <a:tailEnd type="triangle"/>
+          </a:ln>
+        </p:spPr>
+        <p:style>
+          <a:lnRef idx="1">
+            <a:schemeClr val="accent1"/>
+          </a:lnRef>
+          <a:fillRef idx="0">
+            <a:schemeClr val="accent1"/>
+          </a:fillRef>
+          <a:effectRef idx="0">
+            <a:schemeClr val="accent1"/>
+          </a:effectRef>
+          <a:fontRef idx="minor">
+            <a:schemeClr val="tx1"/>
+          </a:fontRef>
+        </p:style>
+      </p:cxnSp>
     </p:spTree>
     <p:extLst>
       <p:ext uri="{BB962C8B-B14F-4D97-AF65-F5344CB8AC3E}">
@@ -7634,10 +7609,9 @@
           <a:lstStyle/>
           <a:p>
             <a:r>
-              <a:rPr lang="de-DE" dirty="0" smtClean="0"/>
+              <a:rPr lang="de-DE" dirty="0"/>
               <a:t>ELK Stack</a:t>
             </a:r>
-            <a:endParaRPr lang="de-DE" dirty="0"/>
           </a:p>
         </p:txBody>
       </p:sp>
@@ -7659,85 +7633,85 @@
           <a:lstStyle/>
           <a:p>
             <a:r>
-              <a:rPr lang="de-DE" sz="1600" dirty="0" err="1" smtClean="0"/>
+              <a:rPr lang="de-DE" sz="1600" dirty="0" err="1"/>
               <a:t>Logging</a:t>
             </a:r>
             <a:r>
-              <a:rPr lang="de-DE" sz="1600" dirty="0" smtClean="0"/>
+              <a:rPr lang="de-DE" sz="1600" dirty="0"/>
               <a:t> Messages </a:t>
             </a:r>
             <a:r>
-              <a:rPr lang="de-DE" sz="1600" dirty="0" err="1" smtClean="0"/>
+              <a:rPr lang="de-DE" sz="1600" dirty="0" err="1"/>
               <a:t>for</a:t>
             </a:r>
             <a:r>
-              <a:rPr lang="de-DE" sz="1600" dirty="0" smtClean="0"/>
+              <a:rPr lang="de-DE" sz="1600" dirty="0"/>
               <a:t> all </a:t>
             </a:r>
             <a:r>
-              <a:rPr lang="de-DE" sz="1600" dirty="0" err="1" smtClean="0"/>
+              <a:rPr lang="de-DE" sz="1600" dirty="0" err="1"/>
               <a:t>applications</a:t>
             </a:r>
             <a:r>
-              <a:rPr lang="de-DE" sz="1600" dirty="0" smtClean="0"/>
-              <a:t> </a:t>
-            </a:r>
-            <a:r>
-              <a:rPr lang="de-DE" sz="1600" dirty="0" err="1" smtClean="0"/>
+              <a:rPr lang="de-DE" sz="1600" dirty="0"/>
+              <a:t> </a:t>
+            </a:r>
+            <a:r>
+              <a:rPr lang="de-DE" sz="1600" dirty="0" err="1"/>
               <a:t>and</a:t>
             </a:r>
             <a:r>
-              <a:rPr lang="de-DE" sz="1600" dirty="0" smtClean="0"/>
-              <a:t> </a:t>
-            </a:r>
-            <a:r>
-              <a:rPr lang="de-DE" sz="1600" dirty="0" err="1" smtClean="0"/>
+              <a:rPr lang="de-DE" sz="1600" dirty="0"/>
+              <a:t> </a:t>
+            </a:r>
+            <a:r>
+              <a:rPr lang="de-DE" sz="1600" dirty="0" err="1"/>
               <a:t>tools</a:t>
             </a:r>
-            <a:endParaRPr lang="de-DE" sz="1600" dirty="0" smtClean="0"/>
+            <a:endParaRPr lang="de-DE" sz="1600" dirty="0"/>
           </a:p>
           <a:p>
             <a:pPr lvl="1"/>
             <a:r>
-              <a:rPr lang="de-DE" sz="1600" dirty="0" smtClean="0"/>
+              <a:rPr lang="de-DE" sz="1600" dirty="0"/>
               <a:t>NGINX Container (</a:t>
             </a:r>
             <a:r>
-              <a:rPr lang="de-DE" sz="1600" dirty="0" err="1" smtClean="0"/>
+              <a:rPr lang="de-DE" sz="1600" dirty="0" err="1"/>
               <a:t>Matomo</a:t>
             </a:r>
             <a:r>
-              <a:rPr lang="de-DE" sz="1600" dirty="0" smtClean="0"/>
+              <a:rPr lang="de-DE" sz="1600" dirty="0"/>
               <a:t>, Angular)</a:t>
             </a:r>
           </a:p>
           <a:p>
             <a:pPr lvl="1"/>
             <a:r>
-              <a:rPr lang="de-DE" sz="1600" dirty="0" smtClean="0"/>
+              <a:rPr lang="de-DE" sz="1600" dirty="0"/>
               <a:t>Tools (</a:t>
             </a:r>
             <a:r>
-              <a:rPr lang="de-DE" sz="1600" dirty="0" err="1" smtClean="0"/>
+              <a:rPr lang="de-DE" sz="1600" dirty="0" err="1"/>
               <a:t>Grafana</a:t>
             </a:r>
             <a:r>
-              <a:rPr lang="de-DE" sz="1600" dirty="0" smtClean="0"/>
+              <a:rPr lang="de-DE" sz="1600" dirty="0"/>
               <a:t>, Prometheus)</a:t>
             </a:r>
           </a:p>
           <a:p>
             <a:pPr lvl="1"/>
             <a:r>
-              <a:rPr lang="de-DE" sz="1600" dirty="0" smtClean="0"/>
+              <a:rPr lang="de-DE" sz="1600" dirty="0"/>
               <a:t>Apps (Producer, Consumer, </a:t>
             </a:r>
             <a:r>
-              <a:rPr lang="de-DE" sz="1600" dirty="0" err="1" smtClean="0"/>
+              <a:rPr lang="de-DE" sz="1600" dirty="0" err="1"/>
               <a:t>Exporter</a:t>
             </a:r>
             <a:r>
-              <a:rPr lang="de-DE" sz="1600" dirty="0" smtClean="0"/>
+              <a:rPr lang="de-DE" sz="1600" dirty="0"/>
               <a:t>)</a:t>
             </a:r>
           </a:p>
@@ -7747,107 +7721,107 @@
           </a:p>
           <a:p>
             <a:r>
-              <a:rPr lang="de-DE" sz="1600" dirty="0" err="1" smtClean="0"/>
+              <a:rPr lang="de-DE" sz="1600" dirty="0" err="1"/>
               <a:t>Elastic</a:t>
             </a:r>
             <a:r>
-              <a:rPr lang="de-DE" sz="1600" dirty="0" smtClean="0"/>
+              <a:rPr lang="de-DE" sz="1600" dirty="0"/>
               <a:t> Search </a:t>
             </a:r>
             <a:r>
-              <a:rPr lang="de-DE" sz="1600" dirty="0" err="1" smtClean="0"/>
+              <a:rPr lang="de-DE" sz="1600" dirty="0" err="1"/>
               <a:t>and</a:t>
             </a:r>
             <a:r>
-              <a:rPr lang="de-DE" sz="1600" dirty="0" smtClean="0"/>
+              <a:rPr lang="de-DE" sz="1600" dirty="0"/>
               <a:t> APM-Server </a:t>
             </a:r>
             <a:r>
-              <a:rPr lang="de-DE" sz="1600" dirty="0" err="1" smtClean="0"/>
+              <a:rPr lang="de-DE" sz="1600" dirty="0" err="1"/>
               <a:t>extension</a:t>
             </a:r>
             <a:r>
-              <a:rPr lang="de-DE" sz="1600" dirty="0" smtClean="0"/>
-              <a:t> </a:t>
-            </a:r>
-            <a:r>
-              <a:rPr lang="de-DE" sz="1600" dirty="0" err="1" smtClean="0"/>
+              <a:rPr lang="de-DE" sz="1600" dirty="0"/>
+              <a:t> </a:t>
+            </a:r>
+            <a:r>
+              <a:rPr lang="de-DE" sz="1600" dirty="0" err="1"/>
               <a:t>for</a:t>
             </a:r>
             <a:r>
-              <a:rPr lang="de-DE" sz="1600" dirty="0" smtClean="0"/>
-              <a:t> </a:t>
-            </a:r>
-            <a:r>
-              <a:rPr lang="de-DE" sz="1600" dirty="0" err="1" smtClean="0"/>
+              <a:rPr lang="de-DE" sz="1600" dirty="0"/>
+              <a:t> </a:t>
+            </a:r>
+            <a:r>
+              <a:rPr lang="de-DE" sz="1600" dirty="0" err="1"/>
               <a:t>aggregation</a:t>
             </a:r>
             <a:r>
-              <a:rPr lang="de-DE" sz="1600" dirty="0" smtClean="0"/>
-              <a:t> </a:t>
-            </a:r>
-            <a:r>
-              <a:rPr lang="de-DE" sz="1600" dirty="0" err="1" smtClean="0"/>
+              <a:rPr lang="de-DE" sz="1600" dirty="0"/>
+              <a:t> </a:t>
+            </a:r>
+            <a:r>
+              <a:rPr lang="de-DE" sz="1600" dirty="0" err="1"/>
               <a:t>of</a:t>
             </a:r>
             <a:r>
-              <a:rPr lang="de-DE" sz="1600" dirty="0" smtClean="0"/>
-              <a:t> </a:t>
-            </a:r>
-            <a:r>
-              <a:rPr lang="de-DE" sz="1600" dirty="0" err="1" smtClean="0"/>
+              <a:rPr lang="de-DE" sz="1600" dirty="0"/>
+              <a:t> </a:t>
+            </a:r>
+            <a:r>
+              <a:rPr lang="de-DE" sz="1600" dirty="0" err="1"/>
               <a:t>logs</a:t>
             </a:r>
             <a:r>
-              <a:rPr lang="de-DE" sz="1600" dirty="0" smtClean="0"/>
-              <a:t> </a:t>
-            </a:r>
-            <a:r>
-              <a:rPr lang="de-DE" sz="1600" dirty="0" err="1" smtClean="0"/>
+              <a:rPr lang="de-DE" sz="1600" dirty="0"/>
+              <a:t> </a:t>
+            </a:r>
+            <a:r>
+              <a:rPr lang="de-DE" sz="1600" dirty="0" err="1"/>
               <a:t>and</a:t>
             </a:r>
             <a:r>
-              <a:rPr lang="de-DE" sz="1600" dirty="0" smtClean="0"/>
-              <a:t> </a:t>
-            </a:r>
-            <a:r>
-              <a:rPr lang="de-DE" sz="1600" dirty="0" err="1" smtClean="0"/>
+              <a:rPr lang="de-DE" sz="1600" dirty="0"/>
+              <a:t> </a:t>
+            </a:r>
+            <a:r>
+              <a:rPr lang="de-DE" sz="1600" dirty="0" err="1"/>
               <a:t>Application</a:t>
             </a:r>
             <a:r>
-              <a:rPr lang="de-DE" sz="1600" dirty="0" smtClean="0"/>
+              <a:rPr lang="de-DE" sz="1600" dirty="0"/>
               <a:t> User Monitoring (Performance </a:t>
             </a:r>
             <a:r>
-              <a:rPr lang="de-DE" sz="1600" dirty="0" err="1" smtClean="0"/>
+              <a:rPr lang="de-DE" sz="1600" dirty="0" err="1"/>
               <a:t>Metrics</a:t>
             </a:r>
             <a:r>
-              <a:rPr lang="de-DE" sz="1600" dirty="0" smtClean="0"/>
-              <a:t> </a:t>
-            </a:r>
-            <a:r>
-              <a:rPr lang="de-DE" sz="1600" dirty="0" err="1" smtClean="0"/>
+              <a:rPr lang="de-DE" sz="1600" dirty="0"/>
+              <a:t> </a:t>
+            </a:r>
+            <a:r>
+              <a:rPr lang="de-DE" sz="1600" dirty="0" err="1"/>
               <a:t>are</a:t>
             </a:r>
             <a:r>
-              <a:rPr lang="de-DE" sz="1600" dirty="0" smtClean="0"/>
-              <a:t> </a:t>
-            </a:r>
-            <a:r>
-              <a:rPr lang="de-DE" sz="1600" dirty="0" err="1" smtClean="0"/>
+              <a:rPr lang="de-DE" sz="1600" dirty="0"/>
+              <a:t> </a:t>
+            </a:r>
+            <a:r>
+              <a:rPr lang="de-DE" sz="1600" dirty="0" err="1"/>
               <a:t>coming</a:t>
             </a:r>
             <a:r>
-              <a:rPr lang="de-DE" sz="1600" dirty="0" smtClean="0"/>
-              <a:t> </a:t>
-            </a:r>
-            <a:r>
-              <a:rPr lang="de-DE" sz="1600" dirty="0" err="1" smtClean="0"/>
+              <a:rPr lang="de-DE" sz="1600" dirty="0"/>
+              <a:t> </a:t>
+            </a:r>
+            <a:r>
+              <a:rPr lang="de-DE" sz="1600" dirty="0" err="1"/>
               <a:t>from</a:t>
             </a:r>
             <a:r>
-              <a:rPr lang="de-DE" sz="1600" dirty="0" smtClean="0"/>
+              <a:rPr lang="de-DE" sz="1600" dirty="0"/>
               <a:t> Angular, Backend)</a:t>
             </a:r>
           </a:p>
@@ -7856,86 +7830,86 @@
           </a:p>
           <a:p>
             <a:r>
-              <a:rPr lang="de-DE" sz="1600" dirty="0" smtClean="0"/>
+              <a:rPr lang="de-DE" sz="1600" dirty="0"/>
               <a:t>Monitoring </a:t>
             </a:r>
             <a:r>
-              <a:rPr lang="de-DE" sz="1600" dirty="0" err="1" smtClean="0"/>
+              <a:rPr lang="de-DE" sz="1600" dirty="0" err="1"/>
               <a:t>of</a:t>
             </a:r>
             <a:r>
-              <a:rPr lang="de-DE" sz="1600" dirty="0" smtClean="0"/>
-              <a:t> </a:t>
-            </a:r>
-            <a:r>
-              <a:rPr lang="de-DE" sz="1600" dirty="0" err="1" smtClean="0"/>
+              <a:rPr lang="de-DE" sz="1600" dirty="0"/>
+              <a:t> </a:t>
+            </a:r>
+            <a:r>
+              <a:rPr lang="de-DE" sz="1600" dirty="0" err="1"/>
               <a:t>applications</a:t>
             </a:r>
             <a:r>
-              <a:rPr lang="de-DE" sz="1600" dirty="0" smtClean="0"/>
+              <a:rPr lang="de-DE" sz="1600" dirty="0"/>
               <a:t> also </a:t>
             </a:r>
             <a:r>
-              <a:rPr lang="de-DE" sz="1600" dirty="0" err="1" smtClean="0"/>
+              <a:rPr lang="de-DE" sz="1600" dirty="0" err="1"/>
               <a:t>available</a:t>
             </a:r>
             <a:r>
-              <a:rPr lang="de-DE" sz="1600" dirty="0" smtClean="0"/>
+              <a:rPr lang="de-DE" sz="1600" dirty="0"/>
               <a:t> but </a:t>
             </a:r>
             <a:r>
-              <a:rPr lang="de-DE" sz="1600" dirty="0" err="1" smtClean="0"/>
+              <a:rPr lang="de-DE" sz="1600" dirty="0" err="1"/>
               <a:t>with</a:t>
             </a:r>
             <a:r>
-              <a:rPr lang="de-DE" sz="1600" dirty="0" smtClean="0"/>
-              <a:t> </a:t>
-            </a:r>
-            <a:r>
-              <a:rPr lang="de-DE" sz="1600" dirty="0" err="1" smtClean="0"/>
+              <a:rPr lang="de-DE" sz="1600" dirty="0"/>
+              <a:t> </a:t>
+            </a:r>
+            <a:r>
+              <a:rPr lang="de-DE" sz="1600" dirty="0" err="1"/>
               <a:t>less</a:t>
             </a:r>
             <a:r>
-              <a:rPr lang="de-DE" sz="1600" dirty="0" smtClean="0"/>
-              <a:t> </a:t>
-            </a:r>
-            <a:r>
-              <a:rPr lang="de-DE" sz="1600" dirty="0" err="1" smtClean="0"/>
+              <a:rPr lang="de-DE" sz="1600" dirty="0"/>
+              <a:t> </a:t>
+            </a:r>
+            <a:r>
+              <a:rPr lang="de-DE" sz="1600" dirty="0" err="1"/>
               <a:t>features</a:t>
             </a:r>
             <a:r>
-              <a:rPr lang="de-DE" sz="1600" dirty="0" smtClean="0"/>
-              <a:t> </a:t>
-            </a:r>
-            <a:r>
-              <a:rPr lang="de-DE" sz="1600" dirty="0" err="1" smtClean="0"/>
+              <a:rPr lang="de-DE" sz="1600" dirty="0"/>
+              <a:t> </a:t>
+            </a:r>
+            <a:r>
+              <a:rPr lang="de-DE" sz="1600" dirty="0" err="1"/>
               <a:t>then</a:t>
             </a:r>
             <a:r>
-              <a:rPr lang="de-DE" sz="1600" dirty="0" smtClean="0"/>
+              <a:rPr lang="de-DE" sz="1600" dirty="0"/>
               <a:t> Prometheus </a:t>
             </a:r>
             <a:r>
-              <a:rPr lang="de-DE" sz="1600" dirty="0" err="1" smtClean="0"/>
+              <a:rPr lang="de-DE" sz="1600" dirty="0" err="1"/>
               <a:t>and</a:t>
             </a:r>
             <a:r>
-              <a:rPr lang="de-DE" sz="1600" dirty="0" smtClean="0"/>
-              <a:t> </a:t>
-            </a:r>
-            <a:r>
-              <a:rPr lang="de-DE" sz="1600" dirty="0" err="1" smtClean="0"/>
+              <a:rPr lang="de-DE" sz="1600" dirty="0"/>
+              <a:t> </a:t>
+            </a:r>
+            <a:r>
+              <a:rPr lang="de-DE" sz="1600" dirty="0" err="1"/>
               <a:t>Grafana</a:t>
             </a:r>
             <a:r>
-              <a:rPr lang="de-DE" sz="1600" dirty="0" smtClean="0"/>
-              <a:t> </a:t>
-            </a:r>
-            <a:r>
-              <a:rPr lang="de-DE" sz="1600" dirty="0" err="1" smtClean="0"/>
+              <a:rPr lang="de-DE" sz="1600" dirty="0"/>
+              <a:t> </a:t>
+            </a:r>
+            <a:r>
+              <a:rPr lang="de-DE" sz="1600" dirty="0" err="1"/>
               <a:t>stack</a:t>
             </a:r>
-            <a:endParaRPr lang="de-DE" sz="1600" dirty="0" smtClean="0"/>
+            <a:endParaRPr lang="de-DE" sz="1600" dirty="0"/>
           </a:p>
           <a:p>
             <a:endParaRPr lang="de-DE" sz="1600" dirty="0"/>
@@ -7988,18 +7962,17 @@
           <a:lstStyle/>
           <a:p>
             <a:r>
-              <a:rPr lang="de-DE" dirty="0" smtClean="0"/>
+              <a:rPr lang="de-DE" dirty="0"/>
               <a:t>Prometheus </a:t>
             </a:r>
             <a:r>
-              <a:rPr lang="de-DE" dirty="0" err="1" smtClean="0"/>
+              <a:rPr lang="de-DE" dirty="0" err="1"/>
               <a:t>Exporter</a:t>
             </a:r>
             <a:r>
-              <a:rPr lang="de-DE" dirty="0" smtClean="0"/>
-              <a:t> </a:t>
-            </a:r>
-            <a:endParaRPr lang="de-DE" dirty="0"/>
+              <a:rPr lang="de-DE" dirty="0"/>
+              <a:t> </a:t>
+            </a:r>
           </a:p>
         </p:txBody>
       </p:sp>
@@ -8044,10 +8017,6 @@
               </a:rPr>
               <a:t>https://matomo.org/faq/how-to/faq_20278/</a:t>
             </a:r>
-            <a:r>
-              <a:rPr lang="de-DE" sz="1600" dirty="0"/>
-              <a:t/>
-            </a:r>
             <a:br>
               <a:rPr lang="de-DE" sz="1600" dirty="0"/>
             </a:br>
@@ -8237,7 +8206,7 @@
               <a:t>metric</a:t>
             </a:r>
             <a:r>
-              <a:rPr lang="de-DE" sz="1600" dirty="0" smtClean="0"/>
+              <a:rPr lang="de-DE" sz="1600" dirty="0"/>
               <a:t>)</a:t>
             </a:r>
           </a:p>
@@ -8247,41 +8216,41 @@
           </a:p>
           <a:p>
             <a:r>
-              <a:rPr lang="de-DE" sz="1600" dirty="0" smtClean="0"/>
+              <a:rPr lang="de-DE" sz="1600" dirty="0"/>
               <a:t>ELK Stack </a:t>
             </a:r>
             <a:r>
-              <a:rPr lang="de-DE" sz="1600" dirty="0" err="1" smtClean="0"/>
+              <a:rPr lang="de-DE" sz="1600" dirty="0" err="1"/>
               <a:t>Exporter</a:t>
             </a:r>
-            <a:endParaRPr lang="de-DE" sz="1600" dirty="0" smtClean="0"/>
+            <a:endParaRPr lang="de-DE" sz="1600" dirty="0"/>
           </a:p>
           <a:p>
             <a:pPr lvl="1"/>
             <a:r>
-              <a:rPr lang="de-DE" sz="1600" dirty="0" err="1" smtClean="0"/>
+              <a:rPr lang="de-DE" sz="1600" dirty="0" err="1"/>
               <a:t>Logstash</a:t>
             </a:r>
-            <a:endParaRPr lang="de-DE" sz="1600" dirty="0" smtClean="0"/>
+            <a:endParaRPr lang="de-DE" sz="1600" dirty="0"/>
           </a:p>
           <a:p>
             <a:pPr lvl="1"/>
             <a:r>
-              <a:rPr lang="de-DE" sz="1600" dirty="0" err="1" smtClean="0"/>
+              <a:rPr lang="de-DE" sz="1600" dirty="0" err="1"/>
               <a:t>Elastic</a:t>
             </a:r>
             <a:r>
-              <a:rPr lang="de-DE" sz="1600" dirty="0" smtClean="0"/>
+              <a:rPr lang="de-DE" sz="1600" dirty="0"/>
               <a:t> Search</a:t>
             </a:r>
           </a:p>
           <a:p>
             <a:pPr lvl="1"/>
             <a:r>
-              <a:rPr lang="de-DE" sz="1600" dirty="0" err="1" smtClean="0"/>
+              <a:rPr lang="de-DE" sz="1600" dirty="0" err="1"/>
               <a:t>Kibana</a:t>
             </a:r>
-            <a:endParaRPr lang="de-DE" sz="1600" dirty="0" smtClean="0"/>
+            <a:endParaRPr lang="de-DE" sz="1600" dirty="0"/>
           </a:p>
           <a:p>
             <a:pPr lvl="1"/>
@@ -8388,10 +8357,9 @@
           <a:lstStyle/>
           <a:p>
             <a:r>
-              <a:rPr lang="de-DE" dirty="0" smtClean="0"/>
+              <a:rPr lang="de-DE" dirty="0"/>
               <a:t>Monitoring Tools</a:t>
             </a:r>
-            <a:endParaRPr lang="de-DE" dirty="0"/>
           </a:p>
         </p:txBody>
       </p:sp>
@@ -8413,81 +8381,81 @@
           <a:lstStyle/>
           <a:p>
             <a:r>
-              <a:rPr lang="de-DE" sz="1600" dirty="0" smtClean="0"/>
+              <a:rPr lang="de-DE" sz="1600" dirty="0"/>
               <a:t>Prometheus</a:t>
             </a:r>
           </a:p>
           <a:p>
             <a:pPr lvl="1"/>
             <a:r>
-              <a:rPr lang="de-DE" sz="1600" dirty="0" err="1" smtClean="0"/>
+              <a:rPr lang="de-DE" sz="1600" dirty="0" err="1"/>
               <a:t>scrapes</a:t>
             </a:r>
             <a:r>
-              <a:rPr lang="de-DE" sz="1600" dirty="0" smtClean="0"/>
-              <a:t> </a:t>
-            </a:r>
-            <a:r>
-              <a:rPr lang="de-DE" sz="1600" dirty="0" err="1" smtClean="0"/>
+              <a:rPr lang="de-DE" sz="1600" dirty="0"/>
+              <a:t> </a:t>
+            </a:r>
+            <a:r>
+              <a:rPr lang="de-DE" sz="1600" dirty="0" err="1"/>
               <a:t>targets</a:t>
             </a:r>
             <a:r>
-              <a:rPr lang="de-DE" sz="1600" dirty="0" smtClean="0"/>
-              <a:t> </a:t>
-            </a:r>
-            <a:r>
-              <a:rPr lang="de-DE" sz="1600" dirty="0" err="1" smtClean="0"/>
+              <a:rPr lang="de-DE" sz="1600" dirty="0"/>
+              <a:t> </a:t>
+            </a:r>
+            <a:r>
+              <a:rPr lang="de-DE" sz="1600" dirty="0" err="1"/>
               <a:t>configured</a:t>
             </a:r>
             <a:r>
-              <a:rPr lang="de-DE" sz="1600" dirty="0" smtClean="0"/>
+              <a:rPr lang="de-DE" sz="1600" dirty="0"/>
               <a:t> in </a:t>
             </a:r>
             <a:r>
-              <a:rPr lang="de-DE" sz="1600" dirty="0" err="1" smtClean="0"/>
+              <a:rPr lang="de-DE" sz="1600" dirty="0" err="1"/>
               <a:t>prometheus.yml</a:t>
             </a:r>
-            <a:endParaRPr lang="de-DE" sz="1600" dirty="0" smtClean="0"/>
+            <a:endParaRPr lang="de-DE" sz="1600" dirty="0"/>
           </a:p>
           <a:p>
             <a:pPr lvl="1"/>
             <a:r>
-              <a:rPr lang="de-DE" sz="1600" dirty="0" err="1" smtClean="0"/>
+              <a:rPr lang="de-DE" sz="1600" dirty="0" err="1"/>
               <a:t>provides</a:t>
             </a:r>
             <a:r>
-              <a:rPr lang="de-DE" sz="1600" dirty="0" smtClean="0"/>
-              <a:t> </a:t>
-            </a:r>
-            <a:r>
-              <a:rPr lang="de-DE" sz="1600" dirty="0" err="1" smtClean="0"/>
+              <a:rPr lang="de-DE" sz="1600" dirty="0"/>
+              <a:t> </a:t>
+            </a:r>
+            <a:r>
+              <a:rPr lang="de-DE" sz="1600" dirty="0" err="1"/>
               <a:t>collected</a:t>
             </a:r>
             <a:r>
-              <a:rPr lang="de-DE" sz="1600" dirty="0" smtClean="0"/>
-              <a:t> </a:t>
-            </a:r>
-            <a:r>
-              <a:rPr lang="de-DE" sz="1600" dirty="0" err="1" smtClean="0"/>
+              <a:rPr lang="de-DE" sz="1600" dirty="0"/>
+              <a:t> </a:t>
+            </a:r>
+            <a:r>
+              <a:rPr lang="de-DE" sz="1600" dirty="0" err="1"/>
               <a:t>metrics</a:t>
             </a:r>
             <a:r>
-              <a:rPr lang="de-DE" sz="1600" dirty="0" smtClean="0"/>
-              <a:t> </a:t>
-            </a:r>
-            <a:r>
-              <a:rPr lang="de-DE" sz="1600" dirty="0" err="1" smtClean="0"/>
+              <a:rPr lang="de-DE" sz="1600" dirty="0"/>
+              <a:t> </a:t>
+            </a:r>
+            <a:r>
+              <a:rPr lang="de-DE" sz="1600" dirty="0" err="1"/>
               <a:t>to</a:t>
             </a:r>
             <a:r>
-              <a:rPr lang="de-DE" sz="1600" dirty="0" smtClean="0"/>
-              <a:t> </a:t>
-            </a:r>
-            <a:r>
-              <a:rPr lang="de-DE" sz="1600" dirty="0" err="1" smtClean="0"/>
+              <a:rPr lang="de-DE" sz="1600" dirty="0"/>
+              <a:t> </a:t>
+            </a:r>
+            <a:r>
+              <a:rPr lang="de-DE" sz="1600" dirty="0" err="1"/>
               <a:t>Grafana</a:t>
             </a:r>
-            <a:endParaRPr lang="de-DE" sz="1600" dirty="0" smtClean="0"/>
+            <a:endParaRPr lang="de-DE" sz="1600" dirty="0"/>
           </a:p>
           <a:p>
             <a:pPr lvl="1"/>
@@ -8495,38 +8463,38 @@
           </a:p>
           <a:p>
             <a:r>
-              <a:rPr lang="de-DE" sz="1600" dirty="0" smtClean="0"/>
+              <a:rPr lang="de-DE" sz="1600" dirty="0"/>
               <a:t>Prometheus Alert Manager</a:t>
             </a:r>
           </a:p>
           <a:p>
             <a:pPr lvl="1"/>
             <a:r>
-              <a:rPr lang="de-DE" sz="1600" dirty="0" err="1" smtClean="0"/>
+              <a:rPr lang="de-DE" sz="1600" dirty="0" err="1"/>
               <a:t>Better</a:t>
             </a:r>
             <a:r>
-              <a:rPr lang="de-DE" sz="1600" dirty="0" smtClean="0"/>
-              <a:t> </a:t>
-            </a:r>
-            <a:r>
-              <a:rPr lang="de-DE" sz="1600" dirty="0" err="1" smtClean="0"/>
+              <a:rPr lang="de-DE" sz="1600" dirty="0"/>
+              <a:t> </a:t>
+            </a:r>
+            <a:r>
+              <a:rPr lang="de-DE" sz="1600" dirty="0" err="1"/>
               <a:t>way</a:t>
             </a:r>
             <a:r>
-              <a:rPr lang="de-DE" sz="1600" dirty="0" smtClean="0"/>
-              <a:t> </a:t>
-            </a:r>
-            <a:r>
-              <a:rPr lang="de-DE" sz="1600" dirty="0" err="1" smtClean="0"/>
+              <a:rPr lang="de-DE" sz="1600" dirty="0"/>
+              <a:t> </a:t>
+            </a:r>
+            <a:r>
+              <a:rPr lang="de-DE" sz="1600" dirty="0" err="1"/>
               <a:t>to</a:t>
             </a:r>
             <a:r>
-              <a:rPr lang="de-DE" sz="1600" dirty="0" smtClean="0"/>
+              <a:rPr lang="de-DE" sz="1600" dirty="0"/>
               <a:t> do </a:t>
             </a:r>
             <a:r>
-              <a:rPr lang="de-DE" sz="1600" dirty="0" err="1" smtClean="0"/>
+              <a:rPr lang="de-DE" sz="1600" dirty="0" err="1"/>
               <a:t>alerting</a:t>
             </a:r>
             <a:r>
@@ -8534,48 +8502,32 @@
               <a:t> </a:t>
             </a:r>
             <a:r>
-              <a:rPr lang="de-DE" sz="1600" dirty="0" err="1" smtClean="0"/>
+              <a:rPr lang="de-DE" sz="1600" dirty="0" err="1"/>
               <a:t>as</a:t>
             </a:r>
             <a:r>
-              <a:rPr lang="de-DE" sz="1600" dirty="0" smtClean="0"/>
+              <a:rPr lang="de-DE" sz="1600" dirty="0"/>
               <a:t> in </a:t>
             </a:r>
             <a:r>
-              <a:rPr lang="de-DE" sz="1600" dirty="0" err="1" smtClean="0"/>
+              <a:rPr lang="de-DE" sz="1600" dirty="0" err="1"/>
               <a:t>Grafana</a:t>
             </a:r>
             <a:r>
-              <a:rPr lang="de-DE" sz="1600" dirty="0" smtClean="0"/>
+              <a:rPr lang="de-DE" sz="1600" dirty="0"/>
               <a:t> –&gt; </a:t>
             </a:r>
             <a:r>
-              <a:rPr lang="de-DE" sz="1600" dirty="0" err="1" smtClean="0"/>
+              <a:rPr lang="de-DE" sz="1600" dirty="0" err="1"/>
               <a:t>more</a:t>
             </a:r>
             <a:r>
-              <a:rPr lang="de-DE" sz="1600" dirty="0" smtClean="0"/>
-              <a:t> </a:t>
-            </a:r>
-            <a:r>
-              <a:rPr lang="de-DE" sz="1600" dirty="0" err="1" smtClean="0"/>
+              <a:rPr lang="de-DE" sz="1600" dirty="0"/>
+              <a:t> </a:t>
+            </a:r>
+            <a:r>
+              <a:rPr lang="de-DE" sz="1600" dirty="0" err="1"/>
               <a:t>functionalities</a:t>
-            </a:r>
-            <a:endParaRPr lang="de-DE" sz="1600" dirty="0"/>
-          </a:p>
-          <a:p>
-            <a:pPr lvl="1"/>
-            <a:r>
-              <a:rPr lang="de-DE" sz="1600" dirty="0" err="1"/>
-              <a:t>Currently</a:t>
-            </a:r>
-            <a:r>
-              <a:rPr lang="de-DE" sz="1600" dirty="0"/>
-              <a:t> not </a:t>
-            </a:r>
-            <a:r>
-              <a:rPr lang="de-DE" sz="1600" dirty="0" err="1"/>
-              <a:t>used</a:t>
             </a:r>
             <a:endParaRPr lang="de-DE" sz="1600" dirty="0"/>
           </a:p>
@@ -8585,114 +8537,105 @@
           </a:p>
           <a:p>
             <a:r>
-              <a:rPr lang="de-DE" sz="1600" dirty="0" err="1" smtClean="0"/>
+              <a:rPr lang="de-DE" sz="1600" dirty="0" err="1"/>
               <a:t>Grafana</a:t>
             </a:r>
-            <a:endParaRPr lang="de-DE" sz="1600" dirty="0" smtClean="0"/>
+            <a:endParaRPr lang="de-DE" sz="1600" dirty="0"/>
           </a:p>
           <a:p>
             <a:pPr lvl="1"/>
             <a:r>
-              <a:rPr lang="de-DE" sz="1600" dirty="0" err="1" smtClean="0"/>
+              <a:rPr lang="de-DE" sz="1600" dirty="0" err="1"/>
               <a:t>Overview</a:t>
             </a:r>
             <a:r>
-              <a:rPr lang="de-DE" sz="1600" dirty="0" smtClean="0"/>
-              <a:t> </a:t>
-            </a:r>
-            <a:r>
-              <a:rPr lang="de-DE" sz="1600" dirty="0" err="1" smtClean="0"/>
+              <a:rPr lang="de-DE" sz="1600" dirty="0"/>
+              <a:t> </a:t>
+            </a:r>
+            <a:r>
+              <a:rPr lang="de-DE" sz="1600" dirty="0" err="1"/>
               <a:t>of</a:t>
             </a:r>
             <a:r>
-              <a:rPr lang="de-DE" sz="1600" dirty="0" smtClean="0"/>
+              <a:rPr lang="de-DE" sz="1600" dirty="0"/>
               <a:t> all </a:t>
             </a:r>
             <a:r>
-              <a:rPr lang="de-DE" sz="1600" dirty="0" err="1" smtClean="0"/>
+              <a:rPr lang="de-DE" sz="1600" dirty="0" err="1"/>
               <a:t>running</a:t>
             </a:r>
             <a:r>
-              <a:rPr lang="de-DE" sz="1600" dirty="0" smtClean="0"/>
-              <a:t> </a:t>
-            </a:r>
-            <a:r>
-              <a:rPr lang="de-DE" sz="1600" dirty="0" err="1" smtClean="0"/>
+              <a:rPr lang="de-DE" sz="1600" dirty="0"/>
+              <a:t> </a:t>
+            </a:r>
+            <a:r>
+              <a:rPr lang="de-DE" sz="1600" dirty="0" err="1"/>
               <a:t>services</a:t>
             </a:r>
             <a:r>
-              <a:rPr lang="de-DE" sz="1600" dirty="0" smtClean="0"/>
+              <a:rPr lang="de-DE" sz="1600" dirty="0"/>
               <a:t> (Tools </a:t>
             </a:r>
             <a:r>
-              <a:rPr lang="de-DE" sz="1600" dirty="0" err="1" smtClean="0"/>
+              <a:rPr lang="de-DE" sz="1600" dirty="0" err="1"/>
               <a:t>and</a:t>
             </a:r>
             <a:r>
-              <a:rPr lang="de-DE" sz="1600" dirty="0" smtClean="0"/>
-              <a:t> </a:t>
-            </a:r>
-            <a:r>
-              <a:rPr lang="de-DE" sz="1600" dirty="0" err="1" smtClean="0"/>
+              <a:rPr lang="de-DE" sz="1600" dirty="0"/>
+              <a:t> </a:t>
+            </a:r>
+            <a:r>
+              <a:rPr lang="de-DE" sz="1600" dirty="0" err="1"/>
               <a:t>Application</a:t>
             </a:r>
             <a:r>
-              <a:rPr lang="de-DE" sz="1600" dirty="0" smtClean="0"/>
+              <a:rPr lang="de-DE" sz="1600" dirty="0"/>
               <a:t>) such </a:t>
             </a:r>
             <a:r>
-              <a:rPr lang="de-DE" sz="1600" dirty="0" err="1" smtClean="0"/>
+              <a:rPr lang="de-DE" sz="1600" dirty="0" err="1"/>
               <a:t>as</a:t>
             </a:r>
             <a:r>
-              <a:rPr lang="de-DE" sz="1600" dirty="0" smtClean="0"/>
-              <a:t> </a:t>
-            </a:r>
-            <a:r>
-              <a:rPr lang="de-DE" sz="1600" dirty="0" err="1" smtClean="0"/>
+              <a:rPr lang="de-DE" sz="1600" dirty="0"/>
+              <a:t> </a:t>
+            </a:r>
+            <a:r>
+              <a:rPr lang="de-DE" sz="1600" dirty="0" err="1"/>
               <a:t>custom</a:t>
             </a:r>
             <a:r>
-              <a:rPr lang="de-DE" sz="1600" dirty="0" smtClean="0"/>
-              <a:t> </a:t>
-            </a:r>
-            <a:r>
-              <a:rPr lang="de-DE" sz="1600" dirty="0" err="1" smtClean="0"/>
+              <a:rPr lang="de-DE" sz="1600" dirty="0"/>
+              <a:t> </a:t>
+            </a:r>
+            <a:r>
+              <a:rPr lang="de-DE" sz="1600" dirty="0" err="1"/>
               <a:t>metrics</a:t>
             </a:r>
-            <a:endParaRPr lang="de-DE" sz="1600" dirty="0" smtClean="0"/>
+            <a:endParaRPr lang="de-DE" sz="1600" dirty="0"/>
           </a:p>
           <a:p>
             <a:pPr lvl="1"/>
             <a:r>
-              <a:rPr lang="de-DE" sz="1600" dirty="0" smtClean="0"/>
+              <a:rPr lang="de-DE" sz="1600" dirty="0"/>
               <a:t>Basic </a:t>
             </a:r>
             <a:r>
-              <a:rPr lang="de-DE" sz="1600" dirty="0" err="1" smtClean="0"/>
+              <a:rPr lang="de-DE" sz="1600" dirty="0" err="1"/>
               <a:t>Alerting</a:t>
             </a:r>
             <a:r>
-              <a:rPr lang="de-DE" sz="1600" dirty="0" smtClean="0"/>
+              <a:rPr lang="de-DE" sz="1600" dirty="0"/>
               <a:t>, </a:t>
             </a:r>
             <a:r>
-              <a:rPr lang="de-DE" sz="1600" dirty="0" err="1" smtClean="0"/>
+              <a:rPr lang="de-DE" sz="1600" dirty="0" err="1"/>
               <a:t>done</a:t>
             </a:r>
             <a:r>
-              <a:rPr lang="de-DE" sz="1600" dirty="0" smtClean="0"/>
-              <a:t> via </a:t>
-            </a:r>
-            <a:r>
-              <a:rPr lang="de-DE" sz="1600" dirty="0" err="1" smtClean="0"/>
-              <a:t>WebHooks</a:t>
-            </a:r>
-            <a:r>
-              <a:rPr lang="de-DE" sz="1600" smtClean="0"/>
-              <a:t> </a:t>
-            </a:r>
-            <a:endParaRPr lang="de-DE" sz="1600" dirty="0"/>
+              <a:rPr lang="de-DE" sz="1600" dirty="0"/>
+              <a:t> via WebHooks </a:t>
+            </a:r>
           </a:p>
         </p:txBody>
       </p:sp>
@@ -8700,6 +8643,1346 @@
     <p:extLst>
       <p:ext uri="{BB962C8B-B14F-4D97-AF65-F5344CB8AC3E}">
         <p14:creationId xmlns:p14="http://schemas.microsoft.com/office/powerpoint/2010/main" val="1692527842"/>
+      </p:ext>
+    </p:extLst>
+  </p:cSld>
+  <p:clrMapOvr>
+    <a:masterClrMapping/>
+  </p:clrMapOvr>
+</p:sld>
+</file>
+
+<file path=ppt/slides/slide6.xml><?xml version="1.0" encoding="utf-8"?>
+<p:sld xmlns:a="http://schemas.openxmlformats.org/drawingml/2006/main" xmlns:r="http://schemas.openxmlformats.org/officeDocument/2006/relationships" xmlns:p="http://schemas.openxmlformats.org/presentationml/2006/main">
+  <p:cSld>
+    <p:spTree>
+      <p:nvGrpSpPr>
+        <p:cNvPr id="1" name=""/>
+        <p:cNvGrpSpPr/>
+        <p:nvPr/>
+      </p:nvGrpSpPr>
+      <p:grpSpPr>
+        <a:xfrm>
+          <a:off x="0" y="0"/>
+          <a:ext cx="0" cy="0"/>
+          <a:chOff x="0" y="0"/>
+          <a:chExt cx="0" cy="0"/>
+        </a:xfrm>
+      </p:grpSpPr>
+      <p:sp>
+        <p:nvSpPr>
+          <p:cNvPr id="2" name="Titel 1">
+            <a:extLst>
+              <a:ext uri="{FF2B5EF4-FFF2-40B4-BE49-F238E27FC236}">
+                <a16:creationId xmlns:a16="http://schemas.microsoft.com/office/drawing/2014/main" id="{D1FFC8E1-5B9A-4679-BB5B-F1538C8182D3}"/>
+              </a:ext>
+            </a:extLst>
+          </p:cNvPr>
+          <p:cNvSpPr>
+            <a:spLocks noGrp="1"/>
+          </p:cNvSpPr>
+          <p:nvPr>
+            <p:ph type="title"/>
+          </p:nvPr>
+        </p:nvSpPr>
+        <p:spPr/>
+        <p:txBody>
+          <a:bodyPr/>
+          <a:lstStyle/>
+          <a:p>
+            <a:r>
+              <a:rPr lang="de-DE" dirty="0"/>
+              <a:t>Basic </a:t>
+            </a:r>
+            <a:r>
+              <a:rPr lang="de-DE" dirty="0" err="1"/>
+              <a:t>Alerting</a:t>
+            </a:r>
+            <a:r>
+              <a:rPr lang="de-DE" dirty="0"/>
+              <a:t> in </a:t>
+            </a:r>
+            <a:r>
+              <a:rPr lang="de-DE" dirty="0" err="1"/>
+              <a:t>AlertManager</a:t>
+            </a:r>
+            <a:r>
+              <a:rPr lang="de-DE" dirty="0"/>
+              <a:t> </a:t>
+            </a:r>
+            <a:r>
+              <a:rPr lang="de-DE" dirty="0" err="1"/>
+              <a:t>vs</a:t>
+            </a:r>
+            <a:r>
+              <a:rPr lang="de-DE" dirty="0"/>
+              <a:t> </a:t>
+            </a:r>
+            <a:r>
+              <a:rPr lang="de-DE" dirty="0" err="1"/>
+              <a:t>Grafana</a:t>
+            </a:r>
+            <a:endParaRPr lang="de-DE" dirty="0"/>
+          </a:p>
+        </p:txBody>
+      </p:sp>
+      <p:sp>
+        <p:nvSpPr>
+          <p:cNvPr id="3" name="Inhaltsplatzhalter 2">
+            <a:extLst>
+              <a:ext uri="{FF2B5EF4-FFF2-40B4-BE49-F238E27FC236}">
+                <a16:creationId xmlns:a16="http://schemas.microsoft.com/office/drawing/2014/main" id="{06903A42-1EA4-48BE-86AE-F13FB853DD3D}"/>
+              </a:ext>
+            </a:extLst>
+          </p:cNvPr>
+          <p:cNvSpPr>
+            <a:spLocks noGrp="1"/>
+          </p:cNvSpPr>
+          <p:nvPr>
+            <p:ph idx="1"/>
+          </p:nvPr>
+        </p:nvSpPr>
+        <p:spPr>
+          <a:xfrm>
+            <a:off x="5566301" y="1825625"/>
+            <a:ext cx="5787499" cy="4351338"/>
+          </a:xfrm>
+        </p:spPr>
+        <p:txBody>
+          <a:bodyPr>
+            <a:normAutofit/>
+          </a:bodyPr>
+          <a:lstStyle/>
+          <a:p>
+            <a:r>
+              <a:rPr lang="de-DE" sz="1600" dirty="0" err="1"/>
+              <a:t>AlertManager</a:t>
+            </a:r>
+            <a:endParaRPr lang="de-DE" sz="1600" dirty="0"/>
+          </a:p>
+          <a:p>
+            <a:pPr lvl="1"/>
+            <a:r>
+              <a:rPr lang="de-DE" sz="1200" dirty="0" err="1"/>
+              <a:t>define</a:t>
+            </a:r>
+            <a:r>
+              <a:rPr lang="de-DE" sz="1200" dirty="0"/>
+              <a:t> </a:t>
+            </a:r>
+            <a:r>
+              <a:rPr lang="de-DE" sz="1200" dirty="0" err="1"/>
+              <a:t>scrape</a:t>
+            </a:r>
+            <a:r>
+              <a:rPr lang="de-DE" sz="1200" dirty="0"/>
+              <a:t> </a:t>
+            </a:r>
+            <a:r>
+              <a:rPr lang="de-DE" sz="1200" dirty="0" err="1"/>
+              <a:t>targets</a:t>
+            </a:r>
+            <a:r>
+              <a:rPr lang="de-DE" sz="1200" dirty="0"/>
+              <a:t> in </a:t>
+            </a:r>
+            <a:r>
+              <a:rPr lang="de-DE" sz="1200" dirty="0" err="1"/>
+              <a:t>prometheus.yml</a:t>
+            </a:r>
+            <a:br>
+              <a:rPr lang="de-DE" sz="1200" dirty="0"/>
+            </a:br>
+            <a:r>
+              <a:rPr lang="de-DE" sz="1200" dirty="0"/>
+              <a:t>-&gt; </a:t>
+            </a:r>
+            <a:r>
+              <a:rPr lang="de-DE" sz="1200" dirty="0" err="1"/>
+              <a:t>collect</a:t>
+            </a:r>
+            <a:r>
+              <a:rPr lang="de-DE" sz="1200" dirty="0"/>
+              <a:t> </a:t>
+            </a:r>
+            <a:r>
+              <a:rPr lang="de-DE" sz="1200" dirty="0" err="1"/>
+              <a:t>metrics</a:t>
+            </a:r>
+            <a:r>
+              <a:rPr lang="de-DE" sz="1200" dirty="0"/>
+              <a:t> </a:t>
+            </a:r>
+            <a:r>
+              <a:rPr lang="de-DE" sz="1200" dirty="0" err="1"/>
+              <a:t>from</a:t>
+            </a:r>
+            <a:r>
+              <a:rPr lang="de-DE" sz="1200" dirty="0"/>
+              <a:t> all </a:t>
+            </a:r>
+            <a:r>
+              <a:rPr lang="de-DE" sz="1200" dirty="0" err="1"/>
+              <a:t>containers</a:t>
+            </a:r>
+            <a:br>
+              <a:rPr lang="de-DE" sz="1200" dirty="0"/>
+            </a:br>
+            <a:r>
+              <a:rPr lang="de-DE" sz="1200" dirty="0"/>
+              <a:t>-&gt; will </a:t>
+            </a:r>
+            <a:r>
+              <a:rPr lang="de-DE" sz="1200" dirty="0" err="1"/>
+              <a:t>be</a:t>
+            </a:r>
+            <a:r>
+              <a:rPr lang="de-DE" sz="1200" dirty="0"/>
+              <a:t> </a:t>
+            </a:r>
+            <a:r>
+              <a:rPr lang="de-DE" sz="1200" dirty="0" err="1"/>
+              <a:t>used</a:t>
+            </a:r>
+            <a:r>
+              <a:rPr lang="de-DE" sz="1200" dirty="0"/>
+              <a:t> in Prometheus</a:t>
+            </a:r>
+          </a:p>
+          <a:p>
+            <a:pPr lvl="1"/>
+            <a:r>
+              <a:rPr lang="de-DE" sz="1200" dirty="0" err="1"/>
+              <a:t>define</a:t>
+            </a:r>
+            <a:r>
+              <a:rPr lang="de-DE" sz="1200" dirty="0"/>
+              <a:t> </a:t>
+            </a:r>
+            <a:r>
+              <a:rPr lang="de-DE" sz="1200" dirty="0" err="1"/>
+              <a:t>alerting</a:t>
+            </a:r>
+            <a:r>
+              <a:rPr lang="de-DE" sz="1200" dirty="0"/>
+              <a:t> </a:t>
+            </a:r>
+            <a:r>
+              <a:rPr lang="de-DE" sz="1200" dirty="0" err="1"/>
+              <a:t>rules</a:t>
+            </a:r>
+            <a:r>
+              <a:rPr lang="de-DE" sz="1200" dirty="0"/>
+              <a:t> in </a:t>
+            </a:r>
+            <a:r>
+              <a:rPr lang="de-DE" sz="1200" dirty="0" err="1"/>
+              <a:t>prometheus.rules.yml</a:t>
+            </a:r>
+            <a:br>
+              <a:rPr lang="de-DE" sz="1200" dirty="0"/>
+            </a:br>
+            <a:r>
+              <a:rPr lang="de-DE" sz="1200" dirty="0"/>
+              <a:t>-&gt; </a:t>
+            </a:r>
+            <a:r>
+              <a:rPr lang="de-DE" sz="1200" dirty="0" err="1"/>
+              <a:t>define</a:t>
+            </a:r>
+            <a:r>
+              <a:rPr lang="de-DE" sz="1200" dirty="0"/>
+              <a:t> </a:t>
+            </a:r>
+            <a:r>
+              <a:rPr lang="de-DE" sz="1200" dirty="0" err="1"/>
+              <a:t>your</a:t>
+            </a:r>
+            <a:r>
+              <a:rPr lang="de-DE" sz="1200" dirty="0"/>
+              <a:t> own </a:t>
+            </a:r>
+            <a:r>
+              <a:rPr lang="de-DE" sz="1200" dirty="0" err="1"/>
+              <a:t>up</a:t>
+            </a:r>
+            <a:r>
+              <a:rPr lang="de-DE" sz="1200" dirty="0"/>
+              <a:t>/down/</a:t>
+            </a:r>
+            <a:r>
+              <a:rPr lang="de-DE" sz="1200" dirty="0" err="1"/>
+              <a:t>cpu</a:t>
+            </a:r>
+            <a:r>
+              <a:rPr lang="de-DE" sz="1200" dirty="0"/>
+              <a:t> etc. </a:t>
+            </a:r>
+            <a:r>
+              <a:rPr lang="de-DE" sz="1200" dirty="0" err="1"/>
+              <a:t>rules</a:t>
+            </a:r>
+            <a:br>
+              <a:rPr lang="de-DE" sz="1200" dirty="0"/>
+            </a:br>
+            <a:r>
+              <a:rPr lang="de-DE" sz="1200" dirty="0"/>
+              <a:t>-&gt; will </a:t>
+            </a:r>
+            <a:r>
+              <a:rPr lang="de-DE" sz="1200" dirty="0" err="1"/>
+              <a:t>be</a:t>
+            </a:r>
+            <a:r>
+              <a:rPr lang="de-DE" sz="1200" dirty="0"/>
+              <a:t> </a:t>
+            </a:r>
+            <a:r>
+              <a:rPr lang="de-DE" sz="1200" dirty="0" err="1"/>
+              <a:t>used</a:t>
+            </a:r>
+            <a:r>
+              <a:rPr lang="de-DE" sz="1200" dirty="0"/>
+              <a:t> in Prometheus</a:t>
+            </a:r>
+          </a:p>
+          <a:p>
+            <a:pPr lvl="1"/>
+            <a:r>
+              <a:rPr lang="de-DE" sz="1200" dirty="0" err="1"/>
+              <a:t>define</a:t>
+            </a:r>
+            <a:r>
+              <a:rPr lang="de-DE" sz="1200" dirty="0"/>
+              <a:t> </a:t>
+            </a:r>
+            <a:r>
+              <a:rPr lang="de-DE" sz="1200" dirty="0" err="1"/>
+              <a:t>alerting</a:t>
+            </a:r>
+            <a:r>
+              <a:rPr lang="de-DE" sz="1200" dirty="0"/>
+              <a:t> </a:t>
+            </a:r>
+            <a:r>
+              <a:rPr lang="de-DE" sz="1200" dirty="0" err="1"/>
+              <a:t>configuration</a:t>
+            </a:r>
+            <a:r>
+              <a:rPr lang="de-DE" sz="1200" dirty="0"/>
+              <a:t> in </a:t>
+            </a:r>
+            <a:r>
+              <a:rPr lang="de-DE" sz="1200" dirty="0" err="1"/>
+              <a:t>alertmanager.yml</a:t>
+            </a:r>
+            <a:br>
+              <a:rPr lang="de-DE" sz="1200" dirty="0"/>
+            </a:br>
+            <a:r>
+              <a:rPr lang="de-DE" sz="1200" dirty="0"/>
+              <a:t>-&gt; </a:t>
+            </a:r>
+            <a:r>
+              <a:rPr lang="de-DE" sz="1200" dirty="0" err="1"/>
+              <a:t>define</a:t>
+            </a:r>
+            <a:r>
+              <a:rPr lang="de-DE" sz="1200" dirty="0"/>
+              <a:t> </a:t>
+            </a:r>
+            <a:r>
+              <a:rPr lang="de-DE" sz="1200" dirty="0" err="1"/>
+              <a:t>communication</a:t>
+            </a:r>
+            <a:r>
+              <a:rPr lang="de-DE" sz="1200" dirty="0"/>
+              <a:t> </a:t>
+            </a:r>
+            <a:r>
+              <a:rPr lang="de-DE" sz="1200" dirty="0" err="1"/>
+              <a:t>channels</a:t>
+            </a:r>
+            <a:r>
+              <a:rPr lang="de-DE" sz="1200" dirty="0"/>
+              <a:t> like </a:t>
+            </a:r>
+            <a:r>
+              <a:rPr lang="de-DE" sz="1200" dirty="0" err="1"/>
+              <a:t>Webhooks</a:t>
+            </a:r>
+            <a:br>
+              <a:rPr lang="de-DE" sz="1200" dirty="0"/>
+            </a:br>
+            <a:r>
+              <a:rPr lang="de-DE" sz="1200" dirty="0"/>
+              <a:t>-&gt; will </a:t>
+            </a:r>
+            <a:r>
+              <a:rPr lang="de-DE" sz="1200" dirty="0" err="1"/>
+              <a:t>be</a:t>
+            </a:r>
+            <a:r>
+              <a:rPr lang="de-DE" sz="1200" dirty="0"/>
+              <a:t> </a:t>
+            </a:r>
+            <a:r>
+              <a:rPr lang="de-DE" sz="1200" dirty="0" err="1"/>
+              <a:t>used</a:t>
+            </a:r>
+            <a:r>
+              <a:rPr lang="de-DE" sz="1200" dirty="0"/>
+              <a:t> in </a:t>
+            </a:r>
+            <a:r>
+              <a:rPr lang="de-DE" sz="1200" dirty="0" err="1"/>
+              <a:t>AlertManager</a:t>
+            </a:r>
+            <a:endParaRPr lang="de-DE" sz="1200" dirty="0"/>
+          </a:p>
+          <a:p>
+            <a:r>
+              <a:rPr lang="de-DE" sz="1600" dirty="0" err="1"/>
+              <a:t>Grafana</a:t>
+            </a:r>
+            <a:endParaRPr lang="de-DE" sz="1600" dirty="0"/>
+          </a:p>
+          <a:p>
+            <a:pPr lvl="1"/>
+            <a:r>
+              <a:rPr lang="de-DE" sz="1200" dirty="0" err="1"/>
+              <a:t>define</a:t>
+            </a:r>
+            <a:r>
+              <a:rPr lang="de-DE" sz="1200" dirty="0"/>
+              <a:t> simple </a:t>
+            </a:r>
+            <a:r>
+              <a:rPr lang="de-DE" sz="1200" dirty="0" err="1"/>
+              <a:t>rules</a:t>
+            </a:r>
+            <a:r>
+              <a:rPr lang="de-DE" sz="1200" dirty="0"/>
+              <a:t> </a:t>
+            </a:r>
+            <a:r>
+              <a:rPr lang="de-DE" sz="1200" dirty="0" err="1"/>
+              <a:t>directly</a:t>
+            </a:r>
+            <a:r>
+              <a:rPr lang="de-DE" sz="1200" dirty="0"/>
+              <a:t> in </a:t>
+            </a:r>
+            <a:r>
+              <a:rPr lang="de-DE" sz="1200" dirty="0" err="1"/>
+              <a:t>sepcific</a:t>
+            </a:r>
+            <a:r>
+              <a:rPr lang="de-DE" sz="1200" dirty="0"/>
+              <a:t> Dashboards</a:t>
+            </a:r>
+          </a:p>
+          <a:p>
+            <a:pPr lvl="1"/>
+            <a:endParaRPr lang="de-DE" sz="1200" dirty="0"/>
+          </a:p>
+          <a:p>
+            <a:r>
+              <a:rPr lang="de-DE" sz="1600" dirty="0" err="1"/>
+              <a:t>Difference</a:t>
+            </a:r>
+            <a:r>
+              <a:rPr lang="de-DE" sz="1600" dirty="0"/>
+              <a:t> </a:t>
+            </a:r>
+            <a:r>
+              <a:rPr lang="de-DE" sz="1600" dirty="0" err="1"/>
+              <a:t>between</a:t>
+            </a:r>
+            <a:r>
+              <a:rPr lang="de-DE" sz="1600" dirty="0"/>
+              <a:t> </a:t>
+            </a:r>
+            <a:r>
+              <a:rPr lang="de-DE" sz="1600" dirty="0" err="1"/>
+              <a:t>Grafana</a:t>
+            </a:r>
+            <a:r>
+              <a:rPr lang="de-DE" sz="1600" dirty="0"/>
+              <a:t> and </a:t>
+            </a:r>
+            <a:r>
+              <a:rPr lang="de-DE" sz="1600" dirty="0" err="1"/>
+              <a:t>AlertManager</a:t>
+            </a:r>
+            <a:r>
+              <a:rPr lang="de-DE" sz="1600" dirty="0"/>
+              <a:t> (</a:t>
+            </a:r>
+            <a:r>
+              <a:rPr lang="de-DE" sz="1600" dirty="0" err="1"/>
+              <a:t>Webhooks</a:t>
+            </a:r>
+            <a:r>
+              <a:rPr lang="de-DE" sz="1600" dirty="0"/>
+              <a:t>)</a:t>
+            </a:r>
+          </a:p>
+          <a:p>
+            <a:pPr lvl="1"/>
+            <a:r>
+              <a:rPr lang="de-DE" sz="1200" dirty="0" err="1"/>
+              <a:t>AlertManager</a:t>
+            </a:r>
+            <a:r>
+              <a:rPr lang="de-DE" sz="1200" dirty="0"/>
+              <a:t> </a:t>
+            </a:r>
+            <a:r>
+              <a:rPr lang="de-DE" sz="1200" dirty="0" err="1"/>
+              <a:t>more</a:t>
+            </a:r>
+            <a:r>
+              <a:rPr lang="de-DE" sz="1200" dirty="0"/>
+              <a:t> flexibel</a:t>
+            </a:r>
+          </a:p>
+          <a:p>
+            <a:pPr lvl="1"/>
+            <a:r>
+              <a:rPr lang="de-DE" sz="1200" dirty="0" err="1"/>
+              <a:t>Grafana</a:t>
+            </a:r>
+            <a:r>
+              <a:rPr lang="de-DE" sz="1200" dirty="0"/>
+              <a:t> Dashboard </a:t>
+            </a:r>
+            <a:r>
+              <a:rPr lang="de-DE" sz="1200" dirty="0" err="1"/>
+              <a:t>is</a:t>
+            </a:r>
+            <a:r>
+              <a:rPr lang="de-DE" sz="1200" dirty="0"/>
+              <a:t> not </a:t>
+            </a:r>
+            <a:r>
+              <a:rPr lang="de-DE" sz="1200" dirty="0" err="1"/>
+              <a:t>needed</a:t>
+            </a:r>
+            <a:r>
+              <a:rPr lang="de-DE" sz="1200" dirty="0"/>
+              <a:t> (</a:t>
+            </a:r>
+            <a:r>
+              <a:rPr lang="de-DE" sz="1200" dirty="0" err="1"/>
+              <a:t>for</a:t>
+            </a:r>
+            <a:r>
+              <a:rPr lang="de-DE" sz="1200" dirty="0"/>
+              <a:t> </a:t>
+            </a:r>
+            <a:r>
+              <a:rPr lang="de-DE" sz="1200" dirty="0" err="1"/>
+              <a:t>Alerting</a:t>
+            </a:r>
+            <a:r>
+              <a:rPr lang="de-DE" sz="1200" dirty="0"/>
+              <a:t>)</a:t>
+            </a:r>
+          </a:p>
+          <a:p>
+            <a:pPr lvl="1"/>
+            <a:r>
+              <a:rPr lang="de-DE" sz="1200" dirty="0"/>
+              <a:t>Single </a:t>
+            </a:r>
+            <a:r>
+              <a:rPr lang="de-DE" sz="1200" dirty="0" err="1"/>
+              <a:t>Stat</a:t>
+            </a:r>
+            <a:r>
+              <a:rPr lang="de-DE" sz="1200" dirty="0"/>
+              <a:t> </a:t>
+            </a:r>
+            <a:r>
+              <a:rPr lang="de-DE" sz="1200" dirty="0" err="1"/>
+              <a:t>has</a:t>
+            </a:r>
+            <a:r>
+              <a:rPr lang="de-DE" sz="1200" dirty="0"/>
+              <a:t> </a:t>
+            </a:r>
+            <a:r>
+              <a:rPr lang="de-DE" sz="1200" dirty="0" err="1"/>
+              <a:t>no</a:t>
+            </a:r>
+            <a:r>
+              <a:rPr lang="de-DE" sz="1200" dirty="0"/>
+              <a:t> </a:t>
+            </a:r>
+            <a:r>
+              <a:rPr lang="de-DE" sz="1200" dirty="0" err="1"/>
+              <a:t>alerting</a:t>
+            </a:r>
+            <a:r>
+              <a:rPr lang="de-DE" sz="1200" dirty="0"/>
+              <a:t> </a:t>
+            </a:r>
+            <a:r>
+              <a:rPr lang="de-DE" sz="1200" dirty="0" err="1"/>
+              <a:t>functionality</a:t>
+            </a:r>
+            <a:r>
+              <a:rPr lang="de-DE" sz="1200" dirty="0"/>
+              <a:t> </a:t>
+            </a:r>
+            <a:r>
+              <a:rPr lang="de-DE" sz="1200" dirty="0" err="1"/>
+              <a:t>anymore</a:t>
+            </a:r>
+            <a:r>
+              <a:rPr lang="de-DE" sz="1200" dirty="0"/>
+              <a:t> (v.7.0.0)</a:t>
+            </a:r>
+          </a:p>
+          <a:p>
+            <a:pPr marL="0" indent="0">
+              <a:buNone/>
+            </a:pPr>
+            <a:endParaRPr lang="de-DE" sz="1600" dirty="0"/>
+          </a:p>
+          <a:p>
+            <a:endParaRPr lang="de-DE" sz="1600" dirty="0"/>
+          </a:p>
+        </p:txBody>
+      </p:sp>
+      <p:sp>
+        <p:nvSpPr>
+          <p:cNvPr id="4" name="Rechteck 3">
+            <a:extLst>
+              <a:ext uri="{FF2B5EF4-FFF2-40B4-BE49-F238E27FC236}">
+                <a16:creationId xmlns:a16="http://schemas.microsoft.com/office/drawing/2014/main" id="{FF8435B0-05C4-4C64-985A-C4A0645088FF}"/>
+              </a:ext>
+            </a:extLst>
+          </p:cNvPr>
+          <p:cNvSpPr/>
+          <p:nvPr/>
+        </p:nvSpPr>
+        <p:spPr>
+          <a:xfrm>
+            <a:off x="1458056" y="4827016"/>
+            <a:ext cx="1044508" cy="635045"/>
+          </a:xfrm>
+          <a:prstGeom prst="rect">
+            <a:avLst/>
+          </a:prstGeom>
+          <a:solidFill>
+            <a:schemeClr val="bg2"/>
+          </a:solidFill>
+          <a:ln>
+            <a:solidFill>
+              <a:schemeClr val="tx1"/>
+            </a:solidFill>
+          </a:ln>
+        </p:spPr>
+        <p:style>
+          <a:lnRef idx="2">
+            <a:schemeClr val="accent1">
+              <a:shade val="50000"/>
+            </a:schemeClr>
+          </a:lnRef>
+          <a:fillRef idx="1">
+            <a:schemeClr val="accent1"/>
+          </a:fillRef>
+          <a:effectRef idx="0">
+            <a:schemeClr val="accent1"/>
+          </a:effectRef>
+          <a:fontRef idx="minor">
+            <a:schemeClr val="lt1"/>
+          </a:fontRef>
+        </p:style>
+        <p:txBody>
+          <a:bodyPr rtlCol="0" anchor="ctr"/>
+          <a:lstStyle/>
+          <a:p>
+            <a:pPr algn="ctr"/>
+            <a:r>
+              <a:rPr lang="de-DE" sz="1200" dirty="0">
+                <a:solidFill>
+                  <a:schemeClr val="tx1"/>
+                </a:solidFill>
+              </a:rPr>
+              <a:t>Prometheus</a:t>
+            </a:r>
+          </a:p>
+        </p:txBody>
+      </p:sp>
+      <p:sp>
+        <p:nvSpPr>
+          <p:cNvPr id="5" name="Rechteck 4">
+            <a:extLst>
+              <a:ext uri="{FF2B5EF4-FFF2-40B4-BE49-F238E27FC236}">
+                <a16:creationId xmlns:a16="http://schemas.microsoft.com/office/drawing/2014/main" id="{117ACABC-3254-4B39-BE87-F85E9F88FFC1}"/>
+              </a:ext>
+            </a:extLst>
+          </p:cNvPr>
+          <p:cNvSpPr/>
+          <p:nvPr/>
+        </p:nvSpPr>
+        <p:spPr>
+          <a:xfrm>
+            <a:off x="1458056" y="2728052"/>
+            <a:ext cx="1044508" cy="642141"/>
+          </a:xfrm>
+          <a:prstGeom prst="rect">
+            <a:avLst/>
+          </a:prstGeom>
+          <a:solidFill>
+            <a:schemeClr val="bg2"/>
+          </a:solidFill>
+          <a:ln>
+            <a:solidFill>
+              <a:schemeClr val="tx1"/>
+            </a:solidFill>
+          </a:ln>
+        </p:spPr>
+        <p:style>
+          <a:lnRef idx="2">
+            <a:schemeClr val="accent1">
+              <a:shade val="50000"/>
+            </a:schemeClr>
+          </a:lnRef>
+          <a:fillRef idx="1">
+            <a:schemeClr val="accent1"/>
+          </a:fillRef>
+          <a:effectRef idx="0">
+            <a:schemeClr val="accent1"/>
+          </a:effectRef>
+          <a:fontRef idx="minor">
+            <a:schemeClr val="lt1"/>
+          </a:fontRef>
+        </p:style>
+        <p:txBody>
+          <a:bodyPr rtlCol="0" anchor="ctr"/>
+          <a:lstStyle/>
+          <a:p>
+            <a:pPr algn="ctr"/>
+            <a:r>
+              <a:rPr lang="de-DE" sz="1200" dirty="0" err="1">
+                <a:solidFill>
+                  <a:schemeClr val="tx1"/>
+                </a:solidFill>
+              </a:rPr>
+              <a:t>Grafana</a:t>
+            </a:r>
+            <a:endParaRPr lang="de-DE" sz="1200" dirty="0">
+              <a:solidFill>
+                <a:schemeClr val="tx1"/>
+              </a:solidFill>
+            </a:endParaRPr>
+          </a:p>
+        </p:txBody>
+      </p:sp>
+      <p:cxnSp>
+        <p:nvCxnSpPr>
+          <p:cNvPr id="6" name="Gerade Verbindung mit Pfeil 5">
+            <a:extLst>
+              <a:ext uri="{FF2B5EF4-FFF2-40B4-BE49-F238E27FC236}">
+                <a16:creationId xmlns:a16="http://schemas.microsoft.com/office/drawing/2014/main" id="{C376F8D8-9648-4795-8413-34738F30321F}"/>
+              </a:ext>
+            </a:extLst>
+          </p:cNvPr>
+          <p:cNvCxnSpPr/>
+          <p:nvPr/>
+        </p:nvCxnSpPr>
+        <p:spPr>
+          <a:xfrm flipV="1">
+            <a:off x="1980310" y="3734355"/>
+            <a:ext cx="0" cy="672870"/>
+          </a:xfrm>
+          <a:prstGeom prst="straightConnector1">
+            <a:avLst/>
+          </a:prstGeom>
+          <a:ln>
+            <a:tailEnd type="triangle"/>
+          </a:ln>
+        </p:spPr>
+        <p:style>
+          <a:lnRef idx="1">
+            <a:schemeClr val="accent1"/>
+          </a:lnRef>
+          <a:fillRef idx="0">
+            <a:schemeClr val="accent1"/>
+          </a:fillRef>
+          <a:effectRef idx="0">
+            <a:schemeClr val="accent1"/>
+          </a:effectRef>
+          <a:fontRef idx="minor">
+            <a:schemeClr val="tx1"/>
+          </a:fontRef>
+        </p:style>
+      </p:cxnSp>
+      <p:sp>
+        <p:nvSpPr>
+          <p:cNvPr id="7" name="Textfeld 6">
+            <a:extLst>
+              <a:ext uri="{FF2B5EF4-FFF2-40B4-BE49-F238E27FC236}">
+                <a16:creationId xmlns:a16="http://schemas.microsoft.com/office/drawing/2014/main" id="{58C3CAC5-802F-471C-A7A2-FA21224547D2}"/>
+              </a:ext>
+            </a:extLst>
+          </p:cNvPr>
+          <p:cNvSpPr txBox="1"/>
+          <p:nvPr/>
+        </p:nvSpPr>
+        <p:spPr>
+          <a:xfrm>
+            <a:off x="804580" y="2472674"/>
+            <a:ext cx="1015538" cy="215444"/>
+          </a:xfrm>
+          <a:prstGeom prst="rect">
+            <a:avLst/>
+          </a:prstGeom>
+          <a:noFill/>
+        </p:spPr>
+        <p:txBody>
+          <a:bodyPr wrap="square" rtlCol="0">
+            <a:spAutoFit/>
+          </a:bodyPr>
+          <a:lstStyle/>
+          <a:p>
+            <a:pPr algn="ctr"/>
+            <a:r>
+              <a:rPr lang="de-DE" sz="800" dirty="0"/>
+              <a:t>3000:3000</a:t>
+            </a:r>
+          </a:p>
+        </p:txBody>
+      </p:sp>
+      <p:sp>
+        <p:nvSpPr>
+          <p:cNvPr id="8" name="Textfeld 7">
+            <a:extLst>
+              <a:ext uri="{FF2B5EF4-FFF2-40B4-BE49-F238E27FC236}">
+                <a16:creationId xmlns:a16="http://schemas.microsoft.com/office/drawing/2014/main" id="{04B734C6-C3D5-40EC-B557-09213C4F40E9}"/>
+              </a:ext>
+            </a:extLst>
+          </p:cNvPr>
+          <p:cNvSpPr txBox="1"/>
+          <p:nvPr/>
+        </p:nvSpPr>
+        <p:spPr>
+          <a:xfrm>
+            <a:off x="838200" y="5569476"/>
+            <a:ext cx="1015538" cy="215444"/>
+          </a:xfrm>
+          <a:prstGeom prst="rect">
+            <a:avLst/>
+          </a:prstGeom>
+          <a:noFill/>
+        </p:spPr>
+        <p:txBody>
+          <a:bodyPr wrap="square" rtlCol="0">
+            <a:spAutoFit/>
+          </a:bodyPr>
+          <a:lstStyle/>
+          <a:p>
+            <a:pPr algn="ctr"/>
+            <a:r>
+              <a:rPr lang="de-DE" sz="800" dirty="0"/>
+              <a:t>9090:9090</a:t>
+            </a:r>
+          </a:p>
+        </p:txBody>
+      </p:sp>
+      <p:sp>
+        <p:nvSpPr>
+          <p:cNvPr id="9" name="Textfeld 8">
+            <a:extLst>
+              <a:ext uri="{FF2B5EF4-FFF2-40B4-BE49-F238E27FC236}">
+                <a16:creationId xmlns:a16="http://schemas.microsoft.com/office/drawing/2014/main" id="{FE62ECB2-3DAE-48F5-8CD9-33626701383C}"/>
+              </a:ext>
+            </a:extLst>
+          </p:cNvPr>
+          <p:cNvSpPr txBox="1"/>
+          <p:nvPr/>
+        </p:nvSpPr>
+        <p:spPr>
+          <a:xfrm>
+            <a:off x="4188556" y="5539522"/>
+            <a:ext cx="1015538" cy="215444"/>
+          </a:xfrm>
+          <a:prstGeom prst="rect">
+            <a:avLst/>
+          </a:prstGeom>
+          <a:noFill/>
+        </p:spPr>
+        <p:txBody>
+          <a:bodyPr wrap="square" rtlCol="0">
+            <a:spAutoFit/>
+          </a:bodyPr>
+          <a:lstStyle/>
+          <a:p>
+            <a:pPr algn="ctr"/>
+            <a:r>
+              <a:rPr lang="de-DE" sz="800" dirty="0"/>
+              <a:t>9093:9093</a:t>
+            </a:r>
+          </a:p>
+        </p:txBody>
+      </p:sp>
+      <p:sp>
+        <p:nvSpPr>
+          <p:cNvPr id="10" name="Rechteck 9">
+            <a:extLst>
+              <a:ext uri="{FF2B5EF4-FFF2-40B4-BE49-F238E27FC236}">
+                <a16:creationId xmlns:a16="http://schemas.microsoft.com/office/drawing/2014/main" id="{21101348-F643-4729-A0F1-FD2ED8CEE4C5}"/>
+              </a:ext>
+            </a:extLst>
+          </p:cNvPr>
+          <p:cNvSpPr/>
+          <p:nvPr/>
+        </p:nvSpPr>
+        <p:spPr>
+          <a:xfrm>
+            <a:off x="3651817" y="4827015"/>
+            <a:ext cx="1044508" cy="635045"/>
+          </a:xfrm>
+          <a:prstGeom prst="rect">
+            <a:avLst/>
+          </a:prstGeom>
+          <a:solidFill>
+            <a:schemeClr val="bg2"/>
+          </a:solidFill>
+          <a:ln>
+            <a:solidFill>
+              <a:schemeClr val="tx1"/>
+            </a:solidFill>
+          </a:ln>
+        </p:spPr>
+        <p:style>
+          <a:lnRef idx="2">
+            <a:schemeClr val="accent1">
+              <a:shade val="50000"/>
+            </a:schemeClr>
+          </a:lnRef>
+          <a:fillRef idx="1">
+            <a:schemeClr val="accent1"/>
+          </a:fillRef>
+          <a:effectRef idx="0">
+            <a:schemeClr val="accent1"/>
+          </a:effectRef>
+          <a:fontRef idx="minor">
+            <a:schemeClr val="lt1"/>
+          </a:fontRef>
+        </p:style>
+        <p:txBody>
+          <a:bodyPr rtlCol="0" anchor="ctr"/>
+          <a:lstStyle/>
+          <a:p>
+            <a:pPr algn="ctr"/>
+            <a:r>
+              <a:rPr lang="de-DE" sz="1200" dirty="0" err="1">
+                <a:solidFill>
+                  <a:schemeClr val="tx1"/>
+                </a:solidFill>
+              </a:rPr>
+              <a:t>AlertManager</a:t>
+            </a:r>
+            <a:endParaRPr lang="de-DE" sz="1200" dirty="0">
+              <a:solidFill>
+                <a:schemeClr val="tx1"/>
+              </a:solidFill>
+            </a:endParaRPr>
+          </a:p>
+        </p:txBody>
+      </p:sp>
+      <p:sp>
+        <p:nvSpPr>
+          <p:cNvPr id="11" name="Rechteck 10">
+            <a:extLst>
+              <a:ext uri="{FF2B5EF4-FFF2-40B4-BE49-F238E27FC236}">
+                <a16:creationId xmlns:a16="http://schemas.microsoft.com/office/drawing/2014/main" id="{785E8BD4-5560-4BB1-8DD5-879D01B1B751}"/>
+              </a:ext>
+            </a:extLst>
+          </p:cNvPr>
+          <p:cNvSpPr/>
+          <p:nvPr/>
+        </p:nvSpPr>
+        <p:spPr>
+          <a:xfrm>
+            <a:off x="3651817" y="2731599"/>
+            <a:ext cx="1044508" cy="635045"/>
+          </a:xfrm>
+          <a:prstGeom prst="rect">
+            <a:avLst/>
+          </a:prstGeom>
+          <a:solidFill>
+            <a:schemeClr val="bg2"/>
+          </a:solidFill>
+          <a:ln>
+            <a:solidFill>
+              <a:schemeClr val="tx1"/>
+            </a:solidFill>
+          </a:ln>
+        </p:spPr>
+        <p:style>
+          <a:lnRef idx="2">
+            <a:schemeClr val="accent1">
+              <a:shade val="50000"/>
+            </a:schemeClr>
+          </a:lnRef>
+          <a:fillRef idx="1">
+            <a:schemeClr val="accent1"/>
+          </a:fillRef>
+          <a:effectRef idx="0">
+            <a:schemeClr val="accent1"/>
+          </a:effectRef>
+          <a:fontRef idx="minor">
+            <a:schemeClr val="lt1"/>
+          </a:fontRef>
+        </p:style>
+        <p:txBody>
+          <a:bodyPr rtlCol="0" anchor="ctr"/>
+          <a:lstStyle/>
+          <a:p>
+            <a:pPr algn="ctr"/>
+            <a:r>
+              <a:rPr lang="de-DE" sz="1200" dirty="0" err="1">
+                <a:solidFill>
+                  <a:schemeClr val="tx1"/>
+                </a:solidFill>
+              </a:rPr>
+              <a:t>Mattermost</a:t>
+            </a:r>
+            <a:endParaRPr lang="de-DE" sz="1200" dirty="0">
+              <a:solidFill>
+                <a:schemeClr val="tx1"/>
+              </a:solidFill>
+            </a:endParaRPr>
+          </a:p>
+        </p:txBody>
+      </p:sp>
+      <p:cxnSp>
+        <p:nvCxnSpPr>
+          <p:cNvPr id="12" name="Gerade Verbindung mit Pfeil 11">
+            <a:extLst>
+              <a:ext uri="{FF2B5EF4-FFF2-40B4-BE49-F238E27FC236}">
+                <a16:creationId xmlns:a16="http://schemas.microsoft.com/office/drawing/2014/main" id="{94C39598-6318-4283-97D3-13FF12699EA0}"/>
+              </a:ext>
+            </a:extLst>
+          </p:cNvPr>
+          <p:cNvCxnSpPr/>
+          <p:nvPr/>
+        </p:nvCxnSpPr>
+        <p:spPr>
+          <a:xfrm flipV="1">
+            <a:off x="4238284" y="3734355"/>
+            <a:ext cx="0" cy="672870"/>
+          </a:xfrm>
+          <a:prstGeom prst="straightConnector1">
+            <a:avLst/>
+          </a:prstGeom>
+          <a:ln>
+            <a:tailEnd type="triangle"/>
+          </a:ln>
+        </p:spPr>
+        <p:style>
+          <a:lnRef idx="1">
+            <a:schemeClr val="accent1"/>
+          </a:lnRef>
+          <a:fillRef idx="0">
+            <a:schemeClr val="accent1"/>
+          </a:fillRef>
+          <a:effectRef idx="0">
+            <a:schemeClr val="accent1"/>
+          </a:effectRef>
+          <a:fontRef idx="minor">
+            <a:schemeClr val="tx1"/>
+          </a:fontRef>
+        </p:style>
+      </p:cxnSp>
+      <p:cxnSp>
+        <p:nvCxnSpPr>
+          <p:cNvPr id="13" name="Gerade Verbindung mit Pfeil 12">
+            <a:extLst>
+              <a:ext uri="{FF2B5EF4-FFF2-40B4-BE49-F238E27FC236}">
+                <a16:creationId xmlns:a16="http://schemas.microsoft.com/office/drawing/2014/main" id="{C80D6801-B998-4CAD-B9D2-5BC8425B9C65}"/>
+              </a:ext>
+            </a:extLst>
+          </p:cNvPr>
+          <p:cNvCxnSpPr>
+            <a:cxnSpLocks/>
+          </p:cNvCxnSpPr>
+          <p:nvPr/>
+        </p:nvCxnSpPr>
+        <p:spPr>
+          <a:xfrm>
+            <a:off x="2745269" y="5144537"/>
+            <a:ext cx="699267" cy="0"/>
+          </a:xfrm>
+          <a:prstGeom prst="straightConnector1">
+            <a:avLst/>
+          </a:prstGeom>
+          <a:ln>
+            <a:tailEnd type="triangle"/>
+          </a:ln>
+        </p:spPr>
+        <p:style>
+          <a:lnRef idx="1">
+            <a:schemeClr val="accent1"/>
+          </a:lnRef>
+          <a:fillRef idx="0">
+            <a:schemeClr val="accent1"/>
+          </a:fillRef>
+          <a:effectRef idx="0">
+            <a:schemeClr val="accent1"/>
+          </a:effectRef>
+          <a:fontRef idx="minor">
+            <a:schemeClr val="tx1"/>
+          </a:fontRef>
+        </p:style>
+      </p:cxnSp>
+      <p:cxnSp>
+        <p:nvCxnSpPr>
+          <p:cNvPr id="15" name="Gerade Verbindung mit Pfeil 14">
+            <a:extLst>
+              <a:ext uri="{FF2B5EF4-FFF2-40B4-BE49-F238E27FC236}">
+                <a16:creationId xmlns:a16="http://schemas.microsoft.com/office/drawing/2014/main" id="{8E197907-994C-4151-B664-D602CCE954DF}"/>
+              </a:ext>
+            </a:extLst>
+          </p:cNvPr>
+          <p:cNvCxnSpPr>
+            <a:cxnSpLocks/>
+          </p:cNvCxnSpPr>
+          <p:nvPr/>
+        </p:nvCxnSpPr>
+        <p:spPr>
+          <a:xfrm>
+            <a:off x="2745269" y="3059298"/>
+            <a:ext cx="699267" cy="0"/>
+          </a:xfrm>
+          <a:prstGeom prst="straightConnector1">
+            <a:avLst/>
+          </a:prstGeom>
+          <a:ln>
+            <a:tailEnd type="triangle"/>
+          </a:ln>
+        </p:spPr>
+        <p:style>
+          <a:lnRef idx="1">
+            <a:schemeClr val="accent1"/>
+          </a:lnRef>
+          <a:fillRef idx="0">
+            <a:schemeClr val="accent1"/>
+          </a:fillRef>
+          <a:effectRef idx="0">
+            <a:schemeClr val="accent1"/>
+          </a:effectRef>
+          <a:fontRef idx="minor">
+            <a:schemeClr val="tx1"/>
+          </a:fontRef>
+        </p:style>
+      </p:cxnSp>
+      <p:sp>
+        <p:nvSpPr>
+          <p:cNvPr id="18" name="Textfeld 17">
+            <a:extLst>
+              <a:ext uri="{FF2B5EF4-FFF2-40B4-BE49-F238E27FC236}">
+                <a16:creationId xmlns:a16="http://schemas.microsoft.com/office/drawing/2014/main" id="{C61E51A9-DD9E-40BB-B088-2F6A28886E3C}"/>
+              </a:ext>
+            </a:extLst>
+          </p:cNvPr>
+          <p:cNvSpPr txBox="1"/>
+          <p:nvPr/>
+        </p:nvSpPr>
+        <p:spPr>
+          <a:xfrm>
+            <a:off x="1345684" y="3924380"/>
+            <a:ext cx="1269251" cy="338554"/>
+          </a:xfrm>
+          <a:prstGeom prst="rect">
+            <a:avLst/>
+          </a:prstGeom>
+          <a:noFill/>
+        </p:spPr>
+        <p:txBody>
+          <a:bodyPr wrap="square" rtlCol="0">
+            <a:spAutoFit/>
+          </a:bodyPr>
+          <a:lstStyle/>
+          <a:p>
+            <a:pPr algn="ctr"/>
+            <a:r>
+              <a:rPr lang="de-DE" sz="800" dirty="0" err="1"/>
+              <a:t>visualize</a:t>
+            </a:r>
+            <a:r>
+              <a:rPr lang="de-DE" sz="800" dirty="0"/>
+              <a:t> </a:t>
+            </a:r>
+            <a:r>
+              <a:rPr lang="de-DE" sz="800" dirty="0" err="1"/>
+              <a:t>important</a:t>
+            </a:r>
+            <a:r>
+              <a:rPr lang="de-DE" sz="800" dirty="0"/>
+              <a:t> </a:t>
+            </a:r>
+            <a:r>
+              <a:rPr lang="de-DE" sz="800" dirty="0" err="1"/>
+              <a:t>components</a:t>
+            </a:r>
+            <a:endParaRPr lang="de-DE" sz="800" dirty="0"/>
+          </a:p>
+        </p:txBody>
+      </p:sp>
+      <p:sp>
+        <p:nvSpPr>
+          <p:cNvPr id="19" name="Textfeld 18">
+            <a:extLst>
+              <a:ext uri="{FF2B5EF4-FFF2-40B4-BE49-F238E27FC236}">
+                <a16:creationId xmlns:a16="http://schemas.microsoft.com/office/drawing/2014/main" id="{2ED647C7-7C46-421F-87BF-54E69D5FC9B9}"/>
+              </a:ext>
+            </a:extLst>
+          </p:cNvPr>
+          <p:cNvSpPr txBox="1"/>
+          <p:nvPr/>
+        </p:nvSpPr>
+        <p:spPr>
+          <a:xfrm>
+            <a:off x="2442565" y="5177625"/>
+            <a:ext cx="1269251" cy="215444"/>
+          </a:xfrm>
+          <a:prstGeom prst="rect">
+            <a:avLst/>
+          </a:prstGeom>
+          <a:noFill/>
+        </p:spPr>
+        <p:txBody>
+          <a:bodyPr wrap="square" rtlCol="0">
+            <a:spAutoFit/>
+          </a:bodyPr>
+          <a:lstStyle/>
+          <a:p>
+            <a:pPr algn="ctr"/>
+            <a:r>
+              <a:rPr lang="de-DE" sz="800" dirty="0" err="1"/>
+              <a:t>create</a:t>
+            </a:r>
+            <a:r>
+              <a:rPr lang="de-DE" sz="800" dirty="0"/>
+              <a:t> </a:t>
+            </a:r>
+            <a:r>
+              <a:rPr lang="de-DE" sz="800" dirty="0" err="1"/>
+              <a:t>alerts</a:t>
+            </a:r>
+            <a:endParaRPr lang="de-DE" sz="800" dirty="0"/>
+          </a:p>
+        </p:txBody>
+      </p:sp>
+      <p:sp>
+        <p:nvSpPr>
+          <p:cNvPr id="20" name="Textfeld 19">
+            <a:extLst>
+              <a:ext uri="{FF2B5EF4-FFF2-40B4-BE49-F238E27FC236}">
+                <a16:creationId xmlns:a16="http://schemas.microsoft.com/office/drawing/2014/main" id="{8EB79E7A-E174-4AAA-ABDA-354A2B59A73C}"/>
+              </a:ext>
+            </a:extLst>
+          </p:cNvPr>
+          <p:cNvSpPr txBox="1"/>
+          <p:nvPr/>
+        </p:nvSpPr>
+        <p:spPr>
+          <a:xfrm>
+            <a:off x="3603658" y="3979326"/>
+            <a:ext cx="1269251" cy="215444"/>
+          </a:xfrm>
+          <a:prstGeom prst="rect">
+            <a:avLst/>
+          </a:prstGeom>
+          <a:noFill/>
+        </p:spPr>
+        <p:txBody>
+          <a:bodyPr wrap="square" rtlCol="0">
+            <a:spAutoFit/>
+          </a:bodyPr>
+          <a:lstStyle/>
+          <a:p>
+            <a:pPr algn="ctr"/>
+            <a:r>
+              <a:rPr lang="de-DE" sz="800" dirty="0"/>
+              <a:t>push </a:t>
+            </a:r>
+            <a:r>
+              <a:rPr lang="de-DE" sz="800" dirty="0" err="1"/>
+              <a:t>alerting</a:t>
+            </a:r>
+            <a:r>
+              <a:rPr lang="de-DE" sz="800" dirty="0"/>
+              <a:t> </a:t>
+            </a:r>
+            <a:r>
+              <a:rPr lang="de-DE" sz="800" dirty="0" err="1"/>
+              <a:t>messages</a:t>
+            </a:r>
+            <a:endParaRPr lang="de-DE" sz="800" dirty="0"/>
+          </a:p>
+        </p:txBody>
+      </p:sp>
+      <p:sp>
+        <p:nvSpPr>
+          <p:cNvPr id="21" name="Textfeld 20">
+            <a:extLst>
+              <a:ext uri="{FF2B5EF4-FFF2-40B4-BE49-F238E27FC236}">
+                <a16:creationId xmlns:a16="http://schemas.microsoft.com/office/drawing/2014/main" id="{10CEA8E1-3CAB-4137-A384-190AACF52232}"/>
+              </a:ext>
+            </a:extLst>
+          </p:cNvPr>
+          <p:cNvSpPr txBox="1"/>
+          <p:nvPr/>
+        </p:nvSpPr>
+        <p:spPr>
+          <a:xfrm>
+            <a:off x="2462278" y="2765961"/>
+            <a:ext cx="1269251" cy="215444"/>
+          </a:xfrm>
+          <a:prstGeom prst="rect">
+            <a:avLst/>
+          </a:prstGeom>
+          <a:noFill/>
+        </p:spPr>
+        <p:txBody>
+          <a:bodyPr wrap="square" rtlCol="0">
+            <a:spAutoFit/>
+          </a:bodyPr>
+          <a:lstStyle/>
+          <a:p>
+            <a:pPr algn="ctr"/>
+            <a:r>
+              <a:rPr lang="de-DE" sz="800" dirty="0"/>
+              <a:t>push </a:t>
+            </a:r>
+            <a:r>
+              <a:rPr lang="de-DE" sz="800" dirty="0" err="1"/>
+              <a:t>alerting</a:t>
+            </a:r>
+            <a:r>
+              <a:rPr lang="de-DE" sz="800" dirty="0"/>
+              <a:t> </a:t>
+            </a:r>
+            <a:r>
+              <a:rPr lang="de-DE" sz="800" dirty="0" err="1"/>
+              <a:t>messages</a:t>
+            </a:r>
+            <a:endParaRPr lang="de-DE" sz="800" dirty="0"/>
+          </a:p>
+        </p:txBody>
+      </p:sp>
+    </p:spTree>
+    <p:extLst>
+      <p:ext uri="{BB962C8B-B14F-4D97-AF65-F5344CB8AC3E}">
+        <p14:creationId xmlns:p14="http://schemas.microsoft.com/office/powerpoint/2010/main" val="3548456055"/>
       </p:ext>
     </p:extLst>
   </p:cSld>

</xml_diff>